<commit_message>
Added 2 slides to L17
</commit_message>
<xml_diff>
--- a/lecture-17/Lecture_17_Optimization.pptx
+++ b/lecture-17/Lecture_17_Optimization.pptx
@@ -5,7 +5,7 @@
     <p:sldMasterId id="2147483648" r:id="rId1"/>
   </p:sldMasterIdLst>
   <p:notesMasterIdLst>
-    <p:notesMasterId r:id="rId51"/>
+    <p:notesMasterId r:id="rId53"/>
   </p:notesMasterIdLst>
   <p:sldIdLst>
     <p:sldId id="257" r:id="rId2"/>
@@ -39,24 +39,26 @@
     <p:sldId id="333" r:id="rId30"/>
     <p:sldId id="334" r:id="rId31"/>
     <p:sldId id="365" r:id="rId32"/>
-    <p:sldId id="337" r:id="rId33"/>
-    <p:sldId id="364" r:id="rId34"/>
-    <p:sldId id="338" r:id="rId35"/>
-    <p:sldId id="339" r:id="rId36"/>
-    <p:sldId id="340" r:id="rId37"/>
-    <p:sldId id="341" r:id="rId38"/>
-    <p:sldId id="342" r:id="rId39"/>
-    <p:sldId id="343" r:id="rId40"/>
-    <p:sldId id="344" r:id="rId41"/>
-    <p:sldId id="345" r:id="rId42"/>
-    <p:sldId id="346" r:id="rId43"/>
-    <p:sldId id="347" r:id="rId44"/>
-    <p:sldId id="336" r:id="rId45"/>
-    <p:sldId id="357" r:id="rId46"/>
-    <p:sldId id="360" r:id="rId47"/>
-    <p:sldId id="361" r:id="rId48"/>
-    <p:sldId id="362" r:id="rId49"/>
-    <p:sldId id="363" r:id="rId50"/>
+    <p:sldId id="369" r:id="rId33"/>
+    <p:sldId id="370" r:id="rId34"/>
+    <p:sldId id="337" r:id="rId35"/>
+    <p:sldId id="364" r:id="rId36"/>
+    <p:sldId id="338" r:id="rId37"/>
+    <p:sldId id="339" r:id="rId38"/>
+    <p:sldId id="340" r:id="rId39"/>
+    <p:sldId id="341" r:id="rId40"/>
+    <p:sldId id="342" r:id="rId41"/>
+    <p:sldId id="343" r:id="rId42"/>
+    <p:sldId id="344" r:id="rId43"/>
+    <p:sldId id="345" r:id="rId44"/>
+    <p:sldId id="346" r:id="rId45"/>
+    <p:sldId id="347" r:id="rId46"/>
+    <p:sldId id="336" r:id="rId47"/>
+    <p:sldId id="357" r:id="rId48"/>
+    <p:sldId id="360" r:id="rId49"/>
+    <p:sldId id="361" r:id="rId50"/>
+    <p:sldId id="362" r:id="rId51"/>
+    <p:sldId id="363" r:id="rId52"/>
   </p:sldIdLst>
   <p:sldSz cx="12192000" cy="6858000"/>
   <p:notesSz cx="6858000" cy="9144000"/>
@@ -252,11 +254,11 @@
           <c:showBubbleSize val="0"/>
         </c:dLbls>
         <c:gapWidth val="150"/>
-        <c:axId val="-2002258240"/>
-        <c:axId val="-2002241216"/>
+        <c:axId val="-2132964064"/>
+        <c:axId val="-2132961168"/>
       </c:barChart>
       <c:catAx>
-        <c:axId val="-2002258240"/>
+        <c:axId val="-2132964064"/>
         <c:scaling>
           <c:orientation val="minMax"/>
         </c:scaling>
@@ -275,7 +277,7 @@
             <a:endParaRPr lang="en-US"/>
           </a:p>
         </c:txPr>
-        <c:crossAx val="-2002241216"/>
+        <c:crossAx val="-2132961168"/>
         <c:crosses val="autoZero"/>
         <c:auto val="1"/>
         <c:lblAlgn val="ctr"/>
@@ -283,7 +285,7 @@
         <c:noMultiLvlLbl val="0"/>
       </c:catAx>
       <c:valAx>
-        <c:axId val="-2002241216"/>
+        <c:axId val="-2132961168"/>
         <c:scaling>
           <c:orientation val="minMax"/>
         </c:scaling>
@@ -304,7 +306,7 @@
             <a:endParaRPr lang="en-US"/>
           </a:p>
         </c:txPr>
-        <c:crossAx val="-2002258240"/>
+        <c:crossAx val="-2132964064"/>
         <c:crosses val="autoZero"/>
         <c:crossBetween val="between"/>
       </c:valAx>
@@ -467,11 +469,11 @@
           <c:showBubbleSize val="0"/>
         </c:dLbls>
         <c:gapWidth val="150"/>
-        <c:axId val="-2036925904"/>
-        <c:axId val="-2036923120"/>
+        <c:axId val="-2133083440"/>
+        <c:axId val="-2133080608"/>
       </c:barChart>
       <c:catAx>
-        <c:axId val="-2036925904"/>
+        <c:axId val="-2133083440"/>
         <c:scaling>
           <c:orientation val="minMax"/>
         </c:scaling>
@@ -480,7 +482,7 @@
         <c:majorTickMark val="out"/>
         <c:minorTickMark val="none"/>
         <c:tickLblPos val="nextTo"/>
-        <c:crossAx val="-2036923120"/>
+        <c:crossAx val="-2133080608"/>
         <c:crosses val="autoZero"/>
         <c:auto val="1"/>
         <c:lblAlgn val="ctr"/>
@@ -488,7 +490,7 @@
         <c:noMultiLvlLbl val="0"/>
       </c:catAx>
       <c:valAx>
-        <c:axId val="-2036923120"/>
+        <c:axId val="-2133080608"/>
         <c:scaling>
           <c:orientation val="minMax"/>
         </c:scaling>
@@ -499,7 +501,7 @@
         <c:majorTickMark val="out"/>
         <c:minorTickMark val="none"/>
         <c:tickLblPos val="nextTo"/>
-        <c:crossAx val="-2036925904"/>
+        <c:crossAx val="-2133083440"/>
         <c:crosses val="autoZero"/>
         <c:crossBetween val="between"/>
       </c:valAx>
@@ -677,11 +679,11 @@
           <c:showBubbleSize val="0"/>
         </c:dLbls>
         <c:gapWidth val="150"/>
-        <c:axId val="-2036984448"/>
-        <c:axId val="-2036981552"/>
+        <c:axId val="-2133141200"/>
+        <c:axId val="-2133159456"/>
       </c:barChart>
       <c:catAx>
-        <c:axId val="-2036984448"/>
+        <c:axId val="-2133141200"/>
         <c:scaling>
           <c:orientation val="minMax"/>
         </c:scaling>
@@ -700,7 +702,7 @@
             <a:endParaRPr lang="en-US"/>
           </a:p>
         </c:txPr>
-        <c:crossAx val="-2036981552"/>
+        <c:crossAx val="-2133159456"/>
         <c:crosses val="autoZero"/>
         <c:auto val="1"/>
         <c:lblAlgn val="ctr"/>
@@ -708,7 +710,7 @@
         <c:noMultiLvlLbl val="0"/>
       </c:catAx>
       <c:valAx>
-        <c:axId val="-2036981552"/>
+        <c:axId val="-2133159456"/>
         <c:scaling>
           <c:orientation val="minMax"/>
         </c:scaling>
@@ -729,7 +731,7 @@
             <a:endParaRPr lang="en-US"/>
           </a:p>
         </c:txPr>
-        <c:crossAx val="-2036984448"/>
+        <c:crossAx val="-2133141200"/>
         <c:crosses val="autoZero"/>
         <c:crossBetween val="between"/>
       </c:valAx>
@@ -892,11 +894,11 @@
           <c:showBubbleSize val="0"/>
         </c:dLbls>
         <c:gapWidth val="150"/>
-        <c:axId val="-1991654064"/>
-        <c:axId val="-1991651232"/>
+        <c:axId val="-2133188656"/>
+        <c:axId val="-2133185824"/>
       </c:barChart>
       <c:catAx>
-        <c:axId val="-1991654064"/>
+        <c:axId val="-2133188656"/>
         <c:scaling>
           <c:orientation val="minMax"/>
         </c:scaling>
@@ -905,7 +907,7 @@
         <c:majorTickMark val="out"/>
         <c:minorTickMark val="none"/>
         <c:tickLblPos val="nextTo"/>
-        <c:crossAx val="-1991651232"/>
+        <c:crossAx val="-2133185824"/>
         <c:crosses val="autoZero"/>
         <c:auto val="1"/>
         <c:lblAlgn val="ctr"/>
@@ -913,7 +915,7 @@
         <c:noMultiLvlLbl val="0"/>
       </c:catAx>
       <c:valAx>
-        <c:axId val="-1991651232"/>
+        <c:axId val="-2133185824"/>
         <c:scaling>
           <c:orientation val="minMax"/>
         </c:scaling>
@@ -924,7 +926,7 @@
         <c:majorTickMark val="out"/>
         <c:minorTickMark val="none"/>
         <c:tickLblPos val="nextTo"/>
-        <c:crossAx val="-1991654064"/>
+        <c:crossAx val="-2133188656"/>
         <c:crosses val="autoZero"/>
         <c:crossBetween val="between"/>
       </c:valAx>
@@ -1038,11 +1040,11 @@
           <c:showBubbleSize val="0"/>
         </c:dLbls>
         <c:gapWidth val="150"/>
-        <c:axId val="-2033436896"/>
-        <c:axId val="-2033434128"/>
+        <c:axId val="-2133300784"/>
+        <c:axId val="-2133297888"/>
       </c:barChart>
       <c:catAx>
-        <c:axId val="-2033436896"/>
+        <c:axId val="-2133300784"/>
         <c:scaling>
           <c:orientation val="minMax"/>
         </c:scaling>
@@ -1061,7 +1063,7 @@
             <a:endParaRPr lang="en-US"/>
           </a:p>
         </c:txPr>
-        <c:crossAx val="-2033434128"/>
+        <c:crossAx val="-2133297888"/>
         <c:crosses val="autoZero"/>
         <c:auto val="1"/>
         <c:lblAlgn val="ctr"/>
@@ -1069,7 +1071,7 @@
         <c:noMultiLvlLbl val="0"/>
       </c:catAx>
       <c:valAx>
-        <c:axId val="-2033434128"/>
+        <c:axId val="-2133297888"/>
         <c:scaling>
           <c:orientation val="minMax"/>
         </c:scaling>
@@ -1090,7 +1092,7 @@
             <a:endParaRPr lang="en-US"/>
           </a:p>
         </c:txPr>
-        <c:crossAx val="-2033436896"/>
+        <c:crossAx val="-2133300784"/>
         <c:crosses val="autoZero"/>
         <c:crossBetween val="between"/>
       </c:valAx>
@@ -1187,7 +1189,7 @@
           <a:p>
             <a:fld id="{4EFDF809-2BAF-E645-8EF5-E9E38045A37D}" type="datetimeFigureOut">
               <a:rPr lang="en-US" smtClean="0"/>
-              <a:t>11/16/15</a:t>
+              <a:t>11/17/15</a:t>
             </a:fld>
             <a:endParaRPr lang="en-US"/>
           </a:p>
@@ -1847,7 +1849,7 @@
           <a:p>
             <a:fld id="{892BA516-D09A-6A42-8E05-12F9A850DA27}" type="datetimeFigureOut">
               <a:rPr lang="en-US" smtClean="0"/>
-              <a:t>11/16/15</a:t>
+              <a:t>11/17/15</a:t>
             </a:fld>
             <a:endParaRPr lang="en-US"/>
           </a:p>
@@ -2017,7 +2019,7 @@
           <a:p>
             <a:fld id="{892BA516-D09A-6A42-8E05-12F9A850DA27}" type="datetimeFigureOut">
               <a:rPr lang="en-US" smtClean="0"/>
-              <a:t>11/16/15</a:t>
+              <a:t>11/17/15</a:t>
             </a:fld>
             <a:endParaRPr lang="en-US"/>
           </a:p>
@@ -2197,7 +2199,7 @@
           <a:p>
             <a:fld id="{892BA516-D09A-6A42-8E05-12F9A850DA27}" type="datetimeFigureOut">
               <a:rPr lang="en-US" smtClean="0"/>
-              <a:t>11/16/15</a:t>
+              <a:t>11/17/15</a:t>
             </a:fld>
             <a:endParaRPr lang="en-US"/>
           </a:p>
@@ -2367,7 +2369,7 @@
           <a:p>
             <a:fld id="{892BA516-D09A-6A42-8E05-12F9A850DA27}" type="datetimeFigureOut">
               <a:rPr lang="en-US" smtClean="0"/>
-              <a:t>11/16/15</a:t>
+              <a:t>11/17/15</a:t>
             </a:fld>
             <a:endParaRPr lang="en-US"/>
           </a:p>
@@ -2613,7 +2615,7 @@
           <a:p>
             <a:fld id="{892BA516-D09A-6A42-8E05-12F9A850DA27}" type="datetimeFigureOut">
               <a:rPr lang="en-US" smtClean="0"/>
-              <a:t>11/16/15</a:t>
+              <a:t>11/17/15</a:t>
             </a:fld>
             <a:endParaRPr lang="en-US"/>
           </a:p>
@@ -2845,7 +2847,7 @@
           <a:p>
             <a:fld id="{892BA516-D09A-6A42-8E05-12F9A850DA27}" type="datetimeFigureOut">
               <a:rPr lang="en-US" smtClean="0"/>
-              <a:t>11/16/15</a:t>
+              <a:t>11/17/15</a:t>
             </a:fld>
             <a:endParaRPr lang="en-US"/>
           </a:p>
@@ -3212,7 +3214,7 @@
           <a:p>
             <a:fld id="{892BA516-D09A-6A42-8E05-12F9A850DA27}" type="datetimeFigureOut">
               <a:rPr lang="en-US" smtClean="0"/>
-              <a:t>11/16/15</a:t>
+              <a:t>11/17/15</a:t>
             </a:fld>
             <a:endParaRPr lang="en-US"/>
           </a:p>
@@ -3330,7 +3332,7 @@
           <a:p>
             <a:fld id="{892BA516-D09A-6A42-8E05-12F9A850DA27}" type="datetimeFigureOut">
               <a:rPr lang="en-US" smtClean="0"/>
-              <a:t>11/16/15</a:t>
+              <a:t>11/17/15</a:t>
             </a:fld>
             <a:endParaRPr lang="en-US"/>
           </a:p>
@@ -3425,7 +3427,7 @@
           <a:p>
             <a:fld id="{892BA516-D09A-6A42-8E05-12F9A850DA27}" type="datetimeFigureOut">
               <a:rPr lang="en-US" smtClean="0"/>
-              <a:t>11/16/15</a:t>
+              <a:t>11/17/15</a:t>
             </a:fld>
             <a:endParaRPr lang="en-US"/>
           </a:p>
@@ -3702,7 +3704,7 @@
           <a:p>
             <a:fld id="{892BA516-D09A-6A42-8E05-12F9A850DA27}" type="datetimeFigureOut">
               <a:rPr lang="en-US" smtClean="0"/>
-              <a:t>11/16/15</a:t>
+              <a:t>11/17/15</a:t>
             </a:fld>
             <a:endParaRPr lang="en-US"/>
           </a:p>
@@ -3955,7 +3957,7 @@
           <a:p>
             <a:fld id="{892BA516-D09A-6A42-8E05-12F9A850DA27}" type="datetimeFigureOut">
               <a:rPr lang="en-US" smtClean="0"/>
-              <a:t>11/16/15</a:t>
+              <a:t>11/17/15</a:t>
             </a:fld>
             <a:endParaRPr lang="en-US"/>
           </a:p>
@@ -4168,7 +4170,7 @@
           <a:p>
             <a:fld id="{892BA516-D09A-6A42-8E05-12F9A850DA27}" type="datetimeFigureOut">
               <a:rPr lang="en-US" smtClean="0"/>
-              <a:t>11/16/15</a:t>
+              <a:t>11/17/15</a:t>
             </a:fld>
             <a:endParaRPr lang="en-US"/>
           </a:p>
@@ -9685,7 +9687,7 @@
             </a:r>
             <a:r>
               <a:rPr lang="en-US" dirty="0" smtClean="0"/>
-              <a:t>Joins an be re-ordered!</a:t>
+              <a:t>Joins can be re-ordered!</a:t>
             </a:r>
           </a:p>
           <a:p>
@@ -21154,7 +21156,7 @@
               <a:t> </a:t>
             </a:r>
             <a:r>
-              <a:rPr lang="en-US" sz="2400" dirty="0" err="1">
+              <a:rPr lang="en-US" sz="2400" dirty="0" err="1" smtClean="0">
                 <a:latin typeface="Menlo" charset="0"/>
                 <a:ea typeface="Menlo" charset="0"/>
                 <a:cs typeface="Menlo" charset="0"/>
@@ -21162,13 +21164,18 @@
               <a:t>pname</a:t>
             </a:r>
             <a:r>
-              <a:rPr lang="en-US" sz="2400" dirty="0">
+              <a:rPr lang="en-US" sz="2400" dirty="0" smtClean="0">
                 <a:latin typeface="Menlo" charset="0"/>
                 <a:ea typeface="Menlo" charset="0"/>
                 <a:cs typeface="Menlo" charset="0"/>
               </a:rPr>
-              <a:t>, </a:t>
-            </a:r>
+              <a:t> </a:t>
+            </a:r>
+            <a:endParaRPr lang="en-US" sz="2400" dirty="0">
+              <a:latin typeface="Menlo" charset="0"/>
+              <a:ea typeface="Menlo" charset="0"/>
+              <a:cs typeface="Menlo" charset="0"/>
+            </a:endParaRPr>
           </a:p>
           <a:p>
             <a:r>
@@ -23211,135 +23218,77 @@
           <a:p>
             <a:r>
               <a:rPr lang="en-US" dirty="0" smtClean="0"/>
-              <a:t>How do we get index cost?</a:t>
+              <a:t>Estimating index </a:t>
+            </a:r>
+            <a:r>
+              <a:rPr lang="en-US" dirty="0" smtClean="0"/>
+              <a:t>cost?</a:t>
             </a:r>
             <a:endParaRPr lang="en-US" dirty="0"/>
           </a:p>
         </p:txBody>
       </p:sp>
-      <mc:AlternateContent xmlns:mc="http://schemas.openxmlformats.org/markup-compatibility/2006">
-        <mc:Choice xmlns:a14="http://schemas.microsoft.com/office/drawing/2010/main" Requires="a14">
-          <p:sp>
-            <p:nvSpPr>
-              <p:cNvPr id="3" name="Content Placeholder 2"/>
-              <p:cNvSpPr>
-                <a:spLocks noGrp="1"/>
-              </p:cNvSpPr>
-              <p:nvPr>
-                <p:ph idx="1"/>
-              </p:nvPr>
-            </p:nvSpPr>
-            <p:spPr/>
-            <p:txBody>
-              <a:bodyPr/>
-              <a:lstStyle/>
-              <a:p>
-                <a:r>
-                  <a:rPr lang="en-US" dirty="0" smtClean="0"/>
-                  <a:t>Note that to phrase as optimization problem, we need an estimate of the </a:t>
-                </a:r>
-                <a:r>
-                  <a:rPr lang="en-US" b="1" i="1" dirty="0" smtClean="0"/>
-                  <a:t>cost</a:t>
-                </a:r>
-                <a:r>
-                  <a:rPr lang="en-US" dirty="0" smtClean="0"/>
-                  <a:t> of an index lookup</a:t>
-                </a:r>
-              </a:p>
-              <a:p>
-                <a:pPr lvl="1"/>
-                <a:endParaRPr lang="en-US" dirty="0" smtClean="0"/>
-              </a:p>
-              <a:p>
-                <a:r>
-                  <a:rPr lang="en-US" dirty="0" smtClean="0"/>
-                  <a:t>In other words: we need estimates of the </a:t>
-                </a:r>
-                <a:r>
-                  <a:rPr lang="en-US" u="sng" dirty="0" smtClean="0"/>
-                  <a:t>result set size</a:t>
-                </a:r>
-              </a:p>
-              <a:p>
-                <a:pPr lvl="1"/>
-                <a:r>
-                  <a:rPr lang="en-US" dirty="0" smtClean="0"/>
-                  <a:t>The cost of e.g. an </a:t>
-                </a:r>
-                <a:r>
-                  <a:rPr lang="en-US" dirty="0" err="1" smtClean="0"/>
-                  <a:t>unclustered</a:t>
-                </a:r>
-                <a:r>
-                  <a:rPr lang="en-US" dirty="0" smtClean="0"/>
-                  <a:t> index vs. a scan is </a:t>
-                </a:r>
-                <a14:m>
-                  <m:oMath xmlns:m="http://schemas.openxmlformats.org/officeDocument/2006/math">
-                    <m:r>
-                      <a:rPr lang="en-US" i="1" smtClean="0">
-                        <a:latin typeface="Cambria Math" charset="0"/>
-                        <a:ea typeface="Cambria Math" charset="0"/>
-                        <a:cs typeface="Cambria Math" charset="0"/>
-                      </a:rPr>
-                      <m:t>∝</m:t>
-                    </m:r>
-                  </m:oMath>
-                </a14:m>
-                <a:r>
-                  <a:rPr lang="en-US" dirty="0" smtClean="0"/>
-                  <a:t> result set size</a:t>
-                </a:r>
-              </a:p>
-              <a:p>
-                <a:pPr lvl="1"/>
-                <a:endParaRPr lang="en-US" dirty="0"/>
-              </a:p>
-              <a:p>
-                <a:r>
-                  <a:rPr lang="en-US" dirty="0" smtClean="0"/>
-                  <a:t>So how do we estimate the result set size from an index lookup?</a:t>
-                </a:r>
-                <a:endParaRPr lang="en-US" dirty="0"/>
-              </a:p>
-            </p:txBody>
-          </p:sp>
-        </mc:Choice>
-        <mc:Fallback>
-          <p:sp>
-            <p:nvSpPr>
-              <p:cNvPr id="3" name="Content Placeholder 2"/>
-              <p:cNvSpPr>
-                <a:spLocks noGrp="1" noRot="1" noChangeAspect="1" noMove="1" noResize="1" noEditPoints="1" noAdjustHandles="1" noChangeArrowheads="1" noChangeShapeType="1" noTextEdit="1"/>
-              </p:cNvSpPr>
-              <p:nvPr>
-                <p:ph idx="1"/>
-              </p:nvPr>
-            </p:nvSpPr>
-            <p:spPr>
-              <a:blipFill rotWithShape="0">
-                <a:blip r:embed="rId2"/>
-                <a:stretch>
-                  <a:fillRect l="-1043" t="-2241" r="-638"/>
-                </a:stretch>
-              </a:blipFill>
-            </p:spPr>
-            <p:txBody>
-              <a:bodyPr/>
-              <a:lstStyle/>
-              <a:p>
-                <a:r>
-                  <a:rPr lang="en-US">
-                    <a:noFill/>
-                  </a:rPr>
-                  <a:t> </a:t>
-                </a:r>
-              </a:p>
-            </p:txBody>
-          </p:sp>
-        </mc:Fallback>
-      </mc:AlternateContent>
+      <p:sp>
+        <p:nvSpPr>
+          <p:cNvPr id="3" name="Content Placeholder 2"/>
+          <p:cNvSpPr>
+            <a:spLocks noGrp="1"/>
+          </p:cNvSpPr>
+          <p:nvPr>
+            <p:ph idx="1"/>
+          </p:nvPr>
+        </p:nvSpPr>
+        <p:spPr/>
+        <p:txBody>
+          <a:bodyPr/>
+          <a:lstStyle/>
+          <a:p>
+            <a:r>
+              <a:rPr lang="en-US" dirty="0" smtClean="0"/>
+              <a:t>Note that to </a:t>
+            </a:r>
+            <a:r>
+              <a:rPr lang="en-US" dirty="0" smtClean="0"/>
+              <a:t>frame as </a:t>
+            </a:r>
+            <a:r>
+              <a:rPr lang="en-US" dirty="0" smtClean="0"/>
+              <a:t>optimization problem, we </a:t>
+            </a:r>
+            <a:r>
+              <a:rPr lang="en-US" dirty="0" smtClean="0"/>
+              <a:t>first need </a:t>
+            </a:r>
+            <a:r>
+              <a:rPr lang="en-US" dirty="0" smtClean="0"/>
+              <a:t>an estimate of the </a:t>
+            </a:r>
+            <a:r>
+              <a:rPr lang="en-US" b="1" i="1" dirty="0" smtClean="0"/>
+              <a:t>cost</a:t>
+            </a:r>
+            <a:r>
+              <a:rPr lang="en-US" dirty="0" smtClean="0"/>
+              <a:t> of an index lookup</a:t>
+            </a:r>
+          </a:p>
+          <a:p>
+            <a:pPr lvl="1"/>
+            <a:endParaRPr lang="en-US" dirty="0" smtClean="0"/>
+          </a:p>
+          <a:p>
+            <a:pPr lvl="1"/>
+            <a:endParaRPr lang="en-US" dirty="0"/>
+          </a:p>
+          <a:p>
+            <a:r>
+              <a:rPr lang="en-US" dirty="0" smtClean="0"/>
+              <a:t>Need to be able to estimate the costs of different indexes / index types…</a:t>
+            </a:r>
+            <a:endParaRPr lang="en-US" dirty="0"/>
+          </a:p>
+        </p:txBody>
+      </p:sp>
       <p:grpSp>
         <p:nvGrpSpPr>
           <p:cNvPr id="4" name="Group 3"/>
@@ -23463,7 +23412,1440 @@
         </p:nvSpPr>
         <p:spPr>
           <a:xfrm>
-            <a:off x="2970245" y="5622965"/>
+            <a:off x="2970245" y="4804818"/>
+            <a:ext cx="6251510" cy="1015663"/>
+          </a:xfrm>
+          <a:prstGeom prst="rect">
+            <a:avLst/>
+          </a:prstGeom>
+          <a:solidFill>
+            <a:schemeClr val="accent6">
+              <a:lumMod val="20000"/>
+              <a:lumOff val="80000"/>
+            </a:schemeClr>
+          </a:solidFill>
+          <a:effectLst>
+            <a:outerShdw blurRad="50800" dist="12700" dir="2700000" algn="tl" rotWithShape="0">
+              <a:prstClr val="black">
+                <a:alpha val="40000"/>
+              </a:prstClr>
+            </a:outerShdw>
+          </a:effectLst>
+        </p:spPr>
+        <p:txBody>
+          <a:bodyPr wrap="square" rtlCol="0">
+            <a:spAutoFit/>
+          </a:bodyPr>
+          <a:lstStyle/>
+          <a:p>
+            <a:pPr algn="ctr"/>
+            <a:r>
+              <a:rPr lang="en-US" sz="3000" dirty="0" smtClean="0">
+                <a:latin typeface="+mj-lt"/>
+              </a:rPr>
+              <a:t>We will see this mainly depends on </a:t>
+            </a:r>
+            <a:r>
+              <a:rPr lang="en-US" sz="3000" smtClean="0">
+                <a:latin typeface="+mj-lt"/>
+              </a:rPr>
+              <a:t>getting estimates of result set size!</a:t>
+            </a:r>
+            <a:endParaRPr lang="en-US" sz="3000" dirty="0">
+              <a:latin typeface="+mj-lt"/>
+            </a:endParaRPr>
+          </a:p>
+        </p:txBody>
+      </p:sp>
+    </p:spTree>
+    <p:extLst>
+      <p:ext uri="{BB962C8B-B14F-4D97-AF65-F5344CB8AC3E}">
+        <p14:creationId xmlns:p14="http://schemas.microsoft.com/office/powerpoint/2010/main" val="1929117937"/>
+      </p:ext>
+    </p:extLst>
+  </p:cSld>
+  <p:clrMapOvr>
+    <a:masterClrMapping/>
+  </p:clrMapOvr>
+  <p:timing>
+    <p:tnLst>
+      <p:par>
+        <p:cTn id="1" dur="indefinite" restart="never" nodeType="tmRoot">
+          <p:childTnLst>
+            <p:seq concurrent="1" nextAc="seek">
+              <p:cTn id="2" dur="indefinite" nodeType="mainSeq">
+                <p:childTnLst>
+                  <p:par>
+                    <p:cTn id="3" fill="hold">
+                      <p:stCondLst>
+                        <p:cond delay="indefinite"/>
+                      </p:stCondLst>
+                      <p:childTnLst>
+                        <p:par>
+                          <p:cTn id="4" fill="hold">
+                            <p:stCondLst>
+                              <p:cond delay="0"/>
+                            </p:stCondLst>
+                            <p:childTnLst>
+                              <p:par>
+                                <p:cTn id="5" presetID="1" presetClass="entr" presetSubtype="0" fill="hold" grpId="0" nodeType="clickEffect">
+                                  <p:stCondLst>
+                                    <p:cond delay="0"/>
+                                  </p:stCondLst>
+                                  <p:childTnLst>
+                                    <p:set>
+                                      <p:cBhvr>
+                                        <p:cTn id="6" dur="1" fill="hold">
+                                          <p:stCondLst>
+                                            <p:cond delay="0"/>
+                                          </p:stCondLst>
+                                        </p:cTn>
+                                        <p:tgtEl>
+                                          <p:spTgt spid="3">
+                                            <p:txEl>
+                                              <p:pRg st="0" end="0"/>
+                                            </p:txEl>
+                                          </p:spTgt>
+                                        </p:tgtEl>
+                                        <p:attrNameLst>
+                                          <p:attrName>style.visibility</p:attrName>
+                                        </p:attrNameLst>
+                                      </p:cBhvr>
+                                      <p:to>
+                                        <p:strVal val="visible"/>
+                                      </p:to>
+                                    </p:set>
+                                  </p:childTnLst>
+                                </p:cTn>
+                              </p:par>
+                            </p:childTnLst>
+                          </p:cTn>
+                        </p:par>
+                      </p:childTnLst>
+                    </p:cTn>
+                  </p:par>
+                  <p:par>
+                    <p:cTn id="7" fill="hold">
+                      <p:stCondLst>
+                        <p:cond delay="indefinite"/>
+                      </p:stCondLst>
+                      <p:childTnLst>
+                        <p:par>
+                          <p:cTn id="8" fill="hold">
+                            <p:stCondLst>
+                              <p:cond delay="0"/>
+                            </p:stCondLst>
+                            <p:childTnLst>
+                              <p:par>
+                                <p:cTn id="9" presetID="1" presetClass="entr" presetSubtype="0" fill="hold" grpId="0" nodeType="clickEffect">
+                                  <p:stCondLst>
+                                    <p:cond delay="0"/>
+                                  </p:stCondLst>
+                                  <p:childTnLst>
+                                    <p:set>
+                                      <p:cBhvr>
+                                        <p:cTn id="10" dur="1" fill="hold">
+                                          <p:stCondLst>
+                                            <p:cond delay="0"/>
+                                          </p:stCondLst>
+                                        </p:cTn>
+                                        <p:tgtEl>
+                                          <p:spTgt spid="3">
+                                            <p:txEl>
+                                              <p:pRg st="3" end="3"/>
+                                            </p:txEl>
+                                          </p:spTgt>
+                                        </p:tgtEl>
+                                        <p:attrNameLst>
+                                          <p:attrName>style.visibility</p:attrName>
+                                        </p:attrNameLst>
+                                      </p:cBhvr>
+                                      <p:to>
+                                        <p:strVal val="visible"/>
+                                      </p:to>
+                                    </p:set>
+                                  </p:childTnLst>
+                                </p:cTn>
+                              </p:par>
+                            </p:childTnLst>
+                          </p:cTn>
+                        </p:par>
+                      </p:childTnLst>
+                    </p:cTn>
+                  </p:par>
+                  <p:par>
+                    <p:cTn id="11" fill="hold">
+                      <p:stCondLst>
+                        <p:cond delay="indefinite"/>
+                      </p:stCondLst>
+                      <p:childTnLst>
+                        <p:par>
+                          <p:cTn id="12" fill="hold">
+                            <p:stCondLst>
+                              <p:cond delay="0"/>
+                            </p:stCondLst>
+                            <p:childTnLst>
+                              <p:par>
+                                <p:cTn id="13" presetID="1" presetClass="entr" presetSubtype="0" fill="hold" grpId="0" nodeType="clickEffect">
+                                  <p:stCondLst>
+                                    <p:cond delay="0"/>
+                                  </p:stCondLst>
+                                  <p:childTnLst>
+                                    <p:set>
+                                      <p:cBhvr>
+                                        <p:cTn id="14" dur="1" fill="hold">
+                                          <p:stCondLst>
+                                            <p:cond delay="0"/>
+                                          </p:stCondLst>
+                                        </p:cTn>
+                                        <p:tgtEl>
+                                          <p:spTgt spid="7"/>
+                                        </p:tgtEl>
+                                        <p:attrNameLst>
+                                          <p:attrName>style.visibility</p:attrName>
+                                        </p:attrNameLst>
+                                      </p:cBhvr>
+                                      <p:to>
+                                        <p:strVal val="visible"/>
+                                      </p:to>
+                                    </p:set>
+                                  </p:childTnLst>
+                                </p:cTn>
+                              </p:par>
+                            </p:childTnLst>
+                          </p:cTn>
+                        </p:par>
+                      </p:childTnLst>
+                    </p:cTn>
+                  </p:par>
+                </p:childTnLst>
+              </p:cTn>
+              <p:prevCondLst>
+                <p:cond evt="onPrev" delay="0">
+                  <p:tgtEl>
+                    <p:sldTgt/>
+                  </p:tgtEl>
+                </p:cond>
+              </p:prevCondLst>
+              <p:nextCondLst>
+                <p:cond evt="onNext" delay="0">
+                  <p:tgtEl>
+                    <p:sldTgt/>
+                  </p:tgtEl>
+                </p:cond>
+              </p:nextCondLst>
+            </p:seq>
+          </p:childTnLst>
+        </p:cTn>
+      </p:par>
+    </p:tnLst>
+    <p:bldLst>
+      <p:bldP spid="3" grpId="0" build="p"/>
+      <p:bldP spid="7" grpId="0" animBg="1"/>
+    </p:bldLst>
+  </p:timing>
+</p:sld>
+</file>
+
+<file path=ppt/slides/slide32.xml><?xml version="1.0" encoding="utf-8"?>
+<p:sld xmlns:a="http://schemas.openxmlformats.org/drawingml/2006/main" xmlns:r="http://schemas.openxmlformats.org/officeDocument/2006/relationships" xmlns:p="http://schemas.openxmlformats.org/presentationml/2006/main">
+  <p:cSld>
+    <p:spTree>
+      <p:nvGrpSpPr>
+        <p:cNvPr id="1" name=""/>
+        <p:cNvGrpSpPr/>
+        <p:nvPr/>
+      </p:nvGrpSpPr>
+      <p:grpSpPr>
+        <a:xfrm>
+          <a:off x="0" y="0"/>
+          <a:ext cx="0" cy="0"/>
+          <a:chOff x="0" y="0"/>
+          <a:chExt cx="0" cy="0"/>
+        </a:xfrm>
+      </p:grpSpPr>
+      <p:sp>
+        <p:nvSpPr>
+          <p:cNvPr id="2" name="Title 1"/>
+          <p:cNvSpPr>
+            <a:spLocks noGrp="1"/>
+          </p:cNvSpPr>
+          <p:nvPr>
+            <p:ph type="title"/>
+          </p:nvPr>
+        </p:nvSpPr>
+        <p:spPr/>
+        <p:txBody>
+          <a:bodyPr/>
+          <a:lstStyle/>
+          <a:p>
+            <a:r>
+              <a:rPr lang="en-US" dirty="0" smtClean="0"/>
+              <a:t>Ex: Clustered vs. </a:t>
+            </a:r>
+            <a:r>
+              <a:rPr lang="en-US" dirty="0" err="1" smtClean="0"/>
+              <a:t>Unclustered</a:t>
+            </a:r>
+            <a:endParaRPr lang="en-US" dirty="0"/>
+          </a:p>
+        </p:txBody>
+      </p:sp>
+      <p:sp>
+        <p:nvSpPr>
+          <p:cNvPr id="3" name="Content Placeholder 2"/>
+          <p:cNvSpPr>
+            <a:spLocks noGrp="1"/>
+          </p:cNvSpPr>
+          <p:nvPr>
+            <p:ph idx="1"/>
+          </p:nvPr>
+        </p:nvSpPr>
+        <p:spPr/>
+        <p:txBody>
+          <a:bodyPr>
+            <a:normAutofit/>
+          </a:bodyPr>
+          <a:lstStyle/>
+          <a:p>
+            <a:pPr marL="0" indent="0">
+              <a:buNone/>
+            </a:pPr>
+            <a:r>
+              <a:rPr lang="en-US" dirty="0" smtClean="0"/>
+              <a:t>Cost to do a range query for M entries over N-page file (P per page):</a:t>
+            </a:r>
+          </a:p>
+          <a:p>
+            <a:pPr lvl="1"/>
+            <a:endParaRPr lang="en-US" dirty="0"/>
+          </a:p>
+          <a:p>
+            <a:pPr lvl="1"/>
+            <a:r>
+              <a:rPr lang="en-US" dirty="0" smtClean="0"/>
+              <a:t>Clustered: </a:t>
+            </a:r>
+          </a:p>
+          <a:p>
+            <a:pPr lvl="2"/>
+            <a:r>
+              <a:rPr lang="en-US" sz="2400" dirty="0" smtClean="0"/>
+              <a:t>To traverse: </a:t>
+            </a:r>
+            <a:r>
+              <a:rPr lang="en-US" sz="2400" dirty="0" err="1" smtClean="0"/>
+              <a:t>Log</a:t>
+            </a:r>
+            <a:r>
+              <a:rPr lang="en-US" sz="2400" baseline="-25000" dirty="0" err="1" smtClean="0"/>
+              <a:t>F</a:t>
+            </a:r>
+            <a:r>
+              <a:rPr lang="en-US" sz="2400" dirty="0" smtClean="0"/>
+              <a:t>(1.5N)</a:t>
+            </a:r>
+          </a:p>
+          <a:p>
+            <a:pPr lvl="2"/>
+            <a:r>
+              <a:rPr lang="en-US" sz="2400" dirty="0" smtClean="0"/>
+              <a:t>To scan: 1 random IO + ceil(M/P) sequential IO</a:t>
+            </a:r>
+          </a:p>
+          <a:p>
+            <a:pPr lvl="2"/>
+            <a:endParaRPr lang="en-US" sz="2400" dirty="0"/>
+          </a:p>
+          <a:p>
+            <a:pPr lvl="1"/>
+            <a:r>
+              <a:rPr lang="en-US" dirty="0" err="1" smtClean="0"/>
+              <a:t>Unclustered</a:t>
+            </a:r>
+            <a:r>
+              <a:rPr lang="en-US" dirty="0"/>
+              <a:t>: </a:t>
+            </a:r>
+          </a:p>
+          <a:p>
+            <a:pPr lvl="2"/>
+            <a:r>
+              <a:rPr lang="en-US" sz="2400" dirty="0"/>
+              <a:t>To traverse: </a:t>
+            </a:r>
+            <a:r>
+              <a:rPr lang="en-US" sz="2400" dirty="0" err="1"/>
+              <a:t>Log</a:t>
+            </a:r>
+            <a:r>
+              <a:rPr lang="en-US" sz="2400" baseline="-25000" dirty="0" err="1"/>
+              <a:t>F</a:t>
+            </a:r>
+            <a:r>
+              <a:rPr lang="en-US" sz="2400" dirty="0"/>
+              <a:t>(1.5N)</a:t>
+            </a:r>
+          </a:p>
+          <a:p>
+            <a:pPr lvl="2"/>
+            <a:r>
+              <a:rPr lang="en-US" sz="2400" dirty="0"/>
+              <a:t>To </a:t>
+            </a:r>
+            <a:r>
+              <a:rPr lang="en-US" sz="2400" dirty="0" smtClean="0"/>
+              <a:t>scan: ~ M </a:t>
+            </a:r>
+            <a:r>
+              <a:rPr lang="en-US" sz="2400" dirty="0"/>
+              <a:t>random </a:t>
+            </a:r>
+            <a:r>
+              <a:rPr lang="en-US" sz="2400" dirty="0" smtClean="0"/>
+              <a:t>IO</a:t>
+            </a:r>
+          </a:p>
+          <a:p>
+            <a:pPr lvl="2"/>
+            <a:endParaRPr lang="en-US" dirty="0"/>
+          </a:p>
+          <a:p>
+            <a:pPr lvl="2"/>
+            <a:endParaRPr lang="en-US" dirty="0" smtClean="0"/>
+          </a:p>
+          <a:p>
+            <a:pPr lvl="1"/>
+            <a:endParaRPr lang="en-US" dirty="0"/>
+          </a:p>
+        </p:txBody>
+      </p:sp>
+      <p:grpSp>
+        <p:nvGrpSpPr>
+          <p:cNvPr id="4" name="Group 3"/>
+          <p:cNvGrpSpPr/>
+          <p:nvPr/>
+        </p:nvGrpSpPr>
+        <p:grpSpPr>
+          <a:xfrm>
+            <a:off x="0" y="-22510"/>
+            <a:ext cx="12192000" cy="307777"/>
+            <a:chOff x="0" y="-22510"/>
+            <a:chExt cx="12192000" cy="307777"/>
+          </a:xfrm>
+        </p:grpSpPr>
+        <p:sp>
+          <p:nvSpPr>
+            <p:cNvPr id="5" name="Rectangle 4"/>
+            <p:cNvSpPr/>
+            <p:nvPr/>
+          </p:nvSpPr>
+          <p:spPr>
+            <a:xfrm>
+              <a:off x="0" y="0"/>
+              <a:ext cx="12192000" cy="262759"/>
+            </a:xfrm>
+            <a:prstGeom prst="rect">
+              <a:avLst/>
+            </a:prstGeom>
+            <a:solidFill>
+              <a:schemeClr val="bg2"/>
+            </a:solidFill>
+            <a:ln>
+              <a:noFill/>
+            </a:ln>
+          </p:spPr>
+          <p:style>
+            <a:lnRef idx="2">
+              <a:schemeClr val="accent1">
+                <a:shade val="50000"/>
+              </a:schemeClr>
+            </a:lnRef>
+            <a:fillRef idx="1">
+              <a:schemeClr val="accent1"/>
+            </a:fillRef>
+            <a:effectRef idx="0">
+              <a:schemeClr val="accent1"/>
+            </a:effectRef>
+            <a:fontRef idx="minor">
+              <a:schemeClr val="lt1"/>
+            </a:fontRef>
+          </p:style>
+          <p:txBody>
+            <a:bodyPr rtlCol="0" anchor="ctr"/>
+            <a:lstStyle/>
+            <a:p>
+              <a:pPr algn="r"/>
+              <a:endParaRPr lang="en-US" sz="1400" b="1" i="1" dirty="0">
+                <a:solidFill>
+                  <a:schemeClr val="tx1">
+                    <a:lumMod val="65000"/>
+                    <a:lumOff val="35000"/>
+                  </a:schemeClr>
+                </a:solidFill>
+                <a:latin typeface="+mj-lt"/>
+              </a:endParaRPr>
+            </a:p>
+          </p:txBody>
+        </p:sp>
+        <p:sp>
+          <p:nvSpPr>
+            <p:cNvPr id="6" name="TextBox 5"/>
+            <p:cNvSpPr txBox="1"/>
+            <p:nvPr/>
+          </p:nvSpPr>
+          <p:spPr>
+            <a:xfrm>
+              <a:off x="188780" y="-22510"/>
+              <a:ext cx="3164456" cy="307777"/>
+            </a:xfrm>
+            <a:prstGeom prst="rect">
+              <a:avLst/>
+            </a:prstGeom>
+            <a:noFill/>
+          </p:spPr>
+          <p:txBody>
+            <a:bodyPr wrap="none" rtlCol="0">
+              <a:spAutoFit/>
+            </a:bodyPr>
+            <a:lstStyle/>
+            <a:p>
+              <a:r>
+                <a:rPr lang="en-US" sz="1400" b="1" i="1" dirty="0" smtClean="0">
+                  <a:solidFill>
+                    <a:schemeClr val="tx1">
+                      <a:lumMod val="65000"/>
+                      <a:lumOff val="35000"/>
+                    </a:schemeClr>
+                  </a:solidFill>
+                  <a:latin typeface="+mj-lt"/>
+                </a:rPr>
+                <a:t>Lecture 17  &gt;  Section 2  &gt;  Index Selection</a:t>
+              </a:r>
+              <a:endParaRPr lang="en-US" sz="1400" b="1" i="1" dirty="0">
+                <a:solidFill>
+                  <a:schemeClr val="tx1">
+                    <a:lumMod val="65000"/>
+                    <a:lumOff val="35000"/>
+                  </a:schemeClr>
+                </a:solidFill>
+                <a:latin typeface="+mj-lt"/>
+              </a:endParaRPr>
+            </a:p>
+          </p:txBody>
+        </p:sp>
+      </p:grpSp>
+      <p:sp>
+        <p:nvSpPr>
+          <p:cNvPr id="7" name="TextBox 6"/>
+          <p:cNvSpPr txBox="1"/>
+          <p:nvPr/>
+        </p:nvSpPr>
+        <p:spPr>
+          <a:xfrm>
+            <a:off x="8698327" y="2708477"/>
+            <a:ext cx="3092621" cy="1569660"/>
+          </a:xfrm>
+          <a:prstGeom prst="rect">
+            <a:avLst/>
+          </a:prstGeom>
+          <a:solidFill>
+            <a:schemeClr val="accent4">
+              <a:lumMod val="20000"/>
+              <a:lumOff val="80000"/>
+            </a:schemeClr>
+          </a:solidFill>
+          <a:effectLst>
+            <a:outerShdw blurRad="50800" dist="12700" dir="2700000" algn="tl" rotWithShape="0">
+              <a:prstClr val="black">
+                <a:alpha val="40000"/>
+              </a:prstClr>
+            </a:outerShdw>
+          </a:effectLst>
+        </p:spPr>
+        <p:txBody>
+          <a:bodyPr wrap="square" rtlCol="0">
+            <a:spAutoFit/>
+          </a:bodyPr>
+          <a:lstStyle/>
+          <a:p>
+            <a:r>
+              <a:rPr lang="en-US" sz="2400" dirty="0" smtClean="0">
+                <a:latin typeface="+mj-lt"/>
+              </a:rPr>
+              <a:t>Suppose we are using a B+ Tree index with:</a:t>
+            </a:r>
+          </a:p>
+          <a:p>
+            <a:pPr marL="342900" indent="-342900">
+              <a:buFont typeface="Arial" charset="0"/>
+              <a:buChar char="•"/>
+            </a:pPr>
+            <a:r>
+              <a:rPr lang="en-US" sz="2400" dirty="0" err="1" smtClean="0">
+                <a:latin typeface="+mj-lt"/>
+              </a:rPr>
+              <a:t>Fanout</a:t>
+            </a:r>
+            <a:r>
+              <a:rPr lang="en-US" sz="2400" dirty="0" smtClean="0">
+                <a:latin typeface="+mj-lt"/>
+              </a:rPr>
+              <a:t> F (=2d)</a:t>
+            </a:r>
+          </a:p>
+          <a:p>
+            <a:pPr marL="342900" indent="-342900">
+              <a:buFont typeface="Arial" charset="0"/>
+              <a:buChar char="•"/>
+            </a:pPr>
+            <a:r>
+              <a:rPr lang="en-US" sz="2400" dirty="0" smtClean="0">
+                <a:latin typeface="+mj-lt"/>
+              </a:rPr>
+              <a:t>Fill factor 1.5</a:t>
+            </a:r>
+          </a:p>
+        </p:txBody>
+      </p:sp>
+    </p:spTree>
+    <p:extLst>
+      <p:ext uri="{BB962C8B-B14F-4D97-AF65-F5344CB8AC3E}">
+        <p14:creationId xmlns:p14="http://schemas.microsoft.com/office/powerpoint/2010/main" val="187545206"/>
+      </p:ext>
+    </p:extLst>
+  </p:cSld>
+  <p:clrMapOvr>
+    <a:masterClrMapping/>
+  </p:clrMapOvr>
+  <p:timing>
+    <p:tnLst>
+      <p:par>
+        <p:cTn id="1" dur="indefinite" restart="never" nodeType="tmRoot">
+          <p:childTnLst>
+            <p:seq concurrent="1" nextAc="seek">
+              <p:cTn id="2" dur="indefinite" nodeType="mainSeq">
+                <p:childTnLst>
+                  <p:par>
+                    <p:cTn id="3" fill="hold">
+                      <p:stCondLst>
+                        <p:cond delay="indefinite"/>
+                      </p:stCondLst>
+                      <p:childTnLst>
+                        <p:par>
+                          <p:cTn id="4" fill="hold">
+                            <p:stCondLst>
+                              <p:cond delay="0"/>
+                            </p:stCondLst>
+                            <p:childTnLst>
+                              <p:par>
+                                <p:cTn id="5" presetID="1" presetClass="entr" presetSubtype="0" fill="hold" grpId="0" nodeType="clickEffect">
+                                  <p:stCondLst>
+                                    <p:cond delay="0"/>
+                                  </p:stCondLst>
+                                  <p:childTnLst>
+                                    <p:set>
+                                      <p:cBhvr>
+                                        <p:cTn id="6" dur="1" fill="hold">
+                                          <p:stCondLst>
+                                            <p:cond delay="0"/>
+                                          </p:stCondLst>
+                                        </p:cTn>
+                                        <p:tgtEl>
+                                          <p:spTgt spid="3">
+                                            <p:txEl>
+                                              <p:pRg st="0" end="0"/>
+                                            </p:txEl>
+                                          </p:spTgt>
+                                        </p:tgtEl>
+                                        <p:attrNameLst>
+                                          <p:attrName>style.visibility</p:attrName>
+                                        </p:attrNameLst>
+                                      </p:cBhvr>
+                                      <p:to>
+                                        <p:strVal val="visible"/>
+                                      </p:to>
+                                    </p:set>
+                                  </p:childTnLst>
+                                </p:cTn>
+                              </p:par>
+                            </p:childTnLst>
+                          </p:cTn>
+                        </p:par>
+                      </p:childTnLst>
+                    </p:cTn>
+                  </p:par>
+                  <p:par>
+                    <p:cTn id="7" fill="hold">
+                      <p:stCondLst>
+                        <p:cond delay="indefinite"/>
+                      </p:stCondLst>
+                      <p:childTnLst>
+                        <p:par>
+                          <p:cTn id="8" fill="hold">
+                            <p:stCondLst>
+                              <p:cond delay="0"/>
+                            </p:stCondLst>
+                            <p:childTnLst>
+                              <p:par>
+                                <p:cTn id="9" presetID="1" presetClass="entr" presetSubtype="0" fill="hold" grpId="0" nodeType="clickEffect">
+                                  <p:stCondLst>
+                                    <p:cond delay="0"/>
+                                  </p:stCondLst>
+                                  <p:childTnLst>
+                                    <p:set>
+                                      <p:cBhvr>
+                                        <p:cTn id="10" dur="1" fill="hold">
+                                          <p:stCondLst>
+                                            <p:cond delay="0"/>
+                                          </p:stCondLst>
+                                        </p:cTn>
+                                        <p:tgtEl>
+                                          <p:spTgt spid="7"/>
+                                        </p:tgtEl>
+                                        <p:attrNameLst>
+                                          <p:attrName>style.visibility</p:attrName>
+                                        </p:attrNameLst>
+                                      </p:cBhvr>
+                                      <p:to>
+                                        <p:strVal val="visible"/>
+                                      </p:to>
+                                    </p:set>
+                                  </p:childTnLst>
+                                </p:cTn>
+                              </p:par>
+                            </p:childTnLst>
+                          </p:cTn>
+                        </p:par>
+                      </p:childTnLst>
+                    </p:cTn>
+                  </p:par>
+                  <p:par>
+                    <p:cTn id="11" fill="hold">
+                      <p:stCondLst>
+                        <p:cond delay="indefinite"/>
+                      </p:stCondLst>
+                      <p:childTnLst>
+                        <p:par>
+                          <p:cTn id="12" fill="hold">
+                            <p:stCondLst>
+                              <p:cond delay="0"/>
+                            </p:stCondLst>
+                            <p:childTnLst>
+                              <p:par>
+                                <p:cTn id="13" presetID="1" presetClass="entr" presetSubtype="0" fill="hold" grpId="0" nodeType="clickEffect">
+                                  <p:stCondLst>
+                                    <p:cond delay="0"/>
+                                  </p:stCondLst>
+                                  <p:childTnLst>
+                                    <p:set>
+                                      <p:cBhvr>
+                                        <p:cTn id="14" dur="1" fill="hold">
+                                          <p:stCondLst>
+                                            <p:cond delay="0"/>
+                                          </p:stCondLst>
+                                        </p:cTn>
+                                        <p:tgtEl>
+                                          <p:spTgt spid="3">
+                                            <p:txEl>
+                                              <p:pRg st="2" end="2"/>
+                                            </p:txEl>
+                                          </p:spTgt>
+                                        </p:tgtEl>
+                                        <p:attrNameLst>
+                                          <p:attrName>style.visibility</p:attrName>
+                                        </p:attrNameLst>
+                                      </p:cBhvr>
+                                      <p:to>
+                                        <p:strVal val="visible"/>
+                                      </p:to>
+                                    </p:set>
+                                  </p:childTnLst>
+                                </p:cTn>
+                              </p:par>
+                              <p:par>
+                                <p:cTn id="15" presetID="1" presetClass="entr" presetSubtype="0" fill="hold" grpId="0" nodeType="withEffect">
+                                  <p:stCondLst>
+                                    <p:cond delay="0"/>
+                                  </p:stCondLst>
+                                  <p:childTnLst>
+                                    <p:set>
+                                      <p:cBhvr>
+                                        <p:cTn id="16" dur="1" fill="hold">
+                                          <p:stCondLst>
+                                            <p:cond delay="0"/>
+                                          </p:stCondLst>
+                                        </p:cTn>
+                                        <p:tgtEl>
+                                          <p:spTgt spid="3">
+                                            <p:txEl>
+                                              <p:pRg st="3" end="3"/>
+                                            </p:txEl>
+                                          </p:spTgt>
+                                        </p:tgtEl>
+                                        <p:attrNameLst>
+                                          <p:attrName>style.visibility</p:attrName>
+                                        </p:attrNameLst>
+                                      </p:cBhvr>
+                                      <p:to>
+                                        <p:strVal val="visible"/>
+                                      </p:to>
+                                    </p:set>
+                                  </p:childTnLst>
+                                </p:cTn>
+                              </p:par>
+                              <p:par>
+                                <p:cTn id="17" presetID="1" presetClass="entr" presetSubtype="0" fill="hold" grpId="0" nodeType="withEffect">
+                                  <p:stCondLst>
+                                    <p:cond delay="0"/>
+                                  </p:stCondLst>
+                                  <p:childTnLst>
+                                    <p:set>
+                                      <p:cBhvr>
+                                        <p:cTn id="18" dur="1" fill="hold">
+                                          <p:stCondLst>
+                                            <p:cond delay="0"/>
+                                          </p:stCondLst>
+                                        </p:cTn>
+                                        <p:tgtEl>
+                                          <p:spTgt spid="3">
+                                            <p:txEl>
+                                              <p:pRg st="4" end="4"/>
+                                            </p:txEl>
+                                          </p:spTgt>
+                                        </p:tgtEl>
+                                        <p:attrNameLst>
+                                          <p:attrName>style.visibility</p:attrName>
+                                        </p:attrNameLst>
+                                      </p:cBhvr>
+                                      <p:to>
+                                        <p:strVal val="visible"/>
+                                      </p:to>
+                                    </p:set>
+                                  </p:childTnLst>
+                                </p:cTn>
+                              </p:par>
+                            </p:childTnLst>
+                          </p:cTn>
+                        </p:par>
+                      </p:childTnLst>
+                    </p:cTn>
+                  </p:par>
+                  <p:par>
+                    <p:cTn id="19" fill="hold">
+                      <p:stCondLst>
+                        <p:cond delay="indefinite"/>
+                      </p:stCondLst>
+                      <p:childTnLst>
+                        <p:par>
+                          <p:cTn id="20" fill="hold">
+                            <p:stCondLst>
+                              <p:cond delay="0"/>
+                            </p:stCondLst>
+                            <p:childTnLst>
+                              <p:par>
+                                <p:cTn id="21" presetID="1" presetClass="entr" presetSubtype="0" fill="hold" grpId="0" nodeType="clickEffect">
+                                  <p:stCondLst>
+                                    <p:cond delay="0"/>
+                                  </p:stCondLst>
+                                  <p:childTnLst>
+                                    <p:set>
+                                      <p:cBhvr>
+                                        <p:cTn id="22" dur="1" fill="hold">
+                                          <p:stCondLst>
+                                            <p:cond delay="0"/>
+                                          </p:stCondLst>
+                                        </p:cTn>
+                                        <p:tgtEl>
+                                          <p:spTgt spid="3">
+                                            <p:txEl>
+                                              <p:pRg st="6" end="6"/>
+                                            </p:txEl>
+                                          </p:spTgt>
+                                        </p:tgtEl>
+                                        <p:attrNameLst>
+                                          <p:attrName>style.visibility</p:attrName>
+                                        </p:attrNameLst>
+                                      </p:cBhvr>
+                                      <p:to>
+                                        <p:strVal val="visible"/>
+                                      </p:to>
+                                    </p:set>
+                                  </p:childTnLst>
+                                </p:cTn>
+                              </p:par>
+                              <p:par>
+                                <p:cTn id="23" presetID="1" presetClass="entr" presetSubtype="0" fill="hold" grpId="0" nodeType="withEffect">
+                                  <p:stCondLst>
+                                    <p:cond delay="0"/>
+                                  </p:stCondLst>
+                                  <p:childTnLst>
+                                    <p:set>
+                                      <p:cBhvr>
+                                        <p:cTn id="24" dur="1" fill="hold">
+                                          <p:stCondLst>
+                                            <p:cond delay="0"/>
+                                          </p:stCondLst>
+                                        </p:cTn>
+                                        <p:tgtEl>
+                                          <p:spTgt spid="3">
+                                            <p:txEl>
+                                              <p:pRg st="7" end="7"/>
+                                            </p:txEl>
+                                          </p:spTgt>
+                                        </p:tgtEl>
+                                        <p:attrNameLst>
+                                          <p:attrName>style.visibility</p:attrName>
+                                        </p:attrNameLst>
+                                      </p:cBhvr>
+                                      <p:to>
+                                        <p:strVal val="visible"/>
+                                      </p:to>
+                                    </p:set>
+                                  </p:childTnLst>
+                                </p:cTn>
+                              </p:par>
+                              <p:par>
+                                <p:cTn id="25" presetID="1" presetClass="entr" presetSubtype="0" fill="hold" grpId="0" nodeType="withEffect">
+                                  <p:stCondLst>
+                                    <p:cond delay="0"/>
+                                  </p:stCondLst>
+                                  <p:childTnLst>
+                                    <p:set>
+                                      <p:cBhvr>
+                                        <p:cTn id="26" dur="1" fill="hold">
+                                          <p:stCondLst>
+                                            <p:cond delay="0"/>
+                                          </p:stCondLst>
+                                        </p:cTn>
+                                        <p:tgtEl>
+                                          <p:spTgt spid="3">
+                                            <p:txEl>
+                                              <p:pRg st="8" end="8"/>
+                                            </p:txEl>
+                                          </p:spTgt>
+                                        </p:tgtEl>
+                                        <p:attrNameLst>
+                                          <p:attrName>style.visibility</p:attrName>
+                                        </p:attrNameLst>
+                                      </p:cBhvr>
+                                      <p:to>
+                                        <p:strVal val="visible"/>
+                                      </p:to>
+                                    </p:set>
+                                  </p:childTnLst>
+                                </p:cTn>
+                              </p:par>
+                            </p:childTnLst>
+                          </p:cTn>
+                        </p:par>
+                      </p:childTnLst>
+                    </p:cTn>
+                  </p:par>
+                </p:childTnLst>
+              </p:cTn>
+              <p:prevCondLst>
+                <p:cond evt="onPrev" delay="0">
+                  <p:tgtEl>
+                    <p:sldTgt/>
+                  </p:tgtEl>
+                </p:cond>
+              </p:prevCondLst>
+              <p:nextCondLst>
+                <p:cond evt="onNext" delay="0">
+                  <p:tgtEl>
+                    <p:sldTgt/>
+                  </p:tgtEl>
+                </p:cond>
+              </p:nextCondLst>
+            </p:seq>
+          </p:childTnLst>
+        </p:cTn>
+      </p:par>
+    </p:tnLst>
+    <p:bldLst>
+      <p:bldP spid="3" grpId="0" uiExpand="1" build="p" bldLvl="2"/>
+      <p:bldP spid="7" grpId="0" animBg="1"/>
+    </p:bldLst>
+  </p:timing>
+</p:sld>
+</file>
+
+<file path=ppt/slides/slide33.xml><?xml version="1.0" encoding="utf-8"?>
+<p:sld xmlns:a="http://schemas.openxmlformats.org/drawingml/2006/main" xmlns:r="http://schemas.openxmlformats.org/officeDocument/2006/relationships" xmlns:p="http://schemas.openxmlformats.org/presentationml/2006/main">
+  <p:cSld>
+    <p:spTree>
+      <p:nvGrpSpPr>
+        <p:cNvPr id="1" name=""/>
+        <p:cNvGrpSpPr/>
+        <p:nvPr/>
+      </p:nvGrpSpPr>
+      <p:grpSpPr>
+        <a:xfrm>
+          <a:off x="0" y="0"/>
+          <a:ext cx="0" cy="0"/>
+          <a:chOff x="0" y="0"/>
+          <a:chExt cx="0" cy="0"/>
+        </a:xfrm>
+      </p:grpSpPr>
+      <p:sp>
+        <p:nvSpPr>
+          <p:cNvPr id="2" name="Title 1"/>
+          <p:cNvSpPr>
+            <a:spLocks noGrp="1"/>
+          </p:cNvSpPr>
+          <p:nvPr>
+            <p:ph type="title"/>
+          </p:nvPr>
+        </p:nvSpPr>
+        <p:spPr/>
+        <p:txBody>
+          <a:bodyPr/>
+          <a:lstStyle/>
+          <a:p>
+            <a:r>
+              <a:rPr lang="en-US" dirty="0" smtClean="0"/>
+              <a:t>Plugging in some numbers</a:t>
+            </a:r>
+            <a:endParaRPr lang="en-US" dirty="0"/>
+          </a:p>
+        </p:txBody>
+      </p:sp>
+      <p:sp>
+        <p:nvSpPr>
+          <p:cNvPr id="3" name="Content Placeholder 2"/>
+          <p:cNvSpPr>
+            <a:spLocks noGrp="1"/>
+          </p:cNvSpPr>
+          <p:nvPr>
+            <p:ph idx="1"/>
+          </p:nvPr>
+        </p:nvSpPr>
+        <p:spPr>
+          <a:xfrm>
+            <a:off x="838200" y="1825625"/>
+            <a:ext cx="10515600" cy="3708901"/>
+          </a:xfrm>
+        </p:spPr>
+        <p:txBody>
+          <a:bodyPr>
+            <a:normAutofit fontScale="92500" lnSpcReduction="20000"/>
+          </a:bodyPr>
+          <a:lstStyle/>
+          <a:p>
+            <a:r>
+              <a:rPr lang="en-US" dirty="0" smtClean="0"/>
+              <a:t>Clustered: </a:t>
+            </a:r>
+          </a:p>
+          <a:p>
+            <a:pPr lvl="1"/>
+            <a:r>
+              <a:rPr lang="en-US" sz="2800" dirty="0" smtClean="0"/>
+              <a:t>To traverse: </a:t>
+            </a:r>
+            <a:r>
+              <a:rPr lang="en-US" sz="2800" dirty="0" err="1" smtClean="0"/>
+              <a:t>Log</a:t>
+            </a:r>
+            <a:r>
+              <a:rPr lang="en-US" sz="2800" baseline="-25000" dirty="0" err="1" smtClean="0"/>
+              <a:t>F</a:t>
+            </a:r>
+            <a:r>
+              <a:rPr lang="en-US" sz="2800" dirty="0" smtClean="0"/>
+              <a:t>(1.5N)</a:t>
+            </a:r>
+          </a:p>
+          <a:p>
+            <a:pPr lvl="1"/>
+            <a:r>
+              <a:rPr lang="en-US" sz="2800" b="1" dirty="0" smtClean="0"/>
+              <a:t>To scan: 1 random IO + ceil(M/P) sequential IO</a:t>
+            </a:r>
+          </a:p>
+          <a:p>
+            <a:pPr lvl="1"/>
+            <a:endParaRPr lang="en-US" sz="2800" dirty="0"/>
+          </a:p>
+          <a:p>
+            <a:r>
+              <a:rPr lang="en-US" dirty="0" err="1" smtClean="0"/>
+              <a:t>Unclustered</a:t>
+            </a:r>
+            <a:r>
+              <a:rPr lang="en-US" dirty="0"/>
+              <a:t>: </a:t>
+            </a:r>
+          </a:p>
+          <a:p>
+            <a:pPr lvl="1"/>
+            <a:r>
+              <a:rPr lang="en-US" sz="2800" dirty="0"/>
+              <a:t>To traverse: </a:t>
+            </a:r>
+            <a:r>
+              <a:rPr lang="en-US" sz="2800" dirty="0" err="1"/>
+              <a:t>Log</a:t>
+            </a:r>
+            <a:r>
+              <a:rPr lang="en-US" sz="2800" baseline="-25000" dirty="0" err="1"/>
+              <a:t>F</a:t>
+            </a:r>
+            <a:r>
+              <a:rPr lang="en-US" sz="2800" dirty="0"/>
+              <a:t>(1.5N)</a:t>
+            </a:r>
+          </a:p>
+          <a:p>
+            <a:pPr lvl="1"/>
+            <a:r>
+              <a:rPr lang="en-US" sz="2800" b="1" dirty="0"/>
+              <a:t>To </a:t>
+            </a:r>
+            <a:r>
+              <a:rPr lang="en-US" sz="2800" b="1" dirty="0" smtClean="0"/>
+              <a:t>scan: ~ M </a:t>
+            </a:r>
+            <a:r>
+              <a:rPr lang="en-US" sz="2800" b="1" dirty="0"/>
+              <a:t>random </a:t>
+            </a:r>
+            <a:r>
+              <a:rPr lang="en-US" sz="2800" b="1" dirty="0" smtClean="0"/>
+              <a:t>IO</a:t>
+            </a:r>
+          </a:p>
+          <a:p>
+            <a:pPr marL="914400" lvl="2" indent="0">
+              <a:buNone/>
+            </a:pPr>
+            <a:endParaRPr lang="en-US" sz="2400" b="1" dirty="0" smtClean="0"/>
+          </a:p>
+          <a:p>
+            <a:r>
+              <a:rPr lang="en-US" sz="3200" dirty="0" smtClean="0"/>
+              <a:t>If M = 1, then there is no difference!</a:t>
+            </a:r>
+          </a:p>
+          <a:p>
+            <a:r>
+              <a:rPr lang="en-US" sz="3200" dirty="0" smtClean="0"/>
+              <a:t>If M = 100,000 records, then difference is ~10min. Vs. 10ms!</a:t>
+            </a:r>
+          </a:p>
+          <a:p>
+            <a:pPr lvl="2"/>
+            <a:endParaRPr lang="en-US" dirty="0"/>
+          </a:p>
+          <a:p>
+            <a:pPr lvl="2"/>
+            <a:endParaRPr lang="en-US" dirty="0" smtClean="0"/>
+          </a:p>
+          <a:p>
+            <a:pPr lvl="1"/>
+            <a:endParaRPr lang="en-US" dirty="0"/>
+          </a:p>
+        </p:txBody>
+      </p:sp>
+      <p:grpSp>
+        <p:nvGrpSpPr>
+          <p:cNvPr id="4" name="Group 3"/>
+          <p:cNvGrpSpPr/>
+          <p:nvPr/>
+        </p:nvGrpSpPr>
+        <p:grpSpPr>
+          <a:xfrm>
+            <a:off x="0" y="-22510"/>
+            <a:ext cx="12192000" cy="307777"/>
+            <a:chOff x="0" y="-22510"/>
+            <a:chExt cx="12192000" cy="307777"/>
+          </a:xfrm>
+        </p:grpSpPr>
+        <p:sp>
+          <p:nvSpPr>
+            <p:cNvPr id="5" name="Rectangle 4"/>
+            <p:cNvSpPr/>
+            <p:nvPr/>
+          </p:nvSpPr>
+          <p:spPr>
+            <a:xfrm>
+              <a:off x="0" y="0"/>
+              <a:ext cx="12192000" cy="262759"/>
+            </a:xfrm>
+            <a:prstGeom prst="rect">
+              <a:avLst/>
+            </a:prstGeom>
+            <a:solidFill>
+              <a:schemeClr val="bg2"/>
+            </a:solidFill>
+            <a:ln>
+              <a:noFill/>
+            </a:ln>
+          </p:spPr>
+          <p:style>
+            <a:lnRef idx="2">
+              <a:schemeClr val="accent1">
+                <a:shade val="50000"/>
+              </a:schemeClr>
+            </a:lnRef>
+            <a:fillRef idx="1">
+              <a:schemeClr val="accent1"/>
+            </a:fillRef>
+            <a:effectRef idx="0">
+              <a:schemeClr val="accent1"/>
+            </a:effectRef>
+            <a:fontRef idx="minor">
+              <a:schemeClr val="lt1"/>
+            </a:fontRef>
+          </p:style>
+          <p:txBody>
+            <a:bodyPr rtlCol="0" anchor="ctr"/>
+            <a:lstStyle/>
+            <a:p>
+              <a:pPr algn="r"/>
+              <a:endParaRPr lang="en-US" sz="1400" b="1" i="1" dirty="0">
+                <a:solidFill>
+                  <a:schemeClr val="tx1">
+                    <a:lumMod val="65000"/>
+                    <a:lumOff val="35000"/>
+                  </a:schemeClr>
+                </a:solidFill>
+                <a:latin typeface="+mj-lt"/>
+              </a:endParaRPr>
+            </a:p>
+          </p:txBody>
+        </p:sp>
+        <p:sp>
+          <p:nvSpPr>
+            <p:cNvPr id="6" name="TextBox 5"/>
+            <p:cNvSpPr txBox="1"/>
+            <p:nvPr/>
+          </p:nvSpPr>
+          <p:spPr>
+            <a:xfrm>
+              <a:off x="188780" y="-22510"/>
+              <a:ext cx="3164456" cy="307777"/>
+            </a:xfrm>
+            <a:prstGeom prst="rect">
+              <a:avLst/>
+            </a:prstGeom>
+            <a:noFill/>
+          </p:spPr>
+          <p:txBody>
+            <a:bodyPr wrap="none" rtlCol="0">
+              <a:spAutoFit/>
+            </a:bodyPr>
+            <a:lstStyle/>
+            <a:p>
+              <a:r>
+                <a:rPr lang="en-US" sz="1400" b="1" i="1" dirty="0" smtClean="0">
+                  <a:solidFill>
+                    <a:schemeClr val="tx1">
+                      <a:lumMod val="65000"/>
+                      <a:lumOff val="35000"/>
+                    </a:schemeClr>
+                  </a:solidFill>
+                  <a:latin typeface="+mj-lt"/>
+                </a:rPr>
+                <a:t>Lecture 17  &gt;  Section 2  &gt;  Index Selection</a:t>
+              </a:r>
+              <a:endParaRPr lang="en-US" sz="1400" b="1" i="1" dirty="0">
+                <a:solidFill>
+                  <a:schemeClr val="tx1">
+                    <a:lumMod val="65000"/>
+                    <a:lumOff val="35000"/>
+                  </a:schemeClr>
+                </a:solidFill>
+                <a:latin typeface="+mj-lt"/>
+              </a:endParaRPr>
+            </a:p>
+          </p:txBody>
+        </p:sp>
+      </p:grpSp>
+      <p:sp>
+        <p:nvSpPr>
+          <p:cNvPr id="7" name="TextBox 6"/>
+          <p:cNvSpPr txBox="1"/>
+          <p:nvPr/>
+        </p:nvSpPr>
+        <p:spPr>
+          <a:xfrm>
+            <a:off x="8698327" y="772871"/>
+            <a:ext cx="3092621" cy="1200329"/>
+          </a:xfrm>
+          <a:prstGeom prst="rect">
+            <a:avLst/>
+          </a:prstGeom>
+          <a:solidFill>
+            <a:schemeClr val="accent4">
+              <a:lumMod val="20000"/>
+              <a:lumOff val="80000"/>
+            </a:schemeClr>
+          </a:solidFill>
+          <a:effectLst>
+            <a:outerShdw blurRad="50800" dist="12700" dir="2700000" algn="tl" rotWithShape="0">
+              <a:prstClr val="black">
+                <a:alpha val="40000"/>
+              </a:prstClr>
+            </a:outerShdw>
+          </a:effectLst>
+        </p:spPr>
+        <p:txBody>
+          <a:bodyPr wrap="square" rtlCol="0">
+            <a:spAutoFit/>
+          </a:bodyPr>
+          <a:lstStyle/>
+          <a:p>
+            <a:r>
+              <a:rPr lang="en-US" sz="2400" dirty="0" smtClean="0">
+                <a:latin typeface="+mj-lt"/>
+              </a:rPr>
+              <a:t>To simplify:</a:t>
+            </a:r>
+          </a:p>
+          <a:p>
+            <a:pPr marL="342900" indent="-342900">
+              <a:buFont typeface="Arial" charset="0"/>
+              <a:buChar char="•"/>
+            </a:pPr>
+            <a:r>
+              <a:rPr lang="en-US" sz="2400" dirty="0" smtClean="0">
+                <a:latin typeface="+mj-lt"/>
+              </a:rPr>
+              <a:t>Random IO = ~10ms</a:t>
+            </a:r>
+          </a:p>
+          <a:p>
+            <a:pPr marL="342900" indent="-342900">
+              <a:buFont typeface="Arial" charset="0"/>
+              <a:buChar char="•"/>
+            </a:pPr>
+            <a:r>
+              <a:rPr lang="en-US" sz="2400" dirty="0" smtClean="0">
+                <a:latin typeface="+mj-lt"/>
+              </a:rPr>
+              <a:t>Sequential IO = free</a:t>
+            </a:r>
+            <a:endParaRPr lang="en-US" sz="2400" dirty="0" smtClean="0">
+              <a:latin typeface="+mj-lt"/>
+            </a:endParaRPr>
+          </a:p>
+        </p:txBody>
+      </p:sp>
+      <p:sp>
+        <p:nvSpPr>
+          <p:cNvPr id="8" name="TextBox 7"/>
+          <p:cNvSpPr txBox="1"/>
+          <p:nvPr/>
+        </p:nvSpPr>
+        <p:spPr>
+          <a:xfrm>
+            <a:off x="8698326" y="2573700"/>
+            <a:ext cx="3092621" cy="461665"/>
+          </a:xfrm>
+          <a:prstGeom prst="rect">
+            <a:avLst/>
+          </a:prstGeom>
+          <a:solidFill>
+            <a:schemeClr val="accent4">
+              <a:lumMod val="20000"/>
+              <a:lumOff val="80000"/>
+            </a:schemeClr>
+          </a:solidFill>
+          <a:effectLst>
+            <a:outerShdw blurRad="50800" dist="12700" dir="2700000" algn="tl" rotWithShape="0">
+              <a:prstClr val="black">
+                <a:alpha val="40000"/>
+              </a:prstClr>
+            </a:outerShdw>
+          </a:effectLst>
+        </p:spPr>
+        <p:txBody>
+          <a:bodyPr wrap="square" rtlCol="0">
+            <a:spAutoFit/>
+          </a:bodyPr>
+          <a:lstStyle/>
+          <a:p>
+            <a:r>
+              <a:rPr lang="en-US" sz="2400" smtClean="0">
+                <a:latin typeface="+mj-lt"/>
+              </a:rPr>
+              <a:t>~ 1 random IO = 10ms</a:t>
+            </a:r>
+            <a:endParaRPr lang="en-US" sz="2400" dirty="0" smtClean="0">
+              <a:latin typeface="+mj-lt"/>
+            </a:endParaRPr>
+          </a:p>
+        </p:txBody>
+      </p:sp>
+      <p:sp>
+        <p:nvSpPr>
+          <p:cNvPr id="9" name="TextBox 8"/>
+          <p:cNvSpPr txBox="1"/>
+          <p:nvPr/>
+        </p:nvSpPr>
+        <p:spPr>
+          <a:xfrm>
+            <a:off x="8265694" y="3783440"/>
+            <a:ext cx="3525253" cy="461665"/>
+          </a:xfrm>
+          <a:prstGeom prst="rect">
+            <a:avLst/>
+          </a:prstGeom>
+          <a:solidFill>
+            <a:schemeClr val="accent4">
+              <a:lumMod val="20000"/>
+              <a:lumOff val="80000"/>
+            </a:schemeClr>
+          </a:solidFill>
+          <a:effectLst>
+            <a:outerShdw blurRad="50800" dist="12700" dir="2700000" algn="tl" rotWithShape="0">
+              <a:prstClr val="black">
+                <a:alpha val="40000"/>
+              </a:prstClr>
+            </a:outerShdw>
+          </a:effectLst>
+        </p:spPr>
+        <p:txBody>
+          <a:bodyPr wrap="square" rtlCol="0">
+            <a:spAutoFit/>
+          </a:bodyPr>
+          <a:lstStyle/>
+          <a:p>
+            <a:r>
+              <a:rPr lang="en-US" sz="2400" smtClean="0">
+                <a:latin typeface="+mj-lt"/>
+              </a:rPr>
+              <a:t>~ </a:t>
+            </a:r>
+            <a:r>
+              <a:rPr lang="en-US" sz="2400" b="1" i="1" smtClean="0">
+                <a:latin typeface="+mj-lt"/>
+              </a:rPr>
+              <a:t>M</a:t>
+            </a:r>
+            <a:r>
+              <a:rPr lang="en-US" sz="2400" smtClean="0">
+                <a:latin typeface="+mj-lt"/>
+              </a:rPr>
+              <a:t> random IO = M*10ms</a:t>
+            </a:r>
+            <a:endParaRPr lang="en-US" sz="2400" dirty="0" smtClean="0">
+              <a:latin typeface="+mj-lt"/>
+            </a:endParaRPr>
+          </a:p>
+        </p:txBody>
+      </p:sp>
+      <p:sp>
+        <p:nvSpPr>
+          <p:cNvPr id="10" name="TextBox 9"/>
+          <p:cNvSpPr txBox="1"/>
+          <p:nvPr/>
+        </p:nvSpPr>
+        <p:spPr>
+          <a:xfrm>
+            <a:off x="2970245" y="5828078"/>
             <a:ext cx="6251510" cy="553998"/>
           </a:xfrm>
           <a:prstGeom prst="rect">
@@ -23494,7 +24876,7 @@
               <a:rPr lang="en-US" sz="3000" dirty="0" smtClean="0">
                 <a:latin typeface="+mj-lt"/>
               </a:rPr>
-              <a:t>We can use histograms…</a:t>
+              <a:t>If only we had good estimates of M…</a:t>
             </a:r>
             <a:endParaRPr lang="en-US" sz="3000" dirty="0">
               <a:latin typeface="+mj-lt"/>
@@ -23505,7 +24887,7 @@
     </p:spTree>
     <p:extLst>
       <p:ext uri="{BB962C8B-B14F-4D97-AF65-F5344CB8AC3E}">
-        <p14:creationId xmlns:p14="http://schemas.microsoft.com/office/powerpoint/2010/main" val="1929117937"/>
+        <p14:creationId xmlns:p14="http://schemas.microsoft.com/office/powerpoint/2010/main" val="1004550067"/>
       </p:ext>
     </p:extLst>
   </p:cSld>
@@ -23565,6 +24947,425 @@
                       </p:childTnLst>
                     </p:cTn>
                   </p:par>
+                  <p:par>
+                    <p:cTn id="7" fill="hold">
+                      <p:stCondLst>
+                        <p:cond delay="indefinite"/>
+                      </p:stCondLst>
+                      <p:childTnLst>
+                        <p:par>
+                          <p:cTn id="8" fill="hold">
+                            <p:stCondLst>
+                              <p:cond delay="0"/>
+                            </p:stCondLst>
+                            <p:childTnLst>
+                              <p:par>
+                                <p:cTn id="9" presetID="1" presetClass="entr" presetSubtype="0" fill="hold" grpId="0" nodeType="clickEffect">
+                                  <p:stCondLst>
+                                    <p:cond delay="0"/>
+                                  </p:stCondLst>
+                                  <p:childTnLst>
+                                    <p:set>
+                                      <p:cBhvr>
+                                        <p:cTn id="10" dur="1" fill="hold">
+                                          <p:stCondLst>
+                                            <p:cond delay="0"/>
+                                          </p:stCondLst>
+                                        </p:cTn>
+                                        <p:tgtEl>
+                                          <p:spTgt spid="3">
+                                            <p:txEl>
+                                              <p:pRg st="0" end="0"/>
+                                            </p:txEl>
+                                          </p:spTgt>
+                                        </p:tgtEl>
+                                        <p:attrNameLst>
+                                          <p:attrName>style.visibility</p:attrName>
+                                        </p:attrNameLst>
+                                      </p:cBhvr>
+                                      <p:to>
+                                        <p:strVal val="visible"/>
+                                      </p:to>
+                                    </p:set>
+                                  </p:childTnLst>
+                                </p:cTn>
+                              </p:par>
+                              <p:par>
+                                <p:cTn id="11" presetID="1" presetClass="entr" presetSubtype="0" fill="hold" grpId="0" nodeType="withEffect">
+                                  <p:stCondLst>
+                                    <p:cond delay="0"/>
+                                  </p:stCondLst>
+                                  <p:childTnLst>
+                                    <p:set>
+                                      <p:cBhvr>
+                                        <p:cTn id="12" dur="1" fill="hold">
+                                          <p:stCondLst>
+                                            <p:cond delay="0"/>
+                                          </p:stCondLst>
+                                        </p:cTn>
+                                        <p:tgtEl>
+                                          <p:spTgt spid="3">
+                                            <p:txEl>
+                                              <p:pRg st="1" end="1"/>
+                                            </p:txEl>
+                                          </p:spTgt>
+                                        </p:tgtEl>
+                                        <p:attrNameLst>
+                                          <p:attrName>style.visibility</p:attrName>
+                                        </p:attrNameLst>
+                                      </p:cBhvr>
+                                      <p:to>
+                                        <p:strVal val="visible"/>
+                                      </p:to>
+                                    </p:set>
+                                  </p:childTnLst>
+                                </p:cTn>
+                              </p:par>
+                              <p:par>
+                                <p:cTn id="13" presetID="1" presetClass="entr" presetSubtype="0" fill="hold" grpId="0" nodeType="withEffect">
+                                  <p:stCondLst>
+                                    <p:cond delay="0"/>
+                                  </p:stCondLst>
+                                  <p:childTnLst>
+                                    <p:set>
+                                      <p:cBhvr>
+                                        <p:cTn id="14" dur="1" fill="hold">
+                                          <p:stCondLst>
+                                            <p:cond delay="0"/>
+                                          </p:stCondLst>
+                                        </p:cTn>
+                                        <p:tgtEl>
+                                          <p:spTgt spid="3">
+                                            <p:txEl>
+                                              <p:pRg st="2" end="2"/>
+                                            </p:txEl>
+                                          </p:spTgt>
+                                        </p:tgtEl>
+                                        <p:attrNameLst>
+                                          <p:attrName>style.visibility</p:attrName>
+                                        </p:attrNameLst>
+                                      </p:cBhvr>
+                                      <p:to>
+                                        <p:strVal val="visible"/>
+                                      </p:to>
+                                    </p:set>
+                                  </p:childTnLst>
+                                </p:cTn>
+                              </p:par>
+                              <p:par>
+                                <p:cTn id="15" presetID="1" presetClass="entr" presetSubtype="0" fill="hold" grpId="0" nodeType="withEffect">
+                                  <p:stCondLst>
+                                    <p:cond delay="0"/>
+                                  </p:stCondLst>
+                                  <p:childTnLst>
+                                    <p:set>
+                                      <p:cBhvr>
+                                        <p:cTn id="16" dur="1" fill="hold">
+                                          <p:stCondLst>
+                                            <p:cond delay="0"/>
+                                          </p:stCondLst>
+                                        </p:cTn>
+                                        <p:tgtEl>
+                                          <p:spTgt spid="8"/>
+                                        </p:tgtEl>
+                                        <p:attrNameLst>
+                                          <p:attrName>style.visibility</p:attrName>
+                                        </p:attrNameLst>
+                                      </p:cBhvr>
+                                      <p:to>
+                                        <p:strVal val="visible"/>
+                                      </p:to>
+                                    </p:set>
+                                  </p:childTnLst>
+                                </p:cTn>
+                              </p:par>
+                            </p:childTnLst>
+                          </p:cTn>
+                        </p:par>
+                      </p:childTnLst>
+                    </p:cTn>
+                  </p:par>
+                  <p:par>
+                    <p:cTn id="17" fill="hold">
+                      <p:stCondLst>
+                        <p:cond delay="indefinite"/>
+                      </p:stCondLst>
+                      <p:childTnLst>
+                        <p:par>
+                          <p:cTn id="18" fill="hold">
+                            <p:stCondLst>
+                              <p:cond delay="0"/>
+                            </p:stCondLst>
+                            <p:childTnLst>
+                              <p:par>
+                                <p:cTn id="19" presetID="1" presetClass="entr" presetSubtype="0" fill="hold" grpId="0" nodeType="clickEffect">
+                                  <p:stCondLst>
+                                    <p:cond delay="0"/>
+                                  </p:stCondLst>
+                                  <p:childTnLst>
+                                    <p:set>
+                                      <p:cBhvr>
+                                        <p:cTn id="20" dur="1" fill="hold">
+                                          <p:stCondLst>
+                                            <p:cond delay="0"/>
+                                          </p:stCondLst>
+                                        </p:cTn>
+                                        <p:tgtEl>
+                                          <p:spTgt spid="3">
+                                            <p:txEl>
+                                              <p:pRg st="4" end="4"/>
+                                            </p:txEl>
+                                          </p:spTgt>
+                                        </p:tgtEl>
+                                        <p:attrNameLst>
+                                          <p:attrName>style.visibility</p:attrName>
+                                        </p:attrNameLst>
+                                      </p:cBhvr>
+                                      <p:to>
+                                        <p:strVal val="visible"/>
+                                      </p:to>
+                                    </p:set>
+                                  </p:childTnLst>
+                                </p:cTn>
+                              </p:par>
+                              <p:par>
+                                <p:cTn id="21" presetID="1" presetClass="entr" presetSubtype="0" fill="hold" grpId="0" nodeType="withEffect">
+                                  <p:stCondLst>
+                                    <p:cond delay="0"/>
+                                  </p:stCondLst>
+                                  <p:childTnLst>
+                                    <p:set>
+                                      <p:cBhvr>
+                                        <p:cTn id="22" dur="1" fill="hold">
+                                          <p:stCondLst>
+                                            <p:cond delay="0"/>
+                                          </p:stCondLst>
+                                        </p:cTn>
+                                        <p:tgtEl>
+                                          <p:spTgt spid="3">
+                                            <p:txEl>
+                                              <p:pRg st="5" end="5"/>
+                                            </p:txEl>
+                                          </p:spTgt>
+                                        </p:tgtEl>
+                                        <p:attrNameLst>
+                                          <p:attrName>style.visibility</p:attrName>
+                                        </p:attrNameLst>
+                                      </p:cBhvr>
+                                      <p:to>
+                                        <p:strVal val="visible"/>
+                                      </p:to>
+                                    </p:set>
+                                  </p:childTnLst>
+                                </p:cTn>
+                              </p:par>
+                              <p:par>
+                                <p:cTn id="23" presetID="1" presetClass="entr" presetSubtype="0" fill="hold" grpId="0" nodeType="withEffect">
+                                  <p:stCondLst>
+                                    <p:cond delay="0"/>
+                                  </p:stCondLst>
+                                  <p:childTnLst>
+                                    <p:set>
+                                      <p:cBhvr>
+                                        <p:cTn id="24" dur="1" fill="hold">
+                                          <p:stCondLst>
+                                            <p:cond delay="0"/>
+                                          </p:stCondLst>
+                                        </p:cTn>
+                                        <p:tgtEl>
+                                          <p:spTgt spid="3">
+                                            <p:txEl>
+                                              <p:pRg st="6" end="6"/>
+                                            </p:txEl>
+                                          </p:spTgt>
+                                        </p:tgtEl>
+                                        <p:attrNameLst>
+                                          <p:attrName>style.visibility</p:attrName>
+                                        </p:attrNameLst>
+                                      </p:cBhvr>
+                                      <p:to>
+                                        <p:strVal val="visible"/>
+                                      </p:to>
+                                    </p:set>
+                                  </p:childTnLst>
+                                </p:cTn>
+                              </p:par>
+                              <p:par>
+                                <p:cTn id="25" presetID="1" presetClass="entr" presetSubtype="0" fill="hold" grpId="0" nodeType="withEffect">
+                                  <p:stCondLst>
+                                    <p:cond delay="0"/>
+                                  </p:stCondLst>
+                                  <p:childTnLst>
+                                    <p:set>
+                                      <p:cBhvr>
+                                        <p:cTn id="26" dur="1" fill="hold">
+                                          <p:stCondLst>
+                                            <p:cond delay="0"/>
+                                          </p:stCondLst>
+                                        </p:cTn>
+                                        <p:tgtEl>
+                                          <p:spTgt spid="9"/>
+                                        </p:tgtEl>
+                                        <p:attrNameLst>
+                                          <p:attrName>style.visibility</p:attrName>
+                                        </p:attrNameLst>
+                                      </p:cBhvr>
+                                      <p:to>
+                                        <p:strVal val="visible"/>
+                                      </p:to>
+                                    </p:set>
+                                  </p:childTnLst>
+                                </p:cTn>
+                              </p:par>
+                            </p:childTnLst>
+                          </p:cTn>
+                        </p:par>
+                      </p:childTnLst>
+                    </p:cTn>
+                  </p:par>
+                  <p:par>
+                    <p:cTn id="27" fill="hold">
+                      <p:stCondLst>
+                        <p:cond delay="indefinite"/>
+                      </p:stCondLst>
+                      <p:childTnLst>
+                        <p:par>
+                          <p:cTn id="28" fill="hold">
+                            <p:stCondLst>
+                              <p:cond delay="0"/>
+                            </p:stCondLst>
+                            <p:childTnLst>
+                              <p:par>
+                                <p:cTn id="29" presetID="1" presetClass="entr" presetSubtype="0" fill="hold" grpId="0" nodeType="clickEffect">
+                                  <p:stCondLst>
+                                    <p:cond delay="0"/>
+                                  </p:stCondLst>
+                                  <p:childTnLst>
+                                    <p:set>
+                                      <p:cBhvr>
+                                        <p:cTn id="30" dur="1" fill="hold">
+                                          <p:stCondLst>
+                                            <p:cond delay="0"/>
+                                          </p:stCondLst>
+                                        </p:cTn>
+                                        <p:tgtEl>
+                                          <p:spTgt spid="3">
+                                            <p:txEl>
+                                              <p:pRg st="8" end="8"/>
+                                            </p:txEl>
+                                          </p:spTgt>
+                                        </p:tgtEl>
+                                        <p:attrNameLst>
+                                          <p:attrName>style.visibility</p:attrName>
+                                        </p:attrNameLst>
+                                      </p:cBhvr>
+                                      <p:to>
+                                        <p:strVal val="visible"/>
+                                      </p:to>
+                                    </p:set>
+                                  </p:childTnLst>
+                                </p:cTn>
+                              </p:par>
+                            </p:childTnLst>
+                          </p:cTn>
+                        </p:par>
+                      </p:childTnLst>
+                    </p:cTn>
+                  </p:par>
+                  <p:par>
+                    <p:cTn id="31" fill="hold">
+                      <p:stCondLst>
+                        <p:cond delay="indefinite"/>
+                      </p:stCondLst>
+                      <p:childTnLst>
+                        <p:par>
+                          <p:cTn id="32" fill="hold">
+                            <p:stCondLst>
+                              <p:cond delay="0"/>
+                            </p:stCondLst>
+                            <p:childTnLst>
+                              <p:par>
+                                <p:cTn id="33" presetID="1" presetClass="entr" presetSubtype="0" fill="hold" grpId="0" nodeType="clickEffect">
+                                  <p:stCondLst>
+                                    <p:cond delay="0"/>
+                                  </p:stCondLst>
+                                  <p:childTnLst>
+                                    <p:set>
+                                      <p:cBhvr>
+                                        <p:cTn id="34" dur="1" fill="hold">
+                                          <p:stCondLst>
+                                            <p:cond delay="0"/>
+                                          </p:stCondLst>
+                                        </p:cTn>
+                                        <p:tgtEl>
+                                          <p:spTgt spid="3">
+                                            <p:txEl>
+                                              <p:pRg st="9" end="9"/>
+                                            </p:txEl>
+                                          </p:spTgt>
+                                        </p:tgtEl>
+                                        <p:attrNameLst>
+                                          <p:attrName>style.visibility</p:attrName>
+                                        </p:attrNameLst>
+                                      </p:cBhvr>
+                                      <p:to>
+                                        <p:strVal val="visible"/>
+                                      </p:to>
+                                    </p:set>
+                                  </p:childTnLst>
+                                </p:cTn>
+                              </p:par>
+                            </p:childTnLst>
+                          </p:cTn>
+                        </p:par>
+                      </p:childTnLst>
+                    </p:cTn>
+                  </p:par>
+                  <p:par>
+                    <p:cTn id="35" fill="hold">
+                      <p:stCondLst>
+                        <p:cond delay="indefinite"/>
+                      </p:stCondLst>
+                      <p:childTnLst>
+                        <p:par>
+                          <p:cTn id="36" fill="hold">
+                            <p:stCondLst>
+                              <p:cond delay="0"/>
+                            </p:stCondLst>
+                            <p:childTnLst>
+                              <p:par>
+                                <p:cTn id="37" presetID="1" presetClass="entr" presetSubtype="0" fill="hold" grpId="0" nodeType="clickEffect">
+                                  <p:stCondLst>
+                                    <p:cond delay="0"/>
+                                  </p:stCondLst>
+                                  <p:childTnLst>
+                                    <p:set>
+                                      <p:cBhvr>
+                                        <p:cTn id="38" dur="1" fill="hold">
+                                          <p:stCondLst>
+                                            <p:cond delay="0"/>
+                                          </p:stCondLst>
+                                        </p:cTn>
+                                        <p:tgtEl>
+                                          <p:spTgt spid="10"/>
+                                        </p:tgtEl>
+                                        <p:attrNameLst>
+                                          <p:attrName>style.visibility</p:attrName>
+                                        </p:attrNameLst>
+                                      </p:cBhvr>
+                                      <p:to>
+                                        <p:strVal val="visible"/>
+                                      </p:to>
+                                    </p:set>
+                                  </p:childTnLst>
+                                </p:cTn>
+                              </p:par>
+                            </p:childTnLst>
+                          </p:cTn>
+                        </p:par>
+                      </p:childTnLst>
+                    </p:cTn>
+                  </p:par>
                 </p:childTnLst>
               </p:cTn>
               <p:prevCondLst>
@@ -23587,13 +25388,17 @@
       </p:par>
     </p:tnLst>
     <p:bldLst>
+      <p:bldP spid="3" grpId="0" uiExpand="1" build="p"/>
       <p:bldP spid="7" grpId="0" animBg="1"/>
+      <p:bldP spid="8" grpId="0" animBg="1"/>
+      <p:bldP spid="9" grpId="0" animBg="1"/>
+      <p:bldP spid="10" grpId="0" animBg="1"/>
     </p:bldLst>
   </p:timing>
 </p:sld>
 </file>
 
-<file path=ppt/slides/slide32.xml><?xml version="1.0" encoding="utf-8"?>
+<file path=ppt/slides/slide34.xml><?xml version="1.0" encoding="utf-8"?>
 <p:sld xmlns:a="http://schemas.openxmlformats.org/drawingml/2006/main" xmlns:r="http://schemas.openxmlformats.org/officeDocument/2006/relationships" xmlns:p="http://schemas.openxmlformats.org/presentationml/2006/main">
   <p:cSld>
     <p:spTree>
@@ -23657,7 +25462,7 @@
           <a:p>
             <a:fld id="{40A01959-B587-3B45-A9B3-C17F42F09305}" type="slidenum">
               <a:rPr lang="en-US" smtClean="0"/>
-              <a:t>32</a:t>
+              <a:t>34</a:t>
             </a:fld>
             <a:endParaRPr lang="en-US"/>
           </a:p>
@@ -23798,7 +25603,7 @@
 </p:sld>
 </file>
 
-<file path=ppt/slides/slide33.xml><?xml version="1.0" encoding="utf-8"?>
+<file path=ppt/slides/slide35.xml><?xml version="1.0" encoding="utf-8"?>
 <p:sld xmlns:a="http://schemas.openxmlformats.org/drawingml/2006/main" xmlns:r="http://schemas.openxmlformats.org/officeDocument/2006/relationships" xmlns:p="http://schemas.openxmlformats.org/presentationml/2006/main">
   <p:cSld>
     <p:spTree>
@@ -23858,7 +25663,7 @@
             </p:spPr>
             <p:txBody>
               <a:bodyPr>
-                <a:normAutofit/>
+                <a:normAutofit fontScale="92500"/>
               </a:bodyPr>
               <a:lstStyle/>
               <a:p>
@@ -23893,15 +25698,7 @@
                 </a:r>
                 <a:r>
                   <a:rPr lang="en-US" b="1" dirty="0" smtClean="0"/>
-                  <a:t>deciding </a:t>
-                </a:r>
-                <a:r>
-                  <a:rPr lang="en-US" b="1" dirty="0" smtClean="0"/>
-                  <a:t>which algorithm to </a:t>
-                </a:r>
-                <a:r>
-                  <a:rPr lang="en-US" b="1" dirty="0" smtClean="0"/>
-                  <a:t>use</a:t>
+                  <a:t>deciding which algorithm to use</a:t>
                 </a:r>
                 <a:r>
                   <a:rPr lang="en-US" dirty="0" smtClean="0"/>
@@ -23912,23 +25709,7 @@
                 <a:pPr lvl="1"/>
                 <a:r>
                   <a:rPr lang="en-US" dirty="0" smtClean="0"/>
-                  <a:t>Ex</a:t>
-                </a:r>
-                <a:r>
-                  <a:rPr lang="en-US" dirty="0" smtClean="0"/>
-                  <a:t>: </a:t>
-                </a:r>
-                <a:r>
-                  <a:rPr lang="en-US" dirty="0" smtClean="0"/>
-                  <a:t>To</a:t>
-                </a:r>
-                <a:r>
-                  <a:rPr lang="en-US" dirty="0" smtClean="0"/>
-                  <a:t> </a:t>
-                </a:r>
-                <a:r>
-                  <a:rPr lang="en-US" dirty="0" smtClean="0"/>
-                  <a:t>execute </a:t>
+                  <a:t>Ex: To execute </a:t>
                 </a:r>
                 <a14:m>
                   <m:oMath xmlns:m="http://schemas.openxmlformats.org/officeDocument/2006/math">
@@ -23963,15 +25744,7 @@
                 </a14:m>
                 <a:r>
                   <a:rPr lang="en-US" dirty="0" smtClean="0"/>
-                  <a:t>, which join algorithm </a:t>
-                </a:r>
-                <a:r>
-                  <a:rPr lang="en-US" dirty="0" smtClean="0"/>
-                  <a:t>should DBMS use</a:t>
-                </a:r>
-                <a:r>
-                  <a:rPr lang="en-US" dirty="0" smtClean="0"/>
-                  <a:t>?</a:t>
+                  <a:t>, which join algorithm should DBMS use?</a:t>
                 </a:r>
                 <a:endParaRPr lang="en-US" dirty="0"/>
               </a:p>
@@ -23983,11 +25756,7 @@
                 <a:pPr lvl="1"/>
                 <a:r>
                   <a:rPr lang="en-US" b="1" dirty="0" smtClean="0"/>
-                  <a:t>What </a:t>
-                </a:r>
-                <a:r>
-                  <a:rPr lang="en-US" b="1" dirty="0" smtClean="0"/>
-                  <a:t>if we want to compute </a:t>
+                  <a:t>What if we want to compute </a:t>
                 </a:r>
                 <a14:m>
                   <m:oMath xmlns:m="http://schemas.openxmlformats.org/officeDocument/2006/math">
@@ -24154,14 +25923,9 @@
                 <a:endParaRPr lang="en-US" dirty="0" smtClean="0"/>
               </a:p>
               <a:p>
-                <a:pPr lvl="1"/>
                 <a:r>
                   <a:rPr lang="en-US" dirty="0" smtClean="0"/>
-                  <a:t>In </a:t>
-                </a:r>
-                <a:r>
-                  <a:rPr lang="en-US" dirty="0" smtClean="0"/>
-                  <a:t>general, we will need some way to </a:t>
+                  <a:t>In general, we will need some way to </a:t>
                 </a:r>
                 <a:r>
                   <a:rPr lang="en-US" b="1" i="1" dirty="0" smtClean="0"/>
@@ -24199,7 +25963,7 @@
               <a:blipFill rotWithShape="0">
                 <a:blip r:embed="rId2"/>
                 <a:stretch>
-                  <a:fillRect l="-1043" t="-2632" b="-3125"/>
+                  <a:fillRect l="-928" t="-2467" r="-870" b="-658"/>
                 </a:stretch>
               </a:blipFill>
             </p:spPr>
@@ -24471,7 +26235,7 @@
 </p:sld>
 </file>
 
-<file path=ppt/slides/slide34.xml><?xml version="1.0" encoding="utf-8"?>
+<file path=ppt/slides/slide36.xml><?xml version="1.0" encoding="utf-8"?>
 <p:sld xmlns:a="http://schemas.openxmlformats.org/drawingml/2006/main" xmlns:r="http://schemas.openxmlformats.org/officeDocument/2006/relationships" xmlns:p="http://schemas.openxmlformats.org/presentationml/2006/main">
   <p:cSld>
     <p:spTree>
@@ -25146,7 +26910,7 @@
 </p:sld>
 </file>
 
-<file path=ppt/slides/slide35.xml><?xml version="1.0" encoding="utf-8"?>
+<file path=ppt/slides/slide37.xml><?xml version="1.0" encoding="utf-8"?>
 <p:sld xmlns:a="http://schemas.openxmlformats.org/drawingml/2006/main" xmlns:r="http://schemas.openxmlformats.org/officeDocument/2006/relationships" xmlns:p="http://schemas.openxmlformats.org/presentationml/2006/main">
   <p:cSld>
     <p:spTree>
@@ -25629,7 +27393,7 @@
 </p:sld>
 </file>
 
-<file path=ppt/slides/slide36.xml><?xml version="1.0" encoding="utf-8"?>
+<file path=ppt/slides/slide38.xml><?xml version="1.0" encoding="utf-8"?>
 <p:sld xmlns:a="http://schemas.openxmlformats.org/drawingml/2006/main" xmlns:r="http://schemas.openxmlformats.org/officeDocument/2006/relationships" xmlns:p="http://schemas.openxmlformats.org/presentationml/2006/main">
   <p:cSld>
     <p:spTree>
@@ -25941,7 +27705,7 @@
 </p:sld>
 </file>
 
-<file path=ppt/slides/slide37.xml><?xml version="1.0" encoding="utf-8"?>
+<file path=ppt/slides/slide39.xml><?xml version="1.0" encoding="utf-8"?>
 <p:sld xmlns:a="http://schemas.openxmlformats.org/drawingml/2006/main" xmlns:r="http://schemas.openxmlformats.org/officeDocument/2006/relationships" xmlns:p="http://schemas.openxmlformats.org/presentationml/2006/main">
   <p:cSld>
     <p:spTree>
@@ -26284,7 +28048,212 @@
 </p:sld>
 </file>
 
-<file path=ppt/slides/slide38.xml><?xml version="1.0" encoding="utf-8"?>
+<file path=ppt/slides/slide4.xml><?xml version="1.0" encoding="utf-8"?>
+<p:sld xmlns:a="http://schemas.openxmlformats.org/drawingml/2006/main" xmlns:r="http://schemas.openxmlformats.org/officeDocument/2006/relationships" xmlns:p="http://schemas.openxmlformats.org/presentationml/2006/main">
+  <p:cSld>
+    <p:spTree>
+      <p:nvGrpSpPr>
+        <p:cNvPr id="1" name=""/>
+        <p:cNvGrpSpPr/>
+        <p:nvPr/>
+      </p:nvGrpSpPr>
+      <p:grpSpPr>
+        <a:xfrm>
+          <a:off x="0" y="0"/>
+          <a:ext cx="0" cy="0"/>
+          <a:chOff x="0" y="0"/>
+          <a:chExt cx="0" cy="0"/>
+        </a:xfrm>
+      </p:grpSpPr>
+      <p:sp>
+        <p:nvSpPr>
+          <p:cNvPr id="2" name="Title 1"/>
+          <p:cNvSpPr>
+            <a:spLocks noGrp="1"/>
+          </p:cNvSpPr>
+          <p:nvPr>
+            <p:ph type="title"/>
+          </p:nvPr>
+        </p:nvSpPr>
+        <p:spPr/>
+        <p:txBody>
+          <a:bodyPr/>
+          <a:lstStyle/>
+          <a:p>
+            <a:r>
+              <a:rPr lang="en-US" dirty="0"/>
+              <a:t>1</a:t>
+            </a:r>
+            <a:r>
+              <a:rPr lang="en-US" dirty="0" smtClean="0"/>
+              <a:t>. Logical Optimization</a:t>
+            </a:r>
+            <a:endParaRPr lang="en-US" dirty="0"/>
+          </a:p>
+        </p:txBody>
+      </p:sp>
+      <p:sp>
+        <p:nvSpPr>
+          <p:cNvPr id="4" name="Slide Number Placeholder 3"/>
+          <p:cNvSpPr>
+            <a:spLocks noGrp="1"/>
+          </p:cNvSpPr>
+          <p:nvPr>
+            <p:ph type="sldNum" sz="quarter" idx="12"/>
+          </p:nvPr>
+        </p:nvSpPr>
+        <p:spPr/>
+        <p:txBody>
+          <a:bodyPr/>
+          <a:lstStyle/>
+          <a:p>
+            <a:fld id="{40A01959-B587-3B45-A9B3-C17F42F09305}" type="slidenum">
+              <a:rPr lang="en-US" smtClean="0"/>
+              <a:t>4</a:t>
+            </a:fld>
+            <a:endParaRPr lang="en-US"/>
+          </a:p>
+        </p:txBody>
+      </p:sp>
+      <p:grpSp>
+        <p:nvGrpSpPr>
+          <p:cNvPr id="5" name="Group 4"/>
+          <p:cNvGrpSpPr/>
+          <p:nvPr/>
+        </p:nvGrpSpPr>
+        <p:grpSpPr>
+          <a:xfrm>
+            <a:off x="0" y="-22510"/>
+            <a:ext cx="12192000" cy="307777"/>
+            <a:chOff x="0" y="-22510"/>
+            <a:chExt cx="12192000" cy="307777"/>
+          </a:xfrm>
+        </p:grpSpPr>
+        <p:sp>
+          <p:nvSpPr>
+            <p:cNvPr id="6" name="Rectangle 5"/>
+            <p:cNvSpPr/>
+            <p:nvPr/>
+          </p:nvSpPr>
+          <p:spPr>
+            <a:xfrm>
+              <a:off x="0" y="0"/>
+              <a:ext cx="12192000" cy="262759"/>
+            </a:xfrm>
+            <a:prstGeom prst="rect">
+              <a:avLst/>
+            </a:prstGeom>
+            <a:solidFill>
+              <a:schemeClr val="bg2"/>
+            </a:solidFill>
+            <a:ln>
+              <a:noFill/>
+            </a:ln>
+          </p:spPr>
+          <p:style>
+            <a:lnRef idx="2">
+              <a:schemeClr val="accent1">
+                <a:shade val="50000"/>
+              </a:schemeClr>
+            </a:lnRef>
+            <a:fillRef idx="1">
+              <a:schemeClr val="accent1"/>
+            </a:fillRef>
+            <a:effectRef idx="0">
+              <a:schemeClr val="accent1"/>
+            </a:effectRef>
+            <a:fontRef idx="minor">
+              <a:schemeClr val="lt1"/>
+            </a:fontRef>
+          </p:style>
+          <p:txBody>
+            <a:bodyPr rtlCol="0" anchor="ctr"/>
+            <a:lstStyle/>
+            <a:p>
+              <a:pPr algn="r"/>
+              <a:endParaRPr lang="en-US" sz="1400" b="1" i="1" dirty="0">
+                <a:solidFill>
+                  <a:schemeClr val="tx1">
+                    <a:lumMod val="65000"/>
+                    <a:lumOff val="35000"/>
+                  </a:schemeClr>
+                </a:solidFill>
+                <a:latin typeface="+mj-lt"/>
+              </a:endParaRPr>
+            </a:p>
+          </p:txBody>
+        </p:sp>
+        <p:sp>
+          <p:nvSpPr>
+            <p:cNvPr id="7" name="TextBox 6"/>
+            <p:cNvSpPr txBox="1"/>
+            <p:nvPr/>
+          </p:nvSpPr>
+          <p:spPr>
+            <a:xfrm>
+              <a:off x="188780" y="-22510"/>
+              <a:ext cx="1843774" cy="307777"/>
+            </a:xfrm>
+            <a:prstGeom prst="rect">
+              <a:avLst/>
+            </a:prstGeom>
+            <a:noFill/>
+          </p:spPr>
+          <p:txBody>
+            <a:bodyPr wrap="none" rtlCol="0">
+              <a:spAutoFit/>
+            </a:bodyPr>
+            <a:lstStyle/>
+            <a:p>
+              <a:r>
+                <a:rPr lang="en-US" sz="1400" b="1" i="1" dirty="0" smtClean="0">
+                  <a:solidFill>
+                    <a:schemeClr val="tx1">
+                      <a:lumMod val="65000"/>
+                      <a:lumOff val="35000"/>
+                    </a:schemeClr>
+                  </a:solidFill>
+                  <a:latin typeface="+mj-lt"/>
+                </a:rPr>
+                <a:t>Lecture 17  &gt;  Section </a:t>
+              </a:r>
+              <a:r>
+                <a:rPr lang="en-US" sz="1400" b="1" i="1" dirty="0">
+                  <a:solidFill>
+                    <a:schemeClr val="tx1">
+                      <a:lumMod val="65000"/>
+                      <a:lumOff val="35000"/>
+                    </a:schemeClr>
+                  </a:solidFill>
+                  <a:latin typeface="+mj-lt"/>
+                </a:rPr>
+                <a:t>1</a:t>
+              </a:r>
+            </a:p>
+          </p:txBody>
+        </p:sp>
+      </p:grpSp>
+    </p:spTree>
+    <p:extLst>
+      <p:ext uri="{BB962C8B-B14F-4D97-AF65-F5344CB8AC3E}">
+        <p14:creationId xmlns:p14="http://schemas.microsoft.com/office/powerpoint/2010/main" val="424444777"/>
+      </p:ext>
+    </p:extLst>
+  </p:cSld>
+  <p:clrMapOvr>
+    <a:masterClrMapping/>
+  </p:clrMapOvr>
+  <p:timing>
+    <p:tnLst>
+      <p:par>
+        <p:cTn id="1" dur="indefinite" restart="never" nodeType="tmRoot"/>
+      </p:par>
+    </p:tnLst>
+  </p:timing>
+</p:sld>
+</file>
+
+<file path=ppt/slides/slide40.xml><?xml version="1.0" encoding="utf-8"?>
 <p:sld xmlns:a="http://schemas.openxmlformats.org/drawingml/2006/main" xmlns:r="http://schemas.openxmlformats.org/officeDocument/2006/relationships" xmlns:p="http://schemas.openxmlformats.org/presentationml/2006/main">
   <p:cSld>
     <p:spTree>
@@ -27662,7 +29631,7 @@
 </p:sld>
 </file>
 
-<file path=ppt/slides/slide39.xml><?xml version="1.0" encoding="utf-8"?>
+<file path=ppt/slides/slide41.xml><?xml version="1.0" encoding="utf-8"?>
 <p:sld xmlns:a="http://schemas.openxmlformats.org/drawingml/2006/main" xmlns:r="http://schemas.openxmlformats.org/officeDocument/2006/relationships" xmlns:p="http://schemas.openxmlformats.org/presentationml/2006/main">
   <p:cSld>
     <p:spTree>
@@ -29026,212 +30995,7 @@
 </p:sld>
 </file>
 
-<file path=ppt/slides/slide4.xml><?xml version="1.0" encoding="utf-8"?>
-<p:sld xmlns:a="http://schemas.openxmlformats.org/drawingml/2006/main" xmlns:r="http://schemas.openxmlformats.org/officeDocument/2006/relationships" xmlns:p="http://schemas.openxmlformats.org/presentationml/2006/main">
-  <p:cSld>
-    <p:spTree>
-      <p:nvGrpSpPr>
-        <p:cNvPr id="1" name=""/>
-        <p:cNvGrpSpPr/>
-        <p:nvPr/>
-      </p:nvGrpSpPr>
-      <p:grpSpPr>
-        <a:xfrm>
-          <a:off x="0" y="0"/>
-          <a:ext cx="0" cy="0"/>
-          <a:chOff x="0" y="0"/>
-          <a:chExt cx="0" cy="0"/>
-        </a:xfrm>
-      </p:grpSpPr>
-      <p:sp>
-        <p:nvSpPr>
-          <p:cNvPr id="2" name="Title 1"/>
-          <p:cNvSpPr>
-            <a:spLocks noGrp="1"/>
-          </p:cNvSpPr>
-          <p:nvPr>
-            <p:ph type="title"/>
-          </p:nvPr>
-        </p:nvSpPr>
-        <p:spPr/>
-        <p:txBody>
-          <a:bodyPr/>
-          <a:lstStyle/>
-          <a:p>
-            <a:r>
-              <a:rPr lang="en-US" dirty="0"/>
-              <a:t>1</a:t>
-            </a:r>
-            <a:r>
-              <a:rPr lang="en-US" dirty="0" smtClean="0"/>
-              <a:t>. Logical Optimization</a:t>
-            </a:r>
-            <a:endParaRPr lang="en-US" dirty="0"/>
-          </a:p>
-        </p:txBody>
-      </p:sp>
-      <p:sp>
-        <p:nvSpPr>
-          <p:cNvPr id="4" name="Slide Number Placeholder 3"/>
-          <p:cNvSpPr>
-            <a:spLocks noGrp="1"/>
-          </p:cNvSpPr>
-          <p:nvPr>
-            <p:ph type="sldNum" sz="quarter" idx="12"/>
-          </p:nvPr>
-        </p:nvSpPr>
-        <p:spPr/>
-        <p:txBody>
-          <a:bodyPr/>
-          <a:lstStyle/>
-          <a:p>
-            <a:fld id="{40A01959-B587-3B45-A9B3-C17F42F09305}" type="slidenum">
-              <a:rPr lang="en-US" smtClean="0"/>
-              <a:t>4</a:t>
-            </a:fld>
-            <a:endParaRPr lang="en-US"/>
-          </a:p>
-        </p:txBody>
-      </p:sp>
-      <p:grpSp>
-        <p:nvGrpSpPr>
-          <p:cNvPr id="5" name="Group 4"/>
-          <p:cNvGrpSpPr/>
-          <p:nvPr/>
-        </p:nvGrpSpPr>
-        <p:grpSpPr>
-          <a:xfrm>
-            <a:off x="0" y="-22510"/>
-            <a:ext cx="12192000" cy="307777"/>
-            <a:chOff x="0" y="-22510"/>
-            <a:chExt cx="12192000" cy="307777"/>
-          </a:xfrm>
-        </p:grpSpPr>
-        <p:sp>
-          <p:nvSpPr>
-            <p:cNvPr id="6" name="Rectangle 5"/>
-            <p:cNvSpPr/>
-            <p:nvPr/>
-          </p:nvSpPr>
-          <p:spPr>
-            <a:xfrm>
-              <a:off x="0" y="0"/>
-              <a:ext cx="12192000" cy="262759"/>
-            </a:xfrm>
-            <a:prstGeom prst="rect">
-              <a:avLst/>
-            </a:prstGeom>
-            <a:solidFill>
-              <a:schemeClr val="bg2"/>
-            </a:solidFill>
-            <a:ln>
-              <a:noFill/>
-            </a:ln>
-          </p:spPr>
-          <p:style>
-            <a:lnRef idx="2">
-              <a:schemeClr val="accent1">
-                <a:shade val="50000"/>
-              </a:schemeClr>
-            </a:lnRef>
-            <a:fillRef idx="1">
-              <a:schemeClr val="accent1"/>
-            </a:fillRef>
-            <a:effectRef idx="0">
-              <a:schemeClr val="accent1"/>
-            </a:effectRef>
-            <a:fontRef idx="minor">
-              <a:schemeClr val="lt1"/>
-            </a:fontRef>
-          </p:style>
-          <p:txBody>
-            <a:bodyPr rtlCol="0" anchor="ctr"/>
-            <a:lstStyle/>
-            <a:p>
-              <a:pPr algn="r"/>
-              <a:endParaRPr lang="en-US" sz="1400" b="1" i="1" dirty="0">
-                <a:solidFill>
-                  <a:schemeClr val="tx1">
-                    <a:lumMod val="65000"/>
-                    <a:lumOff val="35000"/>
-                  </a:schemeClr>
-                </a:solidFill>
-                <a:latin typeface="+mj-lt"/>
-              </a:endParaRPr>
-            </a:p>
-          </p:txBody>
-        </p:sp>
-        <p:sp>
-          <p:nvSpPr>
-            <p:cNvPr id="7" name="TextBox 6"/>
-            <p:cNvSpPr txBox="1"/>
-            <p:nvPr/>
-          </p:nvSpPr>
-          <p:spPr>
-            <a:xfrm>
-              <a:off x="188780" y="-22510"/>
-              <a:ext cx="1843774" cy="307777"/>
-            </a:xfrm>
-            <a:prstGeom prst="rect">
-              <a:avLst/>
-            </a:prstGeom>
-            <a:noFill/>
-          </p:spPr>
-          <p:txBody>
-            <a:bodyPr wrap="none" rtlCol="0">
-              <a:spAutoFit/>
-            </a:bodyPr>
-            <a:lstStyle/>
-            <a:p>
-              <a:r>
-                <a:rPr lang="en-US" sz="1400" b="1" i="1" dirty="0" smtClean="0">
-                  <a:solidFill>
-                    <a:schemeClr val="tx1">
-                      <a:lumMod val="65000"/>
-                      <a:lumOff val="35000"/>
-                    </a:schemeClr>
-                  </a:solidFill>
-                  <a:latin typeface="+mj-lt"/>
-                </a:rPr>
-                <a:t>Lecture 17  &gt;  Section </a:t>
-              </a:r>
-              <a:r>
-                <a:rPr lang="en-US" sz="1400" b="1" i="1" dirty="0">
-                  <a:solidFill>
-                    <a:schemeClr val="tx1">
-                      <a:lumMod val="65000"/>
-                      <a:lumOff val="35000"/>
-                    </a:schemeClr>
-                  </a:solidFill>
-                  <a:latin typeface="+mj-lt"/>
-                </a:rPr>
-                <a:t>1</a:t>
-              </a:r>
-            </a:p>
-          </p:txBody>
-        </p:sp>
-      </p:grpSp>
-    </p:spTree>
-    <p:extLst>
-      <p:ext uri="{BB962C8B-B14F-4D97-AF65-F5344CB8AC3E}">
-        <p14:creationId xmlns:p14="http://schemas.microsoft.com/office/powerpoint/2010/main" val="424444777"/>
-      </p:ext>
-    </p:extLst>
-  </p:cSld>
-  <p:clrMapOvr>
-    <a:masterClrMapping/>
-  </p:clrMapOvr>
-  <p:timing>
-    <p:tnLst>
-      <p:par>
-        <p:cTn id="1" dur="indefinite" restart="never" nodeType="tmRoot"/>
-      </p:par>
-    </p:tnLst>
-  </p:timing>
-</p:sld>
-</file>
-
-<file path=ppt/slides/slide40.xml><?xml version="1.0" encoding="utf-8"?>
+<file path=ppt/slides/slide42.xml><?xml version="1.0" encoding="utf-8"?>
 <p:sld xmlns:a="http://schemas.openxmlformats.org/drawingml/2006/main" xmlns:r="http://schemas.openxmlformats.org/officeDocument/2006/relationships" xmlns:p="http://schemas.openxmlformats.org/presentationml/2006/main">
   <p:cSld>
     <p:spTree>
@@ -29452,7 +31216,7 @@
 </p:sld>
 </file>
 
-<file path=ppt/slides/slide41.xml><?xml version="1.0" encoding="utf-8"?>
+<file path=ppt/slides/slide43.xml><?xml version="1.0" encoding="utf-8"?>
 <p:sld xmlns:a="http://schemas.openxmlformats.org/drawingml/2006/main" xmlns:r="http://schemas.openxmlformats.org/officeDocument/2006/relationships" xmlns:p="http://schemas.openxmlformats.org/presentationml/2006/main">
   <p:cSld>
     <p:spTree>
@@ -29905,7 +31669,7 @@
 </p:sld>
 </file>
 
-<file path=ppt/slides/slide42.xml><?xml version="1.0" encoding="utf-8"?>
+<file path=ppt/slides/slide44.xml><?xml version="1.0" encoding="utf-8"?>
 <p:sld xmlns:a="http://schemas.openxmlformats.org/drawingml/2006/main" xmlns:r="http://schemas.openxmlformats.org/officeDocument/2006/relationships" xmlns:p="http://schemas.openxmlformats.org/presentationml/2006/main">
   <p:cSld>
     <p:spTree>
@@ -30185,7 +31949,7 @@
 </p:sld>
 </file>
 
-<file path=ppt/slides/slide43.xml><?xml version="1.0" encoding="utf-8"?>
+<file path=ppt/slides/slide45.xml><?xml version="1.0" encoding="utf-8"?>
 <p:sld xmlns:a="http://schemas.openxmlformats.org/drawingml/2006/main" xmlns:r="http://schemas.openxmlformats.org/officeDocument/2006/relationships" xmlns:p="http://schemas.openxmlformats.org/presentationml/2006/main">
   <p:cSld>
     <p:spTree>
@@ -30546,7 +32310,7 @@
 </p:sld>
 </file>
 
-<file path=ppt/slides/slide44.xml><?xml version="1.0" encoding="utf-8"?>
+<file path=ppt/slides/slide46.xml><?xml version="1.0" encoding="utf-8"?>
 <p:sld xmlns:a="http://schemas.openxmlformats.org/drawingml/2006/main" xmlns:r="http://schemas.openxmlformats.org/officeDocument/2006/relationships" xmlns:p="http://schemas.openxmlformats.org/presentationml/2006/main">
   <p:cSld>
     <p:spTree>
@@ -30605,7 +32369,7 @@
           <a:p>
             <a:fld id="{40A01959-B587-3B45-A9B3-C17F42F09305}" type="slidenum">
               <a:rPr lang="en-US" smtClean="0"/>
-              <a:t>44</a:t>
+              <a:t>46</a:t>
             </a:fld>
             <a:endParaRPr lang="en-US"/>
           </a:p>
@@ -30773,7 +32537,7 @@
 </p:sld>
 </file>
 
-<file path=ppt/slides/slide45.xml><?xml version="1.0" encoding="utf-8"?>
+<file path=ppt/slides/slide47.xml><?xml version="1.0" encoding="utf-8"?>
 <p:sld xmlns:a="http://schemas.openxmlformats.org/drawingml/2006/main" xmlns:r="http://schemas.openxmlformats.org/officeDocument/2006/relationships" xmlns:p="http://schemas.openxmlformats.org/presentationml/2006/main">
   <p:cSld>
     <p:spTree>
@@ -30834,7 +32598,7 @@
           <a:p>
             <a:fld id="{40A01959-B587-3B45-A9B3-C17F42F09305}" type="slidenum">
               <a:rPr lang="en-US" smtClean="0"/>
-              <a:t>45</a:t>
+              <a:t>47</a:t>
             </a:fld>
             <a:endParaRPr lang="en-US"/>
           </a:p>
@@ -30978,7 +32742,7 @@
 </p:sld>
 </file>
 
-<file path=ppt/slides/slide46.xml><?xml version="1.0" encoding="utf-8"?>
+<file path=ppt/slides/slide48.xml><?xml version="1.0" encoding="utf-8"?>
 <p:sld xmlns:a="http://schemas.openxmlformats.org/drawingml/2006/main" xmlns:r="http://schemas.openxmlformats.org/officeDocument/2006/relationships" xmlns:p="http://schemas.openxmlformats.org/presentationml/2006/main">
   <p:cSld>
     <p:spTree>
@@ -31638,7 +33402,7 @@
 </p:sld>
 </file>
 
-<file path=ppt/slides/slide47.xml><?xml version="1.0" encoding="utf-8"?>
+<file path=ppt/slides/slide49.xml><?xml version="1.0" encoding="utf-8"?>
 <p:sld xmlns:a="http://schemas.openxmlformats.org/drawingml/2006/main" xmlns:r="http://schemas.openxmlformats.org/officeDocument/2006/relationships" xmlns:p="http://schemas.openxmlformats.org/presentationml/2006/main">
   <p:cSld>
     <p:spTree>
@@ -32290,7 +34054,476 @@
 </p:sld>
 </file>
 
-<file path=ppt/slides/slide48.xml><?xml version="1.0" encoding="utf-8"?>
+<file path=ppt/slides/slide5.xml><?xml version="1.0" encoding="utf-8"?>
+<p:sld xmlns:a="http://schemas.openxmlformats.org/drawingml/2006/main" xmlns:r="http://schemas.openxmlformats.org/officeDocument/2006/relationships" xmlns:p="http://schemas.openxmlformats.org/presentationml/2006/main">
+  <p:cSld>
+    <p:spTree>
+      <p:nvGrpSpPr>
+        <p:cNvPr id="1" name=""/>
+        <p:cNvGrpSpPr/>
+        <p:nvPr/>
+      </p:nvGrpSpPr>
+      <p:grpSpPr>
+        <a:xfrm>
+          <a:off x="0" y="0"/>
+          <a:ext cx="0" cy="0"/>
+          <a:chOff x="0" y="0"/>
+          <a:chExt cx="0" cy="0"/>
+        </a:xfrm>
+      </p:grpSpPr>
+      <p:sp>
+        <p:nvSpPr>
+          <p:cNvPr id="10" name="Rectangle 9"/>
+          <p:cNvSpPr/>
+          <p:nvPr/>
+        </p:nvSpPr>
+        <p:spPr>
+          <a:xfrm>
+            <a:off x="0" y="3161150"/>
+            <a:ext cx="8610600" cy="882869"/>
+          </a:xfrm>
+          <a:prstGeom prst="rect">
+            <a:avLst/>
+          </a:prstGeom>
+          <a:solidFill>
+            <a:schemeClr val="bg2"/>
+          </a:solidFill>
+          <a:ln>
+            <a:noFill/>
+          </a:ln>
+        </p:spPr>
+        <p:style>
+          <a:lnRef idx="2">
+            <a:schemeClr val="accent1">
+              <a:shade val="50000"/>
+            </a:schemeClr>
+          </a:lnRef>
+          <a:fillRef idx="1">
+            <a:schemeClr val="accent1"/>
+          </a:fillRef>
+          <a:effectRef idx="0">
+            <a:schemeClr val="accent1"/>
+          </a:effectRef>
+          <a:fontRef idx="minor">
+            <a:schemeClr val="lt1"/>
+          </a:fontRef>
+        </p:style>
+        <p:txBody>
+          <a:bodyPr rtlCol="0" anchor="ctr"/>
+          <a:lstStyle/>
+          <a:p>
+            <a:pPr algn="ctr"/>
+            <a:endParaRPr lang="en-US"/>
+          </a:p>
+        </p:txBody>
+      </p:sp>
+      <p:sp>
+        <p:nvSpPr>
+          <p:cNvPr id="2" name="Title 1"/>
+          <p:cNvSpPr>
+            <a:spLocks noGrp="1"/>
+          </p:cNvSpPr>
+          <p:nvPr>
+            <p:ph type="title"/>
+          </p:nvPr>
+        </p:nvSpPr>
+        <p:spPr/>
+        <p:txBody>
+          <a:bodyPr/>
+          <a:lstStyle/>
+          <a:p>
+            <a:r>
+              <a:rPr lang="en-US" dirty="0" smtClean="0"/>
+              <a:t>What you will learn about in this section</a:t>
+            </a:r>
+            <a:endParaRPr lang="en-US" dirty="0"/>
+          </a:p>
+        </p:txBody>
+      </p:sp>
+      <p:sp>
+        <p:nvSpPr>
+          <p:cNvPr id="3" name="Content Placeholder 2"/>
+          <p:cNvSpPr>
+            <a:spLocks noGrp="1"/>
+          </p:cNvSpPr>
+          <p:nvPr>
+            <p:ph idx="1"/>
+          </p:nvPr>
+        </p:nvSpPr>
+        <p:spPr>
+          <a:xfrm>
+            <a:off x="838200" y="1825624"/>
+            <a:ext cx="10515600" cy="4175783"/>
+          </a:xfrm>
+        </p:spPr>
+        <p:txBody>
+          <a:bodyPr>
+            <a:normAutofit/>
+          </a:bodyPr>
+          <a:lstStyle/>
+          <a:p>
+            <a:pPr marL="514350" indent="-514350">
+              <a:buAutoNum type="arabicPeriod"/>
+            </a:pPr>
+            <a:endParaRPr lang="en-US" dirty="0" smtClean="0"/>
+          </a:p>
+          <a:p>
+            <a:pPr marL="514350" indent="-514350">
+              <a:buFont typeface="Arial"/>
+              <a:buAutoNum type="arabicPeriod"/>
+            </a:pPr>
+            <a:r>
+              <a:rPr lang="en-US" dirty="0" smtClean="0">
+                <a:latin typeface="+mj-lt"/>
+              </a:rPr>
+              <a:t>Optimization of RA Plans</a:t>
+            </a:r>
+          </a:p>
+          <a:p>
+            <a:pPr marL="514350" indent="-514350">
+              <a:buFont typeface="Arial"/>
+              <a:buAutoNum type="arabicPeriod"/>
+            </a:pPr>
+            <a:endParaRPr lang="en-US" dirty="0">
+              <a:latin typeface="+mj-lt"/>
+            </a:endParaRPr>
+          </a:p>
+          <a:p>
+            <a:pPr marL="514350" indent="-514350">
+              <a:buFont typeface="Arial"/>
+              <a:buAutoNum type="arabicPeriod"/>
+            </a:pPr>
+            <a:r>
+              <a:rPr lang="en-US" dirty="0" smtClean="0">
+                <a:latin typeface="+mj-lt"/>
+              </a:rPr>
+              <a:t>ACTIVITY: RA Plan Optimization</a:t>
+            </a:r>
+          </a:p>
+          <a:p>
+            <a:pPr marL="0" indent="0">
+              <a:buNone/>
+            </a:pPr>
+            <a:endParaRPr lang="en-US" dirty="0">
+              <a:latin typeface="+mj-lt"/>
+            </a:endParaRPr>
+          </a:p>
+        </p:txBody>
+      </p:sp>
+      <p:sp>
+        <p:nvSpPr>
+          <p:cNvPr id="4" name="Slide Number Placeholder 3"/>
+          <p:cNvSpPr>
+            <a:spLocks noGrp="1"/>
+          </p:cNvSpPr>
+          <p:nvPr>
+            <p:ph type="sldNum" sz="quarter" idx="12"/>
+          </p:nvPr>
+        </p:nvSpPr>
+        <p:spPr/>
+        <p:txBody>
+          <a:bodyPr/>
+          <a:lstStyle/>
+          <a:p>
+            <a:fld id="{DF92A6B5-0D7C-48A8-B49A-953CF10F77E3}" type="slidenum">
+              <a:rPr lang="en-US" smtClean="0"/>
+              <a:pPr/>
+              <a:t>5</a:t>
+            </a:fld>
+            <a:endParaRPr lang="en-US"/>
+          </a:p>
+        </p:txBody>
+      </p:sp>
+      <p:grpSp>
+        <p:nvGrpSpPr>
+          <p:cNvPr id="11" name="Group 10"/>
+          <p:cNvGrpSpPr/>
+          <p:nvPr/>
+        </p:nvGrpSpPr>
+        <p:grpSpPr>
+          <a:xfrm>
+            <a:off x="0" y="-22510"/>
+            <a:ext cx="12192000" cy="307777"/>
+            <a:chOff x="0" y="-22510"/>
+            <a:chExt cx="12192000" cy="307777"/>
+          </a:xfrm>
+        </p:grpSpPr>
+        <p:sp>
+          <p:nvSpPr>
+            <p:cNvPr id="12" name="Rectangle 11"/>
+            <p:cNvSpPr/>
+            <p:nvPr/>
+          </p:nvSpPr>
+          <p:spPr>
+            <a:xfrm>
+              <a:off x="0" y="0"/>
+              <a:ext cx="12192000" cy="262759"/>
+            </a:xfrm>
+            <a:prstGeom prst="rect">
+              <a:avLst/>
+            </a:prstGeom>
+            <a:solidFill>
+              <a:schemeClr val="bg2"/>
+            </a:solidFill>
+            <a:ln>
+              <a:noFill/>
+            </a:ln>
+          </p:spPr>
+          <p:style>
+            <a:lnRef idx="2">
+              <a:schemeClr val="accent1">
+                <a:shade val="50000"/>
+              </a:schemeClr>
+            </a:lnRef>
+            <a:fillRef idx="1">
+              <a:schemeClr val="accent1"/>
+            </a:fillRef>
+            <a:effectRef idx="0">
+              <a:schemeClr val="accent1"/>
+            </a:effectRef>
+            <a:fontRef idx="minor">
+              <a:schemeClr val="lt1"/>
+            </a:fontRef>
+          </p:style>
+          <p:txBody>
+            <a:bodyPr rtlCol="0" anchor="ctr"/>
+            <a:lstStyle/>
+            <a:p>
+              <a:pPr algn="r"/>
+              <a:endParaRPr lang="en-US" sz="1400" b="1" i="1" dirty="0">
+                <a:solidFill>
+                  <a:schemeClr val="tx1">
+                    <a:lumMod val="65000"/>
+                    <a:lumOff val="35000"/>
+                  </a:schemeClr>
+                </a:solidFill>
+                <a:latin typeface="+mj-lt"/>
+              </a:endParaRPr>
+            </a:p>
+          </p:txBody>
+        </p:sp>
+        <p:sp>
+          <p:nvSpPr>
+            <p:cNvPr id="13" name="TextBox 12"/>
+            <p:cNvSpPr txBox="1"/>
+            <p:nvPr/>
+          </p:nvSpPr>
+          <p:spPr>
+            <a:xfrm>
+              <a:off x="188780" y="-22510"/>
+              <a:ext cx="1843774" cy="307777"/>
+            </a:xfrm>
+            <a:prstGeom prst="rect">
+              <a:avLst/>
+            </a:prstGeom>
+            <a:noFill/>
+          </p:spPr>
+          <p:txBody>
+            <a:bodyPr wrap="none" rtlCol="0">
+              <a:spAutoFit/>
+            </a:bodyPr>
+            <a:lstStyle/>
+            <a:p>
+              <a:r>
+                <a:rPr lang="en-US" sz="1400" b="1" i="1" dirty="0" smtClean="0">
+                  <a:solidFill>
+                    <a:schemeClr val="tx1">
+                      <a:lumMod val="65000"/>
+                      <a:lumOff val="35000"/>
+                    </a:schemeClr>
+                  </a:solidFill>
+                  <a:latin typeface="+mj-lt"/>
+                </a:rPr>
+                <a:t>Lecture 17  &gt;  Section </a:t>
+              </a:r>
+              <a:r>
+                <a:rPr lang="en-US" sz="1400" b="1" i="1" dirty="0">
+                  <a:solidFill>
+                    <a:schemeClr val="tx1">
+                      <a:lumMod val="65000"/>
+                      <a:lumOff val="35000"/>
+                    </a:schemeClr>
+                  </a:solidFill>
+                  <a:latin typeface="+mj-lt"/>
+                </a:rPr>
+                <a:t>1</a:t>
+              </a:r>
+            </a:p>
+          </p:txBody>
+        </p:sp>
+      </p:grpSp>
+    </p:spTree>
+    <p:extLst>
+      <p:ext uri="{BB962C8B-B14F-4D97-AF65-F5344CB8AC3E}">
+        <p14:creationId xmlns:p14="http://schemas.microsoft.com/office/powerpoint/2010/main" val="1850175352"/>
+      </p:ext>
+    </p:extLst>
+  </p:cSld>
+  <p:clrMapOvr>
+    <a:masterClrMapping/>
+  </p:clrMapOvr>
+  <p:timing>
+    <p:tnLst>
+      <p:par>
+        <p:cTn id="1" dur="indefinite" restart="never" nodeType="tmRoot">
+          <p:childTnLst>
+            <p:seq concurrent="1" nextAc="seek">
+              <p:cTn id="2" dur="indefinite" nodeType="mainSeq">
+                <p:childTnLst>
+                  <p:par>
+                    <p:cTn id="3" fill="hold">
+                      <p:stCondLst>
+                        <p:cond delay="indefinite"/>
+                      </p:stCondLst>
+                      <p:childTnLst>
+                        <p:par>
+                          <p:cTn id="4" fill="hold">
+                            <p:stCondLst>
+                              <p:cond delay="0"/>
+                            </p:stCondLst>
+                            <p:childTnLst>
+                              <p:par>
+                                <p:cTn id="5" presetID="1" presetClass="entr" presetSubtype="0" fill="hold" nodeType="clickEffect">
+                                  <p:stCondLst>
+                                    <p:cond delay="0"/>
+                                  </p:stCondLst>
+                                  <p:childTnLst>
+                                    <p:set>
+                                      <p:cBhvr>
+                                        <p:cTn id="6" dur="1" fill="hold">
+                                          <p:stCondLst>
+                                            <p:cond delay="0"/>
+                                          </p:stCondLst>
+                                        </p:cTn>
+                                        <p:tgtEl>
+                                          <p:spTgt spid="3">
+                                            <p:txEl>
+                                              <p:pRg st="1" end="1"/>
+                                            </p:txEl>
+                                          </p:spTgt>
+                                        </p:tgtEl>
+                                        <p:attrNameLst>
+                                          <p:attrName>style.visibility</p:attrName>
+                                        </p:attrNameLst>
+                                      </p:cBhvr>
+                                      <p:to>
+                                        <p:strVal val="visible"/>
+                                      </p:to>
+                                    </p:set>
+                                  </p:childTnLst>
+                                </p:cTn>
+                              </p:par>
+                            </p:childTnLst>
+                          </p:cTn>
+                        </p:par>
+                      </p:childTnLst>
+                    </p:cTn>
+                  </p:par>
+                  <p:par>
+                    <p:cTn id="7" fill="hold">
+                      <p:stCondLst>
+                        <p:cond delay="indefinite"/>
+                      </p:stCondLst>
+                      <p:childTnLst>
+                        <p:par>
+                          <p:cTn id="8" fill="hold">
+                            <p:stCondLst>
+                              <p:cond delay="0"/>
+                            </p:stCondLst>
+                            <p:childTnLst>
+                              <p:par>
+                                <p:cTn id="9" presetID="1" presetClass="entr" presetSubtype="0" fill="hold" nodeType="clickEffect">
+                                  <p:stCondLst>
+                                    <p:cond delay="0"/>
+                                  </p:stCondLst>
+                                  <p:childTnLst>
+                                    <p:set>
+                                      <p:cBhvr>
+                                        <p:cTn id="10" dur="1" fill="hold">
+                                          <p:stCondLst>
+                                            <p:cond delay="0"/>
+                                          </p:stCondLst>
+                                        </p:cTn>
+                                        <p:tgtEl>
+                                          <p:spTgt spid="3">
+                                            <p:txEl>
+                                              <p:pRg st="3" end="3"/>
+                                            </p:txEl>
+                                          </p:spTgt>
+                                        </p:tgtEl>
+                                        <p:attrNameLst>
+                                          <p:attrName>style.visibility</p:attrName>
+                                        </p:attrNameLst>
+                                      </p:cBhvr>
+                                      <p:to>
+                                        <p:strVal val="visible"/>
+                                      </p:to>
+                                    </p:set>
+                                  </p:childTnLst>
+                                </p:cTn>
+                              </p:par>
+                              <p:par>
+                                <p:cTn id="11" presetID="1" presetClass="entr" presetSubtype="0" fill="hold" grpId="0" nodeType="withEffect">
+                                  <p:stCondLst>
+                                    <p:cond delay="0"/>
+                                  </p:stCondLst>
+                                  <p:childTnLst>
+                                    <p:set>
+                                      <p:cBhvr>
+                                        <p:cTn id="12" dur="1" fill="hold">
+                                          <p:stCondLst>
+                                            <p:cond delay="0"/>
+                                          </p:stCondLst>
+                                        </p:cTn>
+                                        <p:tgtEl>
+                                          <p:spTgt spid="10"/>
+                                        </p:tgtEl>
+                                        <p:attrNameLst>
+                                          <p:attrName>style.visibility</p:attrName>
+                                        </p:attrNameLst>
+                                      </p:cBhvr>
+                                      <p:to>
+                                        <p:strVal val="visible"/>
+                                      </p:to>
+                                    </p:set>
+                                  </p:childTnLst>
+                                </p:cTn>
+                              </p:par>
+                            </p:childTnLst>
+                          </p:cTn>
+                        </p:par>
+                      </p:childTnLst>
+                    </p:cTn>
+                  </p:par>
+                </p:childTnLst>
+              </p:cTn>
+              <p:prevCondLst>
+                <p:cond evt="onPrev" delay="0">
+                  <p:tgtEl>
+                    <p:sldTgt/>
+                  </p:tgtEl>
+                </p:cond>
+              </p:prevCondLst>
+              <p:nextCondLst>
+                <p:cond evt="onNext" delay="0">
+                  <p:tgtEl>
+                    <p:sldTgt/>
+                  </p:tgtEl>
+                </p:cond>
+              </p:nextCondLst>
+            </p:seq>
+          </p:childTnLst>
+        </p:cTn>
+      </p:par>
+    </p:tnLst>
+    <p:bldLst>
+      <p:bldP spid="10" grpId="0" animBg="1"/>
+    </p:bldLst>
+  </p:timing>
+</p:sld>
+</file>
+
+<file path=ppt/slides/slide50.xml><?xml version="1.0" encoding="utf-8"?>
 <p:sld xmlns:a="http://schemas.openxmlformats.org/drawingml/2006/main" xmlns:r="http://schemas.openxmlformats.org/officeDocument/2006/relationships" xmlns:p="http://schemas.openxmlformats.org/presentationml/2006/main">
   <p:cSld>
     <p:spTree>
@@ -32924,7 +35157,7 @@
 </p:sld>
 </file>
 
-<file path=ppt/slides/slide49.xml><?xml version="1.0" encoding="utf-8"?>
+<file path=ppt/slides/slide51.xml><?xml version="1.0" encoding="utf-8"?>
 <p:sld xmlns:a="http://schemas.openxmlformats.org/drawingml/2006/main" xmlns:r="http://schemas.openxmlformats.org/officeDocument/2006/relationships" xmlns:p="http://schemas.openxmlformats.org/presentationml/2006/main">
   <p:cSld>
     <p:spTree>
@@ -33512,475 +35745,6 @@
         <p:cTn id="1" dur="indefinite" restart="never" nodeType="tmRoot"/>
       </p:par>
     </p:tnLst>
-  </p:timing>
-</p:sld>
-</file>
-
-<file path=ppt/slides/slide5.xml><?xml version="1.0" encoding="utf-8"?>
-<p:sld xmlns:a="http://schemas.openxmlformats.org/drawingml/2006/main" xmlns:r="http://schemas.openxmlformats.org/officeDocument/2006/relationships" xmlns:p="http://schemas.openxmlformats.org/presentationml/2006/main">
-  <p:cSld>
-    <p:spTree>
-      <p:nvGrpSpPr>
-        <p:cNvPr id="1" name=""/>
-        <p:cNvGrpSpPr/>
-        <p:nvPr/>
-      </p:nvGrpSpPr>
-      <p:grpSpPr>
-        <a:xfrm>
-          <a:off x="0" y="0"/>
-          <a:ext cx="0" cy="0"/>
-          <a:chOff x="0" y="0"/>
-          <a:chExt cx="0" cy="0"/>
-        </a:xfrm>
-      </p:grpSpPr>
-      <p:sp>
-        <p:nvSpPr>
-          <p:cNvPr id="10" name="Rectangle 9"/>
-          <p:cNvSpPr/>
-          <p:nvPr/>
-        </p:nvSpPr>
-        <p:spPr>
-          <a:xfrm>
-            <a:off x="0" y="3161150"/>
-            <a:ext cx="8610600" cy="882869"/>
-          </a:xfrm>
-          <a:prstGeom prst="rect">
-            <a:avLst/>
-          </a:prstGeom>
-          <a:solidFill>
-            <a:schemeClr val="bg2"/>
-          </a:solidFill>
-          <a:ln>
-            <a:noFill/>
-          </a:ln>
-        </p:spPr>
-        <p:style>
-          <a:lnRef idx="2">
-            <a:schemeClr val="accent1">
-              <a:shade val="50000"/>
-            </a:schemeClr>
-          </a:lnRef>
-          <a:fillRef idx="1">
-            <a:schemeClr val="accent1"/>
-          </a:fillRef>
-          <a:effectRef idx="0">
-            <a:schemeClr val="accent1"/>
-          </a:effectRef>
-          <a:fontRef idx="minor">
-            <a:schemeClr val="lt1"/>
-          </a:fontRef>
-        </p:style>
-        <p:txBody>
-          <a:bodyPr rtlCol="0" anchor="ctr"/>
-          <a:lstStyle/>
-          <a:p>
-            <a:pPr algn="ctr"/>
-            <a:endParaRPr lang="en-US"/>
-          </a:p>
-        </p:txBody>
-      </p:sp>
-      <p:sp>
-        <p:nvSpPr>
-          <p:cNvPr id="2" name="Title 1"/>
-          <p:cNvSpPr>
-            <a:spLocks noGrp="1"/>
-          </p:cNvSpPr>
-          <p:nvPr>
-            <p:ph type="title"/>
-          </p:nvPr>
-        </p:nvSpPr>
-        <p:spPr/>
-        <p:txBody>
-          <a:bodyPr/>
-          <a:lstStyle/>
-          <a:p>
-            <a:r>
-              <a:rPr lang="en-US" dirty="0" smtClean="0"/>
-              <a:t>What you will learn about in this section</a:t>
-            </a:r>
-            <a:endParaRPr lang="en-US" dirty="0"/>
-          </a:p>
-        </p:txBody>
-      </p:sp>
-      <p:sp>
-        <p:nvSpPr>
-          <p:cNvPr id="3" name="Content Placeholder 2"/>
-          <p:cNvSpPr>
-            <a:spLocks noGrp="1"/>
-          </p:cNvSpPr>
-          <p:nvPr>
-            <p:ph idx="1"/>
-          </p:nvPr>
-        </p:nvSpPr>
-        <p:spPr>
-          <a:xfrm>
-            <a:off x="838200" y="1825624"/>
-            <a:ext cx="10515600" cy="4175783"/>
-          </a:xfrm>
-        </p:spPr>
-        <p:txBody>
-          <a:bodyPr>
-            <a:normAutofit/>
-          </a:bodyPr>
-          <a:lstStyle/>
-          <a:p>
-            <a:pPr marL="514350" indent="-514350">
-              <a:buAutoNum type="arabicPeriod"/>
-            </a:pPr>
-            <a:endParaRPr lang="en-US" dirty="0" smtClean="0"/>
-          </a:p>
-          <a:p>
-            <a:pPr marL="514350" indent="-514350">
-              <a:buFont typeface="Arial"/>
-              <a:buAutoNum type="arabicPeriod"/>
-            </a:pPr>
-            <a:r>
-              <a:rPr lang="en-US" dirty="0" smtClean="0">
-                <a:latin typeface="+mj-lt"/>
-              </a:rPr>
-              <a:t>Optimization of RA Plans</a:t>
-            </a:r>
-          </a:p>
-          <a:p>
-            <a:pPr marL="514350" indent="-514350">
-              <a:buFont typeface="Arial"/>
-              <a:buAutoNum type="arabicPeriod"/>
-            </a:pPr>
-            <a:endParaRPr lang="en-US" dirty="0">
-              <a:latin typeface="+mj-lt"/>
-            </a:endParaRPr>
-          </a:p>
-          <a:p>
-            <a:pPr marL="514350" indent="-514350">
-              <a:buFont typeface="Arial"/>
-              <a:buAutoNum type="arabicPeriod"/>
-            </a:pPr>
-            <a:r>
-              <a:rPr lang="en-US" dirty="0" smtClean="0">
-                <a:latin typeface="+mj-lt"/>
-              </a:rPr>
-              <a:t>ACTIVITY: RA Plan Optimization</a:t>
-            </a:r>
-          </a:p>
-          <a:p>
-            <a:pPr marL="0" indent="0">
-              <a:buNone/>
-            </a:pPr>
-            <a:endParaRPr lang="en-US" dirty="0">
-              <a:latin typeface="+mj-lt"/>
-            </a:endParaRPr>
-          </a:p>
-        </p:txBody>
-      </p:sp>
-      <p:sp>
-        <p:nvSpPr>
-          <p:cNvPr id="4" name="Slide Number Placeholder 3"/>
-          <p:cNvSpPr>
-            <a:spLocks noGrp="1"/>
-          </p:cNvSpPr>
-          <p:nvPr>
-            <p:ph type="sldNum" sz="quarter" idx="12"/>
-          </p:nvPr>
-        </p:nvSpPr>
-        <p:spPr/>
-        <p:txBody>
-          <a:bodyPr/>
-          <a:lstStyle/>
-          <a:p>
-            <a:fld id="{DF92A6B5-0D7C-48A8-B49A-953CF10F77E3}" type="slidenum">
-              <a:rPr lang="en-US" smtClean="0"/>
-              <a:pPr/>
-              <a:t>5</a:t>
-            </a:fld>
-            <a:endParaRPr lang="en-US"/>
-          </a:p>
-        </p:txBody>
-      </p:sp>
-      <p:grpSp>
-        <p:nvGrpSpPr>
-          <p:cNvPr id="11" name="Group 10"/>
-          <p:cNvGrpSpPr/>
-          <p:nvPr/>
-        </p:nvGrpSpPr>
-        <p:grpSpPr>
-          <a:xfrm>
-            <a:off x="0" y="-22510"/>
-            <a:ext cx="12192000" cy="307777"/>
-            <a:chOff x="0" y="-22510"/>
-            <a:chExt cx="12192000" cy="307777"/>
-          </a:xfrm>
-        </p:grpSpPr>
-        <p:sp>
-          <p:nvSpPr>
-            <p:cNvPr id="12" name="Rectangle 11"/>
-            <p:cNvSpPr/>
-            <p:nvPr/>
-          </p:nvSpPr>
-          <p:spPr>
-            <a:xfrm>
-              <a:off x="0" y="0"/>
-              <a:ext cx="12192000" cy="262759"/>
-            </a:xfrm>
-            <a:prstGeom prst="rect">
-              <a:avLst/>
-            </a:prstGeom>
-            <a:solidFill>
-              <a:schemeClr val="bg2"/>
-            </a:solidFill>
-            <a:ln>
-              <a:noFill/>
-            </a:ln>
-          </p:spPr>
-          <p:style>
-            <a:lnRef idx="2">
-              <a:schemeClr val="accent1">
-                <a:shade val="50000"/>
-              </a:schemeClr>
-            </a:lnRef>
-            <a:fillRef idx="1">
-              <a:schemeClr val="accent1"/>
-            </a:fillRef>
-            <a:effectRef idx="0">
-              <a:schemeClr val="accent1"/>
-            </a:effectRef>
-            <a:fontRef idx="minor">
-              <a:schemeClr val="lt1"/>
-            </a:fontRef>
-          </p:style>
-          <p:txBody>
-            <a:bodyPr rtlCol="0" anchor="ctr"/>
-            <a:lstStyle/>
-            <a:p>
-              <a:pPr algn="r"/>
-              <a:endParaRPr lang="en-US" sz="1400" b="1" i="1" dirty="0">
-                <a:solidFill>
-                  <a:schemeClr val="tx1">
-                    <a:lumMod val="65000"/>
-                    <a:lumOff val="35000"/>
-                  </a:schemeClr>
-                </a:solidFill>
-                <a:latin typeface="+mj-lt"/>
-              </a:endParaRPr>
-            </a:p>
-          </p:txBody>
-        </p:sp>
-        <p:sp>
-          <p:nvSpPr>
-            <p:cNvPr id="13" name="TextBox 12"/>
-            <p:cNvSpPr txBox="1"/>
-            <p:nvPr/>
-          </p:nvSpPr>
-          <p:spPr>
-            <a:xfrm>
-              <a:off x="188780" y="-22510"/>
-              <a:ext cx="1843774" cy="307777"/>
-            </a:xfrm>
-            <a:prstGeom prst="rect">
-              <a:avLst/>
-            </a:prstGeom>
-            <a:noFill/>
-          </p:spPr>
-          <p:txBody>
-            <a:bodyPr wrap="none" rtlCol="0">
-              <a:spAutoFit/>
-            </a:bodyPr>
-            <a:lstStyle/>
-            <a:p>
-              <a:r>
-                <a:rPr lang="en-US" sz="1400" b="1" i="1" dirty="0" smtClean="0">
-                  <a:solidFill>
-                    <a:schemeClr val="tx1">
-                      <a:lumMod val="65000"/>
-                      <a:lumOff val="35000"/>
-                    </a:schemeClr>
-                  </a:solidFill>
-                  <a:latin typeface="+mj-lt"/>
-                </a:rPr>
-                <a:t>Lecture 17  &gt;  Section </a:t>
-              </a:r>
-              <a:r>
-                <a:rPr lang="en-US" sz="1400" b="1" i="1" dirty="0">
-                  <a:solidFill>
-                    <a:schemeClr val="tx1">
-                      <a:lumMod val="65000"/>
-                      <a:lumOff val="35000"/>
-                    </a:schemeClr>
-                  </a:solidFill>
-                  <a:latin typeface="+mj-lt"/>
-                </a:rPr>
-                <a:t>1</a:t>
-              </a:r>
-            </a:p>
-          </p:txBody>
-        </p:sp>
-      </p:grpSp>
-    </p:spTree>
-    <p:extLst>
-      <p:ext uri="{BB962C8B-B14F-4D97-AF65-F5344CB8AC3E}">
-        <p14:creationId xmlns:p14="http://schemas.microsoft.com/office/powerpoint/2010/main" val="1850175352"/>
-      </p:ext>
-    </p:extLst>
-  </p:cSld>
-  <p:clrMapOvr>
-    <a:masterClrMapping/>
-  </p:clrMapOvr>
-  <p:timing>
-    <p:tnLst>
-      <p:par>
-        <p:cTn id="1" dur="indefinite" restart="never" nodeType="tmRoot">
-          <p:childTnLst>
-            <p:seq concurrent="1" nextAc="seek">
-              <p:cTn id="2" dur="indefinite" nodeType="mainSeq">
-                <p:childTnLst>
-                  <p:par>
-                    <p:cTn id="3" fill="hold">
-                      <p:stCondLst>
-                        <p:cond delay="indefinite"/>
-                      </p:stCondLst>
-                      <p:childTnLst>
-                        <p:par>
-                          <p:cTn id="4" fill="hold">
-                            <p:stCondLst>
-                              <p:cond delay="0"/>
-                            </p:stCondLst>
-                            <p:childTnLst>
-                              <p:par>
-                                <p:cTn id="5" presetID="1" presetClass="entr" presetSubtype="0" fill="hold" nodeType="clickEffect">
-                                  <p:stCondLst>
-                                    <p:cond delay="0"/>
-                                  </p:stCondLst>
-                                  <p:childTnLst>
-                                    <p:set>
-                                      <p:cBhvr>
-                                        <p:cTn id="6" dur="1" fill="hold">
-                                          <p:stCondLst>
-                                            <p:cond delay="0"/>
-                                          </p:stCondLst>
-                                        </p:cTn>
-                                        <p:tgtEl>
-                                          <p:spTgt spid="3">
-                                            <p:txEl>
-                                              <p:pRg st="1" end="1"/>
-                                            </p:txEl>
-                                          </p:spTgt>
-                                        </p:tgtEl>
-                                        <p:attrNameLst>
-                                          <p:attrName>style.visibility</p:attrName>
-                                        </p:attrNameLst>
-                                      </p:cBhvr>
-                                      <p:to>
-                                        <p:strVal val="visible"/>
-                                      </p:to>
-                                    </p:set>
-                                  </p:childTnLst>
-                                </p:cTn>
-                              </p:par>
-                            </p:childTnLst>
-                          </p:cTn>
-                        </p:par>
-                      </p:childTnLst>
-                    </p:cTn>
-                  </p:par>
-                  <p:par>
-                    <p:cTn id="7" fill="hold">
-                      <p:stCondLst>
-                        <p:cond delay="indefinite"/>
-                      </p:stCondLst>
-                      <p:childTnLst>
-                        <p:par>
-                          <p:cTn id="8" fill="hold">
-                            <p:stCondLst>
-                              <p:cond delay="0"/>
-                            </p:stCondLst>
-                            <p:childTnLst>
-                              <p:par>
-                                <p:cTn id="9" presetID="1" presetClass="entr" presetSubtype="0" fill="hold" nodeType="clickEffect">
-                                  <p:stCondLst>
-                                    <p:cond delay="0"/>
-                                  </p:stCondLst>
-                                  <p:childTnLst>
-                                    <p:set>
-                                      <p:cBhvr>
-                                        <p:cTn id="10" dur="1" fill="hold">
-                                          <p:stCondLst>
-                                            <p:cond delay="0"/>
-                                          </p:stCondLst>
-                                        </p:cTn>
-                                        <p:tgtEl>
-                                          <p:spTgt spid="3">
-                                            <p:txEl>
-                                              <p:pRg st="3" end="3"/>
-                                            </p:txEl>
-                                          </p:spTgt>
-                                        </p:tgtEl>
-                                        <p:attrNameLst>
-                                          <p:attrName>style.visibility</p:attrName>
-                                        </p:attrNameLst>
-                                      </p:cBhvr>
-                                      <p:to>
-                                        <p:strVal val="visible"/>
-                                      </p:to>
-                                    </p:set>
-                                  </p:childTnLst>
-                                </p:cTn>
-                              </p:par>
-                              <p:par>
-                                <p:cTn id="11" presetID="1" presetClass="entr" presetSubtype="0" fill="hold" grpId="0" nodeType="withEffect">
-                                  <p:stCondLst>
-                                    <p:cond delay="0"/>
-                                  </p:stCondLst>
-                                  <p:childTnLst>
-                                    <p:set>
-                                      <p:cBhvr>
-                                        <p:cTn id="12" dur="1" fill="hold">
-                                          <p:stCondLst>
-                                            <p:cond delay="0"/>
-                                          </p:stCondLst>
-                                        </p:cTn>
-                                        <p:tgtEl>
-                                          <p:spTgt spid="10"/>
-                                        </p:tgtEl>
-                                        <p:attrNameLst>
-                                          <p:attrName>style.visibility</p:attrName>
-                                        </p:attrNameLst>
-                                      </p:cBhvr>
-                                      <p:to>
-                                        <p:strVal val="visible"/>
-                                      </p:to>
-                                    </p:set>
-                                  </p:childTnLst>
-                                </p:cTn>
-                              </p:par>
-                            </p:childTnLst>
-                          </p:cTn>
-                        </p:par>
-                      </p:childTnLst>
-                    </p:cTn>
-                  </p:par>
-                </p:childTnLst>
-              </p:cTn>
-              <p:prevCondLst>
-                <p:cond evt="onPrev" delay="0">
-                  <p:tgtEl>
-                    <p:sldTgt/>
-                  </p:tgtEl>
-                </p:cond>
-              </p:prevCondLst>
-              <p:nextCondLst>
-                <p:cond evt="onNext" delay="0">
-                  <p:tgtEl>
-                    <p:sldTgt/>
-                  </p:tgtEl>
-                </p:cond>
-              </p:nextCondLst>
-            </p:seq>
-          </p:childTnLst>
-        </p:cTn>
-      </p:par>
-    </p:tnLst>
-    <p:bldLst>
-      <p:bldP spid="10" grpId="0" animBg="1"/>
-    </p:bldLst>
   </p:timing>
 </p:sld>
 </file>

</xml_diff>

<commit_message>
Removing lecture overlap, a few edits to lectures
</commit_message>
<xml_diff>
--- a/lecture-17/Lecture_17_Optimization.pptx
+++ b/lecture-17/Lecture_17_Optimization.pptx
@@ -254,11 +254,11 @@
           <c:showBubbleSize val="0"/>
         </c:dLbls>
         <c:gapWidth val="150"/>
-        <c:axId val="-2132964064"/>
-        <c:axId val="-2132961168"/>
+        <c:axId val="1853732800"/>
+        <c:axId val="1853740032"/>
       </c:barChart>
       <c:catAx>
-        <c:axId val="-2132964064"/>
+        <c:axId val="1853732800"/>
         <c:scaling>
           <c:orientation val="minMax"/>
         </c:scaling>
@@ -277,7 +277,7 @@
             <a:endParaRPr lang="en-US"/>
           </a:p>
         </c:txPr>
-        <c:crossAx val="-2132961168"/>
+        <c:crossAx val="1853740032"/>
         <c:crosses val="autoZero"/>
         <c:auto val="1"/>
         <c:lblAlgn val="ctr"/>
@@ -285,7 +285,7 @@
         <c:noMultiLvlLbl val="0"/>
       </c:catAx>
       <c:valAx>
-        <c:axId val="-2132961168"/>
+        <c:axId val="1853740032"/>
         <c:scaling>
           <c:orientation val="minMax"/>
         </c:scaling>
@@ -306,7 +306,7 @@
             <a:endParaRPr lang="en-US"/>
           </a:p>
         </c:txPr>
-        <c:crossAx val="-2132964064"/>
+        <c:crossAx val="1853732800"/>
         <c:crosses val="autoZero"/>
         <c:crossBetween val="between"/>
       </c:valAx>
@@ -469,11 +469,11 @@
           <c:showBubbleSize val="0"/>
         </c:dLbls>
         <c:gapWidth val="150"/>
-        <c:axId val="-2133083440"/>
-        <c:axId val="-2133080608"/>
+        <c:axId val="1873572256"/>
+        <c:axId val="1873575040"/>
       </c:barChart>
       <c:catAx>
-        <c:axId val="-2133083440"/>
+        <c:axId val="1873572256"/>
         <c:scaling>
           <c:orientation val="minMax"/>
         </c:scaling>
@@ -482,7 +482,7 @@
         <c:majorTickMark val="out"/>
         <c:minorTickMark val="none"/>
         <c:tickLblPos val="nextTo"/>
-        <c:crossAx val="-2133080608"/>
+        <c:crossAx val="1873575040"/>
         <c:crosses val="autoZero"/>
         <c:auto val="1"/>
         <c:lblAlgn val="ctr"/>
@@ -490,7 +490,7 @@
         <c:noMultiLvlLbl val="0"/>
       </c:catAx>
       <c:valAx>
-        <c:axId val="-2133080608"/>
+        <c:axId val="1873575040"/>
         <c:scaling>
           <c:orientation val="minMax"/>
         </c:scaling>
@@ -501,7 +501,7 @@
         <c:majorTickMark val="out"/>
         <c:minorTickMark val="none"/>
         <c:tickLblPos val="nextTo"/>
-        <c:crossAx val="-2133083440"/>
+        <c:crossAx val="1873572256"/>
         <c:crosses val="autoZero"/>
         <c:crossBetween val="between"/>
       </c:valAx>
@@ -679,11 +679,11 @@
           <c:showBubbleSize val="0"/>
         </c:dLbls>
         <c:gapWidth val="150"/>
-        <c:axId val="-2133141200"/>
-        <c:axId val="-2133159456"/>
+        <c:axId val="1784061520"/>
+        <c:axId val="1783691824"/>
       </c:barChart>
       <c:catAx>
-        <c:axId val="-2133141200"/>
+        <c:axId val="1784061520"/>
         <c:scaling>
           <c:orientation val="minMax"/>
         </c:scaling>
@@ -702,7 +702,7 @@
             <a:endParaRPr lang="en-US"/>
           </a:p>
         </c:txPr>
-        <c:crossAx val="-2133159456"/>
+        <c:crossAx val="1783691824"/>
         <c:crosses val="autoZero"/>
         <c:auto val="1"/>
         <c:lblAlgn val="ctr"/>
@@ -710,7 +710,7 @@
         <c:noMultiLvlLbl val="0"/>
       </c:catAx>
       <c:valAx>
-        <c:axId val="-2133159456"/>
+        <c:axId val="1783691824"/>
         <c:scaling>
           <c:orientation val="minMax"/>
         </c:scaling>
@@ -731,7 +731,7 @@
             <a:endParaRPr lang="en-US"/>
           </a:p>
         </c:txPr>
-        <c:crossAx val="-2133141200"/>
+        <c:crossAx val="1784061520"/>
         <c:crosses val="autoZero"/>
         <c:crossBetween val="between"/>
       </c:valAx>
@@ -894,11 +894,11 @@
           <c:showBubbleSize val="0"/>
         </c:dLbls>
         <c:gapWidth val="150"/>
-        <c:axId val="-2133188656"/>
-        <c:axId val="-2133185824"/>
+        <c:axId val="1873785600"/>
+        <c:axId val="1873788432"/>
       </c:barChart>
       <c:catAx>
-        <c:axId val="-2133188656"/>
+        <c:axId val="1873785600"/>
         <c:scaling>
           <c:orientation val="minMax"/>
         </c:scaling>
@@ -907,7 +907,7 @@
         <c:majorTickMark val="out"/>
         <c:minorTickMark val="none"/>
         <c:tickLblPos val="nextTo"/>
-        <c:crossAx val="-2133185824"/>
+        <c:crossAx val="1873788432"/>
         <c:crosses val="autoZero"/>
         <c:auto val="1"/>
         <c:lblAlgn val="ctr"/>
@@ -915,7 +915,7 @@
         <c:noMultiLvlLbl val="0"/>
       </c:catAx>
       <c:valAx>
-        <c:axId val="-2133185824"/>
+        <c:axId val="1873788432"/>
         <c:scaling>
           <c:orientation val="minMax"/>
         </c:scaling>
@@ -926,7 +926,7 @@
         <c:majorTickMark val="out"/>
         <c:minorTickMark val="none"/>
         <c:tickLblPos val="nextTo"/>
-        <c:crossAx val="-2133188656"/>
+        <c:crossAx val="1873785600"/>
         <c:crosses val="autoZero"/>
         <c:crossBetween val="between"/>
       </c:valAx>
@@ -1040,11 +1040,11 @@
           <c:showBubbleSize val="0"/>
         </c:dLbls>
         <c:gapWidth val="150"/>
-        <c:axId val="-2133300784"/>
-        <c:axId val="-2133297888"/>
+        <c:axId val="1873109216"/>
+        <c:axId val="1873106048"/>
       </c:barChart>
       <c:catAx>
-        <c:axId val="-2133300784"/>
+        <c:axId val="1873109216"/>
         <c:scaling>
           <c:orientation val="minMax"/>
         </c:scaling>
@@ -1063,7 +1063,7 @@
             <a:endParaRPr lang="en-US"/>
           </a:p>
         </c:txPr>
-        <c:crossAx val="-2133297888"/>
+        <c:crossAx val="1873106048"/>
         <c:crosses val="autoZero"/>
         <c:auto val="1"/>
         <c:lblAlgn val="ctr"/>
@@ -1071,7 +1071,7 @@
         <c:noMultiLvlLbl val="0"/>
       </c:catAx>
       <c:valAx>
-        <c:axId val="-2133297888"/>
+        <c:axId val="1873106048"/>
         <c:scaling>
           <c:orientation val="minMax"/>
         </c:scaling>
@@ -1092,7 +1092,7 @@
             <a:endParaRPr lang="en-US"/>
           </a:p>
         </c:txPr>
-        <c:crossAx val="-2133300784"/>
+        <c:crossAx val="1873109216"/>
         <c:crosses val="autoZero"/>
         <c:crossBetween val="between"/>
       </c:valAx>
@@ -1189,7 +1189,7 @@
           <a:p>
             <a:fld id="{4EFDF809-2BAF-E645-8EF5-E9E38045A37D}" type="datetimeFigureOut">
               <a:rPr lang="en-US" smtClean="0"/>
-              <a:t>11/17/15</a:t>
+              <a:t>11/26/15</a:t>
             </a:fld>
             <a:endParaRPr lang="en-US"/>
           </a:p>
@@ -1849,7 +1849,7 @@
           <a:p>
             <a:fld id="{892BA516-D09A-6A42-8E05-12F9A850DA27}" type="datetimeFigureOut">
               <a:rPr lang="en-US" smtClean="0"/>
-              <a:t>11/17/15</a:t>
+              <a:t>11/26/15</a:t>
             </a:fld>
             <a:endParaRPr lang="en-US"/>
           </a:p>
@@ -2019,7 +2019,7 @@
           <a:p>
             <a:fld id="{892BA516-D09A-6A42-8E05-12F9A850DA27}" type="datetimeFigureOut">
               <a:rPr lang="en-US" smtClean="0"/>
-              <a:t>11/17/15</a:t>
+              <a:t>11/26/15</a:t>
             </a:fld>
             <a:endParaRPr lang="en-US"/>
           </a:p>
@@ -2199,7 +2199,7 @@
           <a:p>
             <a:fld id="{892BA516-D09A-6A42-8E05-12F9A850DA27}" type="datetimeFigureOut">
               <a:rPr lang="en-US" smtClean="0"/>
-              <a:t>11/17/15</a:t>
+              <a:t>11/26/15</a:t>
             </a:fld>
             <a:endParaRPr lang="en-US"/>
           </a:p>
@@ -2369,7 +2369,7 @@
           <a:p>
             <a:fld id="{892BA516-D09A-6A42-8E05-12F9A850DA27}" type="datetimeFigureOut">
               <a:rPr lang="en-US" smtClean="0"/>
-              <a:t>11/17/15</a:t>
+              <a:t>11/26/15</a:t>
             </a:fld>
             <a:endParaRPr lang="en-US"/>
           </a:p>
@@ -2615,7 +2615,7 @@
           <a:p>
             <a:fld id="{892BA516-D09A-6A42-8E05-12F9A850DA27}" type="datetimeFigureOut">
               <a:rPr lang="en-US" smtClean="0"/>
-              <a:t>11/17/15</a:t>
+              <a:t>11/26/15</a:t>
             </a:fld>
             <a:endParaRPr lang="en-US"/>
           </a:p>
@@ -2847,7 +2847,7 @@
           <a:p>
             <a:fld id="{892BA516-D09A-6A42-8E05-12F9A850DA27}" type="datetimeFigureOut">
               <a:rPr lang="en-US" smtClean="0"/>
-              <a:t>11/17/15</a:t>
+              <a:t>11/26/15</a:t>
             </a:fld>
             <a:endParaRPr lang="en-US"/>
           </a:p>
@@ -3214,7 +3214,7 @@
           <a:p>
             <a:fld id="{892BA516-D09A-6A42-8E05-12F9A850DA27}" type="datetimeFigureOut">
               <a:rPr lang="en-US" smtClean="0"/>
-              <a:t>11/17/15</a:t>
+              <a:t>11/26/15</a:t>
             </a:fld>
             <a:endParaRPr lang="en-US"/>
           </a:p>
@@ -3332,7 +3332,7 @@
           <a:p>
             <a:fld id="{892BA516-D09A-6A42-8E05-12F9A850DA27}" type="datetimeFigureOut">
               <a:rPr lang="en-US" smtClean="0"/>
-              <a:t>11/17/15</a:t>
+              <a:t>11/26/15</a:t>
             </a:fld>
             <a:endParaRPr lang="en-US"/>
           </a:p>
@@ -3427,7 +3427,7 @@
           <a:p>
             <a:fld id="{892BA516-D09A-6A42-8E05-12F9A850DA27}" type="datetimeFigureOut">
               <a:rPr lang="en-US" smtClean="0"/>
-              <a:t>11/17/15</a:t>
+              <a:t>11/26/15</a:t>
             </a:fld>
             <a:endParaRPr lang="en-US"/>
           </a:p>
@@ -3704,7 +3704,7 @@
           <a:p>
             <a:fld id="{892BA516-D09A-6A42-8E05-12F9A850DA27}" type="datetimeFigureOut">
               <a:rPr lang="en-US" smtClean="0"/>
-              <a:t>11/17/15</a:t>
+              <a:t>11/26/15</a:t>
             </a:fld>
             <a:endParaRPr lang="en-US"/>
           </a:p>
@@ -3957,7 +3957,7 @@
           <a:p>
             <a:fld id="{892BA516-D09A-6A42-8E05-12F9A850DA27}" type="datetimeFigureOut">
               <a:rPr lang="en-US" smtClean="0"/>
-              <a:t>11/17/15</a:t>
+              <a:t>11/26/15</a:t>
             </a:fld>
             <a:endParaRPr lang="en-US"/>
           </a:p>
@@ -4170,7 +4170,7 @@
           <a:p>
             <a:fld id="{892BA516-D09A-6A42-8E05-12F9A850DA27}" type="datetimeFigureOut">
               <a:rPr lang="en-US" smtClean="0"/>
-              <a:t>11/17/15</a:t>
+              <a:t>11/26/15</a:t>
             </a:fld>
             <a:endParaRPr lang="en-US"/>
           </a:p>
@@ -23218,11 +23218,7 @@
           <a:p>
             <a:r>
               <a:rPr lang="en-US" dirty="0" smtClean="0"/>
-              <a:t>Estimating index </a:t>
-            </a:r>
-            <a:r>
-              <a:rPr lang="en-US" dirty="0" smtClean="0"/>
-              <a:t>cost?</a:t>
+              <a:t>Estimating index cost?</a:t>
             </a:r>
             <a:endParaRPr lang="en-US" dirty="0"/>
           </a:p>
@@ -23245,23 +23241,7 @@
           <a:p>
             <a:r>
               <a:rPr lang="en-US" dirty="0" smtClean="0"/>
-              <a:t>Note that to </a:t>
-            </a:r>
-            <a:r>
-              <a:rPr lang="en-US" dirty="0" smtClean="0"/>
-              <a:t>frame as </a:t>
-            </a:r>
-            <a:r>
-              <a:rPr lang="en-US" dirty="0" smtClean="0"/>
-              <a:t>optimization problem, we </a:t>
-            </a:r>
-            <a:r>
-              <a:rPr lang="en-US" dirty="0" smtClean="0"/>
-              <a:t>first need </a:t>
-            </a:r>
-            <a:r>
-              <a:rPr lang="en-US" dirty="0" smtClean="0"/>
-              <a:t>an estimate of the </a:t>
+              <a:t>Note that to frame as optimization problem, we first need an estimate of the </a:t>
             </a:r>
             <a:r>
               <a:rPr lang="en-US" b="1" i="1" dirty="0" smtClean="0"/>
@@ -24727,9 +24707,6 @@
               </a:rPr>
               <a:t>Sequential IO = free</a:t>
             </a:r>
-            <a:endParaRPr lang="en-US" sz="2400" dirty="0" smtClean="0">
-              <a:latin typeface="+mj-lt"/>
-            </a:endParaRPr>
           </a:p>
         </p:txBody>
       </p:sp>
@@ -25643,8 +25620,8 @@
           </a:p>
         </p:txBody>
       </p:sp>
-      <mc:AlternateContent xmlns:mc="http://schemas.openxmlformats.org/markup-compatibility/2006">
-        <mc:Choice xmlns:a14="http://schemas.microsoft.com/office/drawing/2010/main" Requires="a14">
+      <mc:AlternateContent xmlns:mc="http://schemas.openxmlformats.org/markup-compatibility/2006" xmlns:a14="http://schemas.microsoft.com/office/drawing/2010/main">
+        <mc:Choice Requires="a14">
           <p:sp>
             <p:nvSpPr>
               <p:cNvPr id="3" name="Content Placeholder 2"/>
@@ -25944,7 +25921,7 @@
             </p:txBody>
           </p:sp>
         </mc:Choice>
-        <mc:Fallback>
+        <mc:Fallback xmlns="">
           <p:sp>
             <p:nvSpPr>
               <p:cNvPr id="3" name="Content Placeholder 2"/>

</xml_diff>

<commit_message>
Fixed small bug on slide about clustered / unclustered
</commit_message>
<xml_diff>
--- a/lecture-17/Lecture_17_Optimization.pptx
+++ b/lecture-17/Lecture_17_Optimization.pptx
@@ -254,11 +254,11 @@
           <c:showBubbleSize val="0"/>
         </c:dLbls>
         <c:gapWidth val="150"/>
-        <c:axId val="1853732800"/>
-        <c:axId val="1853740032"/>
+        <c:axId val="-2043025632"/>
+        <c:axId val="-2043015040"/>
       </c:barChart>
       <c:catAx>
-        <c:axId val="1853732800"/>
+        <c:axId val="-2043025632"/>
         <c:scaling>
           <c:orientation val="minMax"/>
         </c:scaling>
@@ -277,7 +277,7 @@
             <a:endParaRPr lang="en-US"/>
           </a:p>
         </c:txPr>
-        <c:crossAx val="1853740032"/>
+        <c:crossAx val="-2043015040"/>
         <c:crosses val="autoZero"/>
         <c:auto val="1"/>
         <c:lblAlgn val="ctr"/>
@@ -285,7 +285,7 @@
         <c:noMultiLvlLbl val="0"/>
       </c:catAx>
       <c:valAx>
-        <c:axId val="1853740032"/>
+        <c:axId val="-2043015040"/>
         <c:scaling>
           <c:orientation val="minMax"/>
         </c:scaling>
@@ -306,7 +306,7 @@
             <a:endParaRPr lang="en-US"/>
           </a:p>
         </c:txPr>
-        <c:crossAx val="1853732800"/>
+        <c:crossAx val="-2043025632"/>
         <c:crosses val="autoZero"/>
         <c:crossBetween val="between"/>
       </c:valAx>
@@ -469,11 +469,11 @@
           <c:showBubbleSize val="0"/>
         </c:dLbls>
         <c:gapWidth val="150"/>
-        <c:axId val="1873572256"/>
-        <c:axId val="1873575040"/>
+        <c:axId val="-2040658912"/>
+        <c:axId val="-2040656080"/>
       </c:barChart>
       <c:catAx>
-        <c:axId val="1873572256"/>
+        <c:axId val="-2040658912"/>
         <c:scaling>
           <c:orientation val="minMax"/>
         </c:scaling>
@@ -482,7 +482,7 @@
         <c:majorTickMark val="out"/>
         <c:minorTickMark val="none"/>
         <c:tickLblPos val="nextTo"/>
-        <c:crossAx val="1873575040"/>
+        <c:crossAx val="-2040656080"/>
         <c:crosses val="autoZero"/>
         <c:auto val="1"/>
         <c:lblAlgn val="ctr"/>
@@ -490,7 +490,7 @@
         <c:noMultiLvlLbl val="0"/>
       </c:catAx>
       <c:valAx>
-        <c:axId val="1873575040"/>
+        <c:axId val="-2040656080"/>
         <c:scaling>
           <c:orientation val="minMax"/>
         </c:scaling>
@@ -501,7 +501,7 @@
         <c:majorTickMark val="out"/>
         <c:minorTickMark val="none"/>
         <c:tickLblPos val="nextTo"/>
-        <c:crossAx val="1873572256"/>
+        <c:crossAx val="-2040658912"/>
         <c:crosses val="autoZero"/>
         <c:crossBetween val="between"/>
       </c:valAx>
@@ -679,11 +679,11 @@
           <c:showBubbleSize val="0"/>
         </c:dLbls>
         <c:gapWidth val="150"/>
-        <c:axId val="1784061520"/>
-        <c:axId val="1783691824"/>
+        <c:axId val="-2105397824"/>
+        <c:axId val="-2105395728"/>
       </c:barChart>
       <c:catAx>
-        <c:axId val="1784061520"/>
+        <c:axId val="-2105397824"/>
         <c:scaling>
           <c:orientation val="minMax"/>
         </c:scaling>
@@ -702,7 +702,7 @@
             <a:endParaRPr lang="en-US"/>
           </a:p>
         </c:txPr>
-        <c:crossAx val="1783691824"/>
+        <c:crossAx val="-2105395728"/>
         <c:crosses val="autoZero"/>
         <c:auto val="1"/>
         <c:lblAlgn val="ctr"/>
@@ -710,7 +710,7 @@
         <c:noMultiLvlLbl val="0"/>
       </c:catAx>
       <c:valAx>
-        <c:axId val="1783691824"/>
+        <c:axId val="-2105395728"/>
         <c:scaling>
           <c:orientation val="minMax"/>
         </c:scaling>
@@ -731,7 +731,7 @@
             <a:endParaRPr lang="en-US"/>
           </a:p>
         </c:txPr>
-        <c:crossAx val="1784061520"/>
+        <c:crossAx val="-2105397824"/>
         <c:crosses val="autoZero"/>
         <c:crossBetween val="between"/>
       </c:valAx>
@@ -894,11 +894,11 @@
           <c:showBubbleSize val="0"/>
         </c:dLbls>
         <c:gapWidth val="150"/>
-        <c:axId val="1873785600"/>
-        <c:axId val="1873788432"/>
+        <c:axId val="-2105013552"/>
+        <c:axId val="-2105078224"/>
       </c:barChart>
       <c:catAx>
-        <c:axId val="1873785600"/>
+        <c:axId val="-2105013552"/>
         <c:scaling>
           <c:orientation val="minMax"/>
         </c:scaling>
@@ -907,7 +907,7 @@
         <c:majorTickMark val="out"/>
         <c:minorTickMark val="none"/>
         <c:tickLblPos val="nextTo"/>
-        <c:crossAx val="1873788432"/>
+        <c:crossAx val="-2105078224"/>
         <c:crosses val="autoZero"/>
         <c:auto val="1"/>
         <c:lblAlgn val="ctr"/>
@@ -915,7 +915,7 @@
         <c:noMultiLvlLbl val="0"/>
       </c:catAx>
       <c:valAx>
-        <c:axId val="1873788432"/>
+        <c:axId val="-2105078224"/>
         <c:scaling>
           <c:orientation val="minMax"/>
         </c:scaling>
@@ -926,7 +926,7 @@
         <c:majorTickMark val="out"/>
         <c:minorTickMark val="none"/>
         <c:tickLblPos val="nextTo"/>
-        <c:crossAx val="1873785600"/>
+        <c:crossAx val="-2105013552"/>
         <c:crosses val="autoZero"/>
         <c:crossBetween val="between"/>
       </c:valAx>
@@ -1040,11 +1040,11 @@
           <c:showBubbleSize val="0"/>
         </c:dLbls>
         <c:gapWidth val="150"/>
-        <c:axId val="1873109216"/>
-        <c:axId val="1873106048"/>
+        <c:axId val="-2045420688"/>
+        <c:axId val="-2044930000"/>
       </c:barChart>
       <c:catAx>
-        <c:axId val="1873109216"/>
+        <c:axId val="-2045420688"/>
         <c:scaling>
           <c:orientation val="minMax"/>
         </c:scaling>
@@ -1063,7 +1063,7 @@
             <a:endParaRPr lang="en-US"/>
           </a:p>
         </c:txPr>
-        <c:crossAx val="1873106048"/>
+        <c:crossAx val="-2044930000"/>
         <c:crosses val="autoZero"/>
         <c:auto val="1"/>
         <c:lblAlgn val="ctr"/>
@@ -1071,7 +1071,7 @@
         <c:noMultiLvlLbl val="0"/>
       </c:catAx>
       <c:valAx>
-        <c:axId val="1873106048"/>
+        <c:axId val="-2044930000"/>
         <c:scaling>
           <c:orientation val="minMax"/>
         </c:scaling>
@@ -1092,7 +1092,7 @@
             <a:endParaRPr lang="en-US"/>
           </a:p>
         </c:txPr>
-        <c:crossAx val="1873109216"/>
+        <c:crossAx val="-2045420688"/>
         <c:crosses val="autoZero"/>
         <c:crossBetween val="between"/>
       </c:valAx>
@@ -1189,7 +1189,7 @@
           <a:p>
             <a:fld id="{4EFDF809-2BAF-E645-8EF5-E9E38045A37D}" type="datetimeFigureOut">
               <a:rPr lang="en-US" smtClean="0"/>
-              <a:t>11/26/15</a:t>
+              <a:t>12/7/15</a:t>
             </a:fld>
             <a:endParaRPr lang="en-US"/>
           </a:p>
@@ -1849,7 +1849,7 @@
           <a:p>
             <a:fld id="{892BA516-D09A-6A42-8E05-12F9A850DA27}" type="datetimeFigureOut">
               <a:rPr lang="en-US" smtClean="0"/>
-              <a:t>11/26/15</a:t>
+              <a:t>12/7/15</a:t>
             </a:fld>
             <a:endParaRPr lang="en-US"/>
           </a:p>
@@ -2019,7 +2019,7 @@
           <a:p>
             <a:fld id="{892BA516-D09A-6A42-8E05-12F9A850DA27}" type="datetimeFigureOut">
               <a:rPr lang="en-US" smtClean="0"/>
-              <a:t>11/26/15</a:t>
+              <a:t>12/7/15</a:t>
             </a:fld>
             <a:endParaRPr lang="en-US"/>
           </a:p>
@@ -2199,7 +2199,7 @@
           <a:p>
             <a:fld id="{892BA516-D09A-6A42-8E05-12F9A850DA27}" type="datetimeFigureOut">
               <a:rPr lang="en-US" smtClean="0"/>
-              <a:t>11/26/15</a:t>
+              <a:t>12/7/15</a:t>
             </a:fld>
             <a:endParaRPr lang="en-US"/>
           </a:p>
@@ -2369,7 +2369,7 @@
           <a:p>
             <a:fld id="{892BA516-D09A-6A42-8E05-12F9A850DA27}" type="datetimeFigureOut">
               <a:rPr lang="en-US" smtClean="0"/>
-              <a:t>11/26/15</a:t>
+              <a:t>12/7/15</a:t>
             </a:fld>
             <a:endParaRPr lang="en-US"/>
           </a:p>
@@ -2615,7 +2615,7 @@
           <a:p>
             <a:fld id="{892BA516-D09A-6A42-8E05-12F9A850DA27}" type="datetimeFigureOut">
               <a:rPr lang="en-US" smtClean="0"/>
-              <a:t>11/26/15</a:t>
+              <a:t>12/7/15</a:t>
             </a:fld>
             <a:endParaRPr lang="en-US"/>
           </a:p>
@@ -2847,7 +2847,7 @@
           <a:p>
             <a:fld id="{892BA516-D09A-6A42-8E05-12F9A850DA27}" type="datetimeFigureOut">
               <a:rPr lang="en-US" smtClean="0"/>
-              <a:t>11/26/15</a:t>
+              <a:t>12/7/15</a:t>
             </a:fld>
             <a:endParaRPr lang="en-US"/>
           </a:p>
@@ -3214,7 +3214,7 @@
           <a:p>
             <a:fld id="{892BA516-D09A-6A42-8E05-12F9A850DA27}" type="datetimeFigureOut">
               <a:rPr lang="en-US" smtClean="0"/>
-              <a:t>11/26/15</a:t>
+              <a:t>12/7/15</a:t>
             </a:fld>
             <a:endParaRPr lang="en-US"/>
           </a:p>
@@ -3332,7 +3332,7 @@
           <a:p>
             <a:fld id="{892BA516-D09A-6A42-8E05-12F9A850DA27}" type="datetimeFigureOut">
               <a:rPr lang="en-US" smtClean="0"/>
-              <a:t>11/26/15</a:t>
+              <a:t>12/7/15</a:t>
             </a:fld>
             <a:endParaRPr lang="en-US"/>
           </a:p>
@@ -3427,7 +3427,7 @@
           <a:p>
             <a:fld id="{892BA516-D09A-6A42-8E05-12F9A850DA27}" type="datetimeFigureOut">
               <a:rPr lang="en-US" smtClean="0"/>
-              <a:t>11/26/15</a:t>
+              <a:t>12/7/15</a:t>
             </a:fld>
             <a:endParaRPr lang="en-US"/>
           </a:p>
@@ -3704,7 +3704,7 @@
           <a:p>
             <a:fld id="{892BA516-D09A-6A42-8E05-12F9A850DA27}" type="datetimeFigureOut">
               <a:rPr lang="en-US" smtClean="0"/>
-              <a:t>11/26/15</a:t>
+              <a:t>12/7/15</a:t>
             </a:fld>
             <a:endParaRPr lang="en-US"/>
           </a:p>
@@ -3957,7 +3957,7 @@
           <a:p>
             <a:fld id="{892BA516-D09A-6A42-8E05-12F9A850DA27}" type="datetimeFigureOut">
               <a:rPr lang="en-US" smtClean="0"/>
-              <a:t>11/26/15</a:t>
+              <a:t>12/7/15</a:t>
             </a:fld>
             <a:endParaRPr lang="en-US"/>
           </a:p>
@@ -4170,7 +4170,7 @@
           <a:p>
             <a:fld id="{892BA516-D09A-6A42-8E05-12F9A850DA27}" type="datetimeFigureOut">
               <a:rPr lang="en-US" smtClean="0"/>
-              <a:t>11/26/15</a:t>
+              <a:t>12/7/15</a:t>
             </a:fld>
             <a:endParaRPr lang="en-US"/>
           </a:p>
@@ -23671,135 +23671,242 @@
           </a:p>
         </p:txBody>
       </p:sp>
-      <p:sp>
-        <p:nvSpPr>
-          <p:cNvPr id="3" name="Content Placeholder 2"/>
-          <p:cNvSpPr>
-            <a:spLocks noGrp="1"/>
-          </p:cNvSpPr>
-          <p:nvPr>
-            <p:ph idx="1"/>
-          </p:nvPr>
-        </p:nvSpPr>
-        <p:spPr/>
-        <p:txBody>
-          <a:bodyPr>
-            <a:normAutofit/>
-          </a:bodyPr>
-          <a:lstStyle/>
-          <a:p>
-            <a:pPr marL="0" indent="0">
-              <a:buNone/>
-            </a:pPr>
-            <a:r>
-              <a:rPr lang="en-US" dirty="0" smtClean="0"/>
-              <a:t>Cost to do a range query for M entries over N-page file (P per page):</a:t>
-            </a:r>
-          </a:p>
-          <a:p>
-            <a:pPr lvl="1"/>
-            <a:endParaRPr lang="en-US" dirty="0"/>
-          </a:p>
-          <a:p>
-            <a:pPr lvl="1"/>
-            <a:r>
-              <a:rPr lang="en-US" dirty="0" smtClean="0"/>
-              <a:t>Clustered: </a:t>
-            </a:r>
-          </a:p>
-          <a:p>
-            <a:pPr lvl="2"/>
-            <a:r>
-              <a:rPr lang="en-US" sz="2400" dirty="0" smtClean="0"/>
-              <a:t>To traverse: </a:t>
-            </a:r>
-            <a:r>
-              <a:rPr lang="en-US" sz="2400" dirty="0" err="1" smtClean="0"/>
-              <a:t>Log</a:t>
-            </a:r>
-            <a:r>
-              <a:rPr lang="en-US" sz="2400" baseline="-25000" dirty="0" err="1" smtClean="0"/>
-              <a:t>F</a:t>
-            </a:r>
-            <a:r>
-              <a:rPr lang="en-US" sz="2400" dirty="0" smtClean="0"/>
-              <a:t>(1.5N)</a:t>
-            </a:r>
-          </a:p>
-          <a:p>
-            <a:pPr lvl="2"/>
-            <a:r>
-              <a:rPr lang="en-US" sz="2400" dirty="0" smtClean="0"/>
-              <a:t>To scan: 1 random IO + ceil(M/P) sequential IO</a:t>
-            </a:r>
-          </a:p>
-          <a:p>
-            <a:pPr lvl="2"/>
-            <a:endParaRPr lang="en-US" sz="2400" dirty="0"/>
-          </a:p>
-          <a:p>
-            <a:pPr lvl="1"/>
-            <a:r>
-              <a:rPr lang="en-US" dirty="0" err="1" smtClean="0"/>
-              <a:t>Unclustered</a:t>
-            </a:r>
-            <a:r>
-              <a:rPr lang="en-US" dirty="0"/>
-              <a:t>: </a:t>
-            </a:r>
-          </a:p>
-          <a:p>
-            <a:pPr lvl="2"/>
-            <a:r>
-              <a:rPr lang="en-US" sz="2400" dirty="0"/>
-              <a:t>To traverse: </a:t>
-            </a:r>
-            <a:r>
-              <a:rPr lang="en-US" sz="2400" dirty="0" err="1"/>
-              <a:t>Log</a:t>
-            </a:r>
-            <a:r>
-              <a:rPr lang="en-US" sz="2400" baseline="-25000" dirty="0" err="1"/>
-              <a:t>F</a:t>
-            </a:r>
-            <a:r>
-              <a:rPr lang="en-US" sz="2400" dirty="0"/>
-              <a:t>(1.5N)</a:t>
-            </a:r>
-          </a:p>
-          <a:p>
-            <a:pPr lvl="2"/>
-            <a:r>
-              <a:rPr lang="en-US" sz="2400" dirty="0"/>
-              <a:t>To </a:t>
-            </a:r>
-            <a:r>
-              <a:rPr lang="en-US" sz="2400" dirty="0" smtClean="0"/>
-              <a:t>scan: ~ M </a:t>
-            </a:r>
-            <a:r>
-              <a:rPr lang="en-US" sz="2400" dirty="0"/>
-              <a:t>random </a:t>
-            </a:r>
-            <a:r>
-              <a:rPr lang="en-US" sz="2400" dirty="0" smtClean="0"/>
-              <a:t>IO</a:t>
-            </a:r>
-          </a:p>
-          <a:p>
-            <a:pPr lvl="2"/>
-            <a:endParaRPr lang="en-US" dirty="0"/>
-          </a:p>
-          <a:p>
-            <a:pPr lvl="2"/>
-            <a:endParaRPr lang="en-US" dirty="0" smtClean="0"/>
-          </a:p>
-          <a:p>
-            <a:pPr lvl="1"/>
-            <a:endParaRPr lang="en-US" dirty="0"/>
-          </a:p>
-        </p:txBody>
-      </p:sp>
+      <mc:AlternateContent xmlns:mc="http://schemas.openxmlformats.org/markup-compatibility/2006">
+        <mc:Choice xmlns:a14="http://schemas.microsoft.com/office/drawing/2010/main" Requires="a14">
+          <p:sp>
+            <p:nvSpPr>
+              <p:cNvPr id="3" name="Content Placeholder 2"/>
+              <p:cNvSpPr>
+                <a:spLocks noGrp="1"/>
+              </p:cNvSpPr>
+              <p:nvPr>
+                <p:ph idx="1"/>
+              </p:nvPr>
+            </p:nvSpPr>
+            <p:spPr/>
+            <p:txBody>
+              <a:bodyPr>
+                <a:normAutofit/>
+              </a:bodyPr>
+              <a:lstStyle/>
+              <a:p>
+                <a:pPr marL="0" indent="0">
+                  <a:buNone/>
+                </a:pPr>
+                <a:r>
+                  <a:rPr lang="en-US" dirty="0" smtClean="0"/>
+                  <a:t>Cost to do a range query for M entries over N-page file (P per page):</a:t>
+                </a:r>
+              </a:p>
+              <a:p>
+                <a:pPr lvl="1"/>
+                <a:endParaRPr lang="en-US" dirty="0"/>
+              </a:p>
+              <a:p>
+                <a:pPr lvl="1"/>
+                <a:r>
+                  <a:rPr lang="en-US" dirty="0" smtClean="0"/>
+                  <a:t>Clustered: </a:t>
+                </a:r>
+              </a:p>
+              <a:p>
+                <a:pPr lvl="2"/>
+                <a:r>
+                  <a:rPr lang="en-US" sz="2400" dirty="0" smtClean="0"/>
+                  <a:t>To traverse: </a:t>
+                </a:r>
+                <a:r>
+                  <a:rPr lang="en-US" sz="2400" dirty="0" err="1" smtClean="0"/>
+                  <a:t>Log</a:t>
+                </a:r>
+                <a:r>
+                  <a:rPr lang="en-US" sz="2400" baseline="-25000" dirty="0" err="1"/>
+                  <a:t>f</a:t>
+                </a:r>
+                <a:r>
+                  <a:rPr lang="en-US" sz="2400" dirty="0" smtClean="0"/>
+                  <a:t>(1.5N</a:t>
+                </a:r>
+                <a:r>
+                  <a:rPr lang="en-US" sz="2400" dirty="0" smtClean="0"/>
+                  <a:t>)</a:t>
+                </a:r>
+              </a:p>
+              <a:p>
+                <a:pPr lvl="2"/>
+                <a:r>
+                  <a:rPr lang="en-US" sz="2400" dirty="0" smtClean="0"/>
+                  <a:t>To scan: 1 random IO + </a:t>
+                </a:r>
+                <a14:m>
+                  <m:oMath xmlns:m="http://schemas.openxmlformats.org/officeDocument/2006/math">
+                    <m:d>
+                      <m:dPr>
+                        <m:begChr m:val="⌈"/>
+                        <m:endChr m:val="⌉"/>
+                        <m:ctrlPr>
+                          <a:rPr lang="en-US" sz="2400" i="1" smtClean="0">
+                            <a:latin typeface="Cambria Math" charset="0"/>
+                          </a:rPr>
+                        </m:ctrlPr>
+                      </m:dPr>
+                      <m:e>
+                        <m:f>
+                          <m:fPr>
+                            <m:ctrlPr>
+                              <a:rPr lang="en-US" sz="2400" i="1" smtClean="0">
+                                <a:latin typeface="Cambria Math" charset="0"/>
+                              </a:rPr>
+                            </m:ctrlPr>
+                          </m:fPr>
+                          <m:num>
+                            <m:r>
+                              <a:rPr lang="en-US" sz="2400" b="0" i="1" smtClean="0">
+                                <a:latin typeface="Cambria Math" charset="0"/>
+                              </a:rPr>
+                              <m:t>𝑀</m:t>
+                            </m:r>
+                            <m:r>
+                              <a:rPr lang="en-US" sz="2400" b="0" i="1" smtClean="0">
+                                <a:latin typeface="Cambria Math" charset="0"/>
+                              </a:rPr>
+                              <m:t>−1</m:t>
+                            </m:r>
+                          </m:num>
+                          <m:den>
+                            <m:r>
+                              <a:rPr lang="en-US" sz="2400" b="0" i="1" smtClean="0">
+                                <a:latin typeface="Cambria Math" charset="0"/>
+                              </a:rPr>
+                              <m:t>𝑃</m:t>
+                            </m:r>
+                          </m:den>
+                        </m:f>
+                      </m:e>
+                    </m:d>
+                    <m:r>
+                      <a:rPr lang="en-US" sz="2400" b="0" i="1" smtClean="0">
+                        <a:latin typeface="Cambria Math" charset="0"/>
+                      </a:rPr>
+                      <m:t> </m:t>
+                    </m:r>
+                  </m:oMath>
+                </a14:m>
+                <a:r>
+                  <a:rPr lang="en-US" sz="2400" dirty="0" smtClean="0"/>
+                  <a:t>sequential </a:t>
+                </a:r>
+                <a:r>
+                  <a:rPr lang="en-US" sz="2400" dirty="0" smtClean="0"/>
+                  <a:t>IO</a:t>
+                </a:r>
+              </a:p>
+              <a:p>
+                <a:pPr lvl="2"/>
+                <a:endParaRPr lang="en-US" sz="2400" dirty="0"/>
+              </a:p>
+              <a:p>
+                <a:pPr lvl="1"/>
+                <a:r>
+                  <a:rPr lang="en-US" dirty="0" err="1" smtClean="0"/>
+                  <a:t>Unclustered</a:t>
+                </a:r>
+                <a:r>
+                  <a:rPr lang="en-US" dirty="0"/>
+                  <a:t>: </a:t>
+                </a:r>
+              </a:p>
+              <a:p>
+                <a:pPr lvl="2"/>
+                <a:r>
+                  <a:rPr lang="en-US" sz="2400" dirty="0"/>
+                  <a:t>To traverse: </a:t>
+                </a:r>
+                <a:r>
+                  <a:rPr lang="en-US" sz="2400" dirty="0" err="1" smtClean="0"/>
+                  <a:t>Log</a:t>
+                </a:r>
+                <a:r>
+                  <a:rPr lang="en-US" sz="2400" baseline="-25000" dirty="0" err="1"/>
+                  <a:t>f</a:t>
+                </a:r>
+                <a:r>
+                  <a:rPr lang="en-US" sz="2400" dirty="0" smtClean="0"/>
+                  <a:t>(1.5N</a:t>
+                </a:r>
+                <a:r>
+                  <a:rPr lang="en-US" sz="2400" dirty="0"/>
+                  <a:t>)</a:t>
+                </a:r>
+              </a:p>
+              <a:p>
+                <a:pPr lvl="2"/>
+                <a:r>
+                  <a:rPr lang="en-US" sz="2400" dirty="0"/>
+                  <a:t>To </a:t>
+                </a:r>
+                <a:r>
+                  <a:rPr lang="en-US" sz="2400" dirty="0" smtClean="0"/>
+                  <a:t>scan: ~ M </a:t>
+                </a:r>
+                <a:r>
+                  <a:rPr lang="en-US" sz="2400" dirty="0"/>
+                  <a:t>random </a:t>
+                </a:r>
+                <a:r>
+                  <a:rPr lang="en-US" sz="2400" dirty="0" smtClean="0"/>
+                  <a:t>IO</a:t>
+                </a:r>
+              </a:p>
+              <a:p>
+                <a:pPr lvl="2"/>
+                <a:endParaRPr lang="en-US" dirty="0"/>
+              </a:p>
+              <a:p>
+                <a:pPr lvl="2"/>
+                <a:endParaRPr lang="en-US" dirty="0" smtClean="0"/>
+              </a:p>
+              <a:p>
+                <a:pPr lvl="1"/>
+                <a:endParaRPr lang="en-US" dirty="0"/>
+              </a:p>
+            </p:txBody>
+          </p:sp>
+        </mc:Choice>
+        <mc:Fallback>
+          <p:sp>
+            <p:nvSpPr>
+              <p:cNvPr id="3" name="Content Placeholder 2"/>
+              <p:cNvSpPr>
+                <a:spLocks noGrp="1" noRot="1" noChangeAspect="1" noMove="1" noResize="1" noEditPoints="1" noAdjustHandles="1" noChangeArrowheads="1" noChangeShapeType="1" noTextEdit="1"/>
+              </p:cNvSpPr>
+              <p:nvPr>
+                <p:ph idx="1"/>
+              </p:nvPr>
+            </p:nvSpPr>
+            <p:spPr>
+              <a:blipFill rotWithShape="0">
+                <a:blip r:embed="rId2"/>
+                <a:stretch>
+                  <a:fillRect l="-1217" t="-2241"/>
+                </a:stretch>
+              </a:blipFill>
+            </p:spPr>
+            <p:txBody>
+              <a:bodyPr/>
+              <a:lstStyle/>
+              <a:p>
+                <a:r>
+                  <a:rPr lang="en-US">
+                    <a:noFill/>
+                  </a:rPr>
+                  <a:t> </a:t>
+                </a:r>
+              </a:p>
+            </p:txBody>
+          </p:sp>
+        </mc:Fallback>
+      </mc:AlternateContent>
       <p:grpSp>
         <p:nvGrpSpPr>
           <p:cNvPr id="4" name="Group 3"/>
@@ -23971,8 +24078,17 @@
               <a:rPr lang="en-US" sz="2400" dirty="0" smtClean="0">
                 <a:latin typeface="+mj-lt"/>
               </a:rPr>
-              <a:t> F (=2d)</a:t>
-            </a:r>
+              <a:t> </a:t>
+            </a:r>
+            <a:r>
+              <a:rPr lang="en-US" sz="2400" dirty="0" smtClean="0">
+                <a:latin typeface="+mj-lt"/>
+              </a:rPr>
+              <a:t>f</a:t>
+            </a:r>
+            <a:endParaRPr lang="en-US" sz="2400" dirty="0" smtClean="0">
+              <a:latin typeface="+mj-lt"/>
+            </a:endParaRPr>
           </a:p>
           <a:p>
             <a:pPr marL="342900" indent="-342900">
@@ -23983,8 +24099,17 @@
               <a:rPr lang="en-US" sz="2400" dirty="0" smtClean="0">
                 <a:latin typeface="+mj-lt"/>
               </a:rPr>
-              <a:t>Fill factor 1.5</a:t>
-            </a:r>
+              <a:t>Fill factor </a:t>
+            </a:r>
+            <a:r>
+              <a:rPr lang="en-US" sz="2400" dirty="0" smtClean="0">
+                <a:latin typeface="+mj-lt"/>
+              </a:rPr>
+              <a:t>2/3</a:t>
+            </a:r>
+            <a:endParaRPr lang="en-US" sz="2400" dirty="0" smtClean="0">
+              <a:latin typeface="+mj-lt"/>
+            </a:endParaRPr>
           </a:p>
         </p:txBody>
       </p:sp>
@@ -24081,51 +24206,6 @@
                                           </p:stCondLst>
                                         </p:cTn>
                                         <p:tgtEl>
-                                          <p:spTgt spid="7"/>
-                                        </p:tgtEl>
-                                        <p:attrNameLst>
-                                          <p:attrName>style.visibility</p:attrName>
-                                        </p:attrNameLst>
-                                      </p:cBhvr>
-                                      <p:to>
-                                        <p:strVal val="visible"/>
-                                      </p:to>
-                                    </p:set>
-                                  </p:childTnLst>
-                                </p:cTn>
-                              </p:par>
-                            </p:childTnLst>
-                          </p:cTn>
-                        </p:par>
-                      </p:childTnLst>
-                    </p:cTn>
-                  </p:par>
-                  <p:par>
-                    <p:cTn id="11" fill="hold">
-                      <p:stCondLst>
-                        <p:cond delay="indefinite"/>
-                      </p:stCondLst>
-                      <p:childTnLst>
-                        <p:par>
-                          <p:cTn id="12" fill="hold">
-                            <p:stCondLst>
-                              <p:cond delay="0"/>
-                            </p:stCondLst>
-                            <p:childTnLst>
-                              <p:par>
-                                <p:cTn id="13" presetID="1" presetClass="entr" presetSubtype="0" fill="hold" grpId="0" nodeType="clickEffect">
-                                  <p:stCondLst>
-                                    <p:cond delay="0"/>
-                                  </p:stCondLst>
-                                  <p:childTnLst>
-                                    <p:set>
-                                      <p:cBhvr>
-                                        <p:cTn id="14" dur="1" fill="hold">
-                                          <p:stCondLst>
-                                            <p:cond delay="0"/>
-                                          </p:stCondLst>
-                                        </p:cTn>
-                                        <p:tgtEl>
                                           <p:spTgt spid="3">
                                             <p:txEl>
                                               <p:pRg st="2" end="2"/>
@@ -24144,14 +24224,14 @@
                                 </p:cTn>
                               </p:par>
                               <p:par>
-                                <p:cTn id="15" presetID="1" presetClass="entr" presetSubtype="0" fill="hold" grpId="0" nodeType="withEffect">
+                                <p:cTn id="11" presetID="1" presetClass="entr" presetSubtype="0" fill="hold" grpId="0" nodeType="withEffect">
                                   <p:stCondLst>
                                     <p:cond delay="0"/>
                                   </p:stCondLst>
                                   <p:childTnLst>
                                     <p:set>
                                       <p:cBhvr>
-                                        <p:cTn id="16" dur="1" fill="hold">
+                                        <p:cTn id="12" dur="1" fill="hold">
                                           <p:stCondLst>
                                             <p:cond delay="0"/>
                                           </p:stCondLst>
@@ -24175,14 +24255,14 @@
                                 </p:cTn>
                               </p:par>
                               <p:par>
-                                <p:cTn id="17" presetID="1" presetClass="entr" presetSubtype="0" fill="hold" grpId="0" nodeType="withEffect">
+                                <p:cTn id="13" presetID="1" presetClass="entr" presetSubtype="0" fill="hold" grpId="0" nodeType="withEffect">
                                   <p:stCondLst>
                                     <p:cond delay="0"/>
                                   </p:stCondLst>
                                   <p:childTnLst>
                                     <p:set>
                                       <p:cBhvr>
-                                        <p:cTn id="18" dur="1" fill="hold">
+                                        <p:cTn id="14" dur="1" fill="hold">
                                           <p:stCondLst>
                                             <p:cond delay="0"/>
                                           </p:stCondLst>
@@ -24212,26 +24292,26 @@
                     </p:cTn>
                   </p:par>
                   <p:par>
-                    <p:cTn id="19" fill="hold">
+                    <p:cTn id="15" fill="hold">
                       <p:stCondLst>
                         <p:cond delay="indefinite"/>
                       </p:stCondLst>
                       <p:childTnLst>
                         <p:par>
-                          <p:cTn id="20" fill="hold">
+                          <p:cTn id="16" fill="hold">
                             <p:stCondLst>
                               <p:cond delay="0"/>
                             </p:stCondLst>
                             <p:childTnLst>
                               <p:par>
-                                <p:cTn id="21" presetID="1" presetClass="entr" presetSubtype="0" fill="hold" grpId="0" nodeType="clickEffect">
+                                <p:cTn id="17" presetID="1" presetClass="entr" presetSubtype="0" fill="hold" grpId="0" nodeType="clickEffect">
                                   <p:stCondLst>
                                     <p:cond delay="0"/>
                                   </p:stCondLst>
                                   <p:childTnLst>
                                     <p:set>
                                       <p:cBhvr>
-                                        <p:cTn id="22" dur="1" fill="hold">
+                                        <p:cTn id="18" dur="1" fill="hold">
                                           <p:stCondLst>
                                             <p:cond delay="0"/>
                                           </p:stCondLst>
@@ -24255,14 +24335,14 @@
                                 </p:cTn>
                               </p:par>
                               <p:par>
-                                <p:cTn id="23" presetID="1" presetClass="entr" presetSubtype="0" fill="hold" grpId="0" nodeType="withEffect">
+                                <p:cTn id="19" presetID="1" presetClass="entr" presetSubtype="0" fill="hold" grpId="0" nodeType="withEffect">
                                   <p:stCondLst>
                                     <p:cond delay="0"/>
                                   </p:stCondLst>
                                   <p:childTnLst>
                                     <p:set>
                                       <p:cBhvr>
-                                        <p:cTn id="24" dur="1" fill="hold">
+                                        <p:cTn id="20" dur="1" fill="hold">
                                           <p:stCondLst>
                                             <p:cond delay="0"/>
                                           </p:stCondLst>
@@ -24286,7 +24366,56 @@
                                 </p:cTn>
                               </p:par>
                               <p:par>
-                                <p:cTn id="25" presetID="1" presetClass="entr" presetSubtype="0" fill="hold" grpId="0" nodeType="withEffect">
+                                <p:cTn id="21" presetID="1" presetClass="entr" presetSubtype="0" fill="hold" grpId="0" nodeType="withEffect">
+                                  <p:stCondLst>
+                                    <p:cond delay="0"/>
+                                  </p:stCondLst>
+                                  <p:childTnLst>
+                                    <p:set>
+                                      <p:cBhvr>
+                                        <p:cTn id="22" dur="1" fill="hold">
+                                          <p:stCondLst>
+                                            <p:cond delay="0"/>
+                                          </p:stCondLst>
+                                        </p:cTn>
+                                        <p:tgtEl>
+                                          <p:spTgt spid="3">
+                                            <p:txEl>
+                                              <p:pRg st="8" end="8"/>
+                                            </p:txEl>
+                                          </p:spTgt>
+                                        </p:tgtEl>
+                                        <p:attrNameLst>
+                                          <p:attrName>style.visibility</p:attrName>
+                                        </p:attrNameLst>
+                                      </p:cBhvr>
+                                      <p:to>
+                                        <p:strVal val="visible"/>
+                                      </p:to>
+                                    </p:set>
+                                  </p:childTnLst>
+                                </p:cTn>
+                              </p:par>
+                            </p:childTnLst>
+                          </p:cTn>
+                        </p:par>
+                      </p:childTnLst>
+                    </p:cTn>
+                  </p:par>
+                  <p:par>
+                    <p:cTn id="23" fill="hold">
+                      <p:stCondLst>
+                        <p:cond delay="indefinite"/>
+                      </p:stCondLst>
+                      <p:childTnLst>
+                        <p:par>
+                          <p:cTn id="24" fill="hold">
+                            <p:stCondLst>
+                              <p:cond delay="0"/>
+                            </p:stCondLst>
+                            <p:childTnLst>
+                              <p:par>
+                                <p:cTn id="25" presetID="1" presetClass="entr" presetSubtype="0" fill="hold" grpId="0" nodeType="clickEffect">
                                   <p:stCondLst>
                                     <p:cond delay="0"/>
                                   </p:stCondLst>
@@ -24299,11 +24428,7 @@
                                           </p:stCondLst>
                                         </p:cTn>
                                         <p:tgtEl>
-                                          <p:spTgt spid="3">
-                                            <p:txEl>
-                                              <p:pRg st="8" end="8"/>
-                                            </p:txEl>
-                                          </p:spTgt>
+                                          <p:spTgt spid="7"/>
                                         </p:tgtEl>
                                         <p:attrNameLst>
                                           <p:attrName>style.visibility</p:attrName>
@@ -24391,143 +24516,240 @@
           </a:p>
         </p:txBody>
       </p:sp>
-      <p:sp>
-        <p:nvSpPr>
-          <p:cNvPr id="3" name="Content Placeholder 2"/>
-          <p:cNvSpPr>
-            <a:spLocks noGrp="1"/>
-          </p:cNvSpPr>
-          <p:nvPr>
-            <p:ph idx="1"/>
-          </p:nvPr>
-        </p:nvSpPr>
-        <p:spPr>
-          <a:xfrm>
-            <a:off x="838200" y="1825625"/>
-            <a:ext cx="10515600" cy="3708901"/>
-          </a:xfrm>
-        </p:spPr>
-        <p:txBody>
-          <a:bodyPr>
-            <a:normAutofit fontScale="92500" lnSpcReduction="20000"/>
-          </a:bodyPr>
-          <a:lstStyle/>
-          <a:p>
-            <a:r>
-              <a:rPr lang="en-US" dirty="0" smtClean="0"/>
-              <a:t>Clustered: </a:t>
-            </a:r>
-          </a:p>
-          <a:p>
-            <a:pPr lvl="1"/>
-            <a:r>
-              <a:rPr lang="en-US" sz="2800" dirty="0" smtClean="0"/>
-              <a:t>To traverse: </a:t>
-            </a:r>
-            <a:r>
-              <a:rPr lang="en-US" sz="2800" dirty="0" err="1" smtClean="0"/>
-              <a:t>Log</a:t>
-            </a:r>
-            <a:r>
-              <a:rPr lang="en-US" sz="2800" baseline="-25000" dirty="0" err="1" smtClean="0"/>
-              <a:t>F</a:t>
-            </a:r>
-            <a:r>
-              <a:rPr lang="en-US" sz="2800" dirty="0" smtClean="0"/>
-              <a:t>(1.5N)</a:t>
-            </a:r>
-          </a:p>
-          <a:p>
-            <a:pPr lvl="1"/>
-            <a:r>
-              <a:rPr lang="en-US" sz="2800" b="1" dirty="0" smtClean="0"/>
-              <a:t>To scan: 1 random IO + ceil(M/P) sequential IO</a:t>
-            </a:r>
-          </a:p>
-          <a:p>
-            <a:pPr lvl="1"/>
-            <a:endParaRPr lang="en-US" sz="2800" dirty="0"/>
-          </a:p>
-          <a:p>
-            <a:r>
-              <a:rPr lang="en-US" dirty="0" err="1" smtClean="0"/>
-              <a:t>Unclustered</a:t>
-            </a:r>
-            <a:r>
-              <a:rPr lang="en-US" dirty="0"/>
-              <a:t>: </a:t>
-            </a:r>
-          </a:p>
-          <a:p>
-            <a:pPr lvl="1"/>
-            <a:r>
-              <a:rPr lang="en-US" sz="2800" dirty="0"/>
-              <a:t>To traverse: </a:t>
-            </a:r>
-            <a:r>
-              <a:rPr lang="en-US" sz="2800" dirty="0" err="1"/>
-              <a:t>Log</a:t>
-            </a:r>
-            <a:r>
-              <a:rPr lang="en-US" sz="2800" baseline="-25000" dirty="0" err="1"/>
-              <a:t>F</a:t>
-            </a:r>
-            <a:r>
-              <a:rPr lang="en-US" sz="2800" dirty="0"/>
-              <a:t>(1.5N)</a:t>
-            </a:r>
-          </a:p>
-          <a:p>
-            <a:pPr lvl="1"/>
-            <a:r>
-              <a:rPr lang="en-US" sz="2800" b="1" dirty="0"/>
-              <a:t>To </a:t>
-            </a:r>
-            <a:r>
-              <a:rPr lang="en-US" sz="2800" b="1" dirty="0" smtClean="0"/>
-              <a:t>scan: ~ M </a:t>
-            </a:r>
-            <a:r>
-              <a:rPr lang="en-US" sz="2800" b="1" dirty="0"/>
-              <a:t>random </a:t>
-            </a:r>
-            <a:r>
-              <a:rPr lang="en-US" sz="2800" b="1" dirty="0" smtClean="0"/>
-              <a:t>IO</a:t>
-            </a:r>
-          </a:p>
-          <a:p>
-            <a:pPr marL="914400" lvl="2" indent="0">
-              <a:buNone/>
-            </a:pPr>
-            <a:endParaRPr lang="en-US" sz="2400" b="1" dirty="0" smtClean="0"/>
-          </a:p>
-          <a:p>
-            <a:r>
-              <a:rPr lang="en-US" sz="3200" dirty="0" smtClean="0"/>
-              <a:t>If M = 1, then there is no difference!</a:t>
-            </a:r>
-          </a:p>
-          <a:p>
-            <a:r>
-              <a:rPr lang="en-US" sz="3200" dirty="0" smtClean="0"/>
-              <a:t>If M = 100,000 records, then difference is ~10min. Vs. 10ms!</a:t>
-            </a:r>
-          </a:p>
-          <a:p>
-            <a:pPr lvl="2"/>
-            <a:endParaRPr lang="en-US" dirty="0"/>
-          </a:p>
-          <a:p>
-            <a:pPr lvl="2"/>
-            <a:endParaRPr lang="en-US" dirty="0" smtClean="0"/>
-          </a:p>
-          <a:p>
-            <a:pPr lvl="1"/>
-            <a:endParaRPr lang="en-US" dirty="0"/>
-          </a:p>
-        </p:txBody>
-      </p:sp>
+      <mc:AlternateContent xmlns:mc="http://schemas.openxmlformats.org/markup-compatibility/2006">
+        <mc:Choice xmlns:a14="http://schemas.microsoft.com/office/drawing/2010/main" Requires="a14">
+          <p:sp>
+            <p:nvSpPr>
+              <p:cNvPr id="3" name="Content Placeholder 2"/>
+              <p:cNvSpPr>
+                <a:spLocks noGrp="1"/>
+              </p:cNvSpPr>
+              <p:nvPr>
+                <p:ph idx="1"/>
+              </p:nvPr>
+            </p:nvSpPr>
+            <p:spPr>
+              <a:xfrm>
+                <a:off x="838200" y="1825625"/>
+                <a:ext cx="10515600" cy="3708901"/>
+              </a:xfrm>
+            </p:spPr>
+            <p:txBody>
+              <a:bodyPr>
+                <a:normAutofit fontScale="85000" lnSpcReduction="20000"/>
+              </a:bodyPr>
+              <a:lstStyle/>
+              <a:p>
+                <a:r>
+                  <a:rPr lang="en-US" dirty="0" smtClean="0"/>
+                  <a:t>Clustered: </a:t>
+                </a:r>
+              </a:p>
+              <a:p>
+                <a:pPr lvl="1"/>
+                <a:r>
+                  <a:rPr lang="en-US" sz="2800" dirty="0" smtClean="0"/>
+                  <a:t>To traverse: </a:t>
+                </a:r>
+                <a:r>
+                  <a:rPr lang="en-US" sz="2800" dirty="0" err="1" smtClean="0"/>
+                  <a:t>Log</a:t>
+                </a:r>
+                <a:r>
+                  <a:rPr lang="en-US" sz="2800" baseline="-25000" dirty="0" err="1" smtClean="0"/>
+                  <a:t>F</a:t>
+                </a:r>
+                <a:r>
+                  <a:rPr lang="en-US" sz="2800" dirty="0" smtClean="0"/>
+                  <a:t>(1.5N)</a:t>
+                </a:r>
+              </a:p>
+              <a:p>
+                <a:pPr lvl="1"/>
+                <a:r>
+                  <a:rPr lang="en-US" sz="2800" b="1" dirty="0" smtClean="0"/>
+                  <a:t>To scan: 1 random IO + </a:t>
+                </a:r>
+                <a14:m>
+                  <m:oMath xmlns:m="http://schemas.openxmlformats.org/officeDocument/2006/math">
+                    <m:d>
+                      <m:dPr>
+                        <m:begChr m:val="⌈"/>
+                        <m:endChr m:val="⌉"/>
+                        <m:ctrlPr>
+                          <a:rPr lang="en-US" sz="2800" i="1">
+                            <a:latin typeface="Cambria Math" charset="0"/>
+                          </a:rPr>
+                        </m:ctrlPr>
+                      </m:dPr>
+                      <m:e>
+                        <m:f>
+                          <m:fPr>
+                            <m:ctrlPr>
+                              <a:rPr lang="en-US" sz="2800" i="1">
+                                <a:latin typeface="Cambria Math" charset="0"/>
+                              </a:rPr>
+                            </m:ctrlPr>
+                          </m:fPr>
+                          <m:num>
+                            <m:r>
+                              <a:rPr lang="en-US" sz="2800" i="1">
+                                <a:latin typeface="Cambria Math" charset="0"/>
+                              </a:rPr>
+                              <m:t>𝑀</m:t>
+                            </m:r>
+                            <m:r>
+                              <a:rPr lang="en-US" sz="2800" i="1">
+                                <a:latin typeface="Cambria Math" charset="0"/>
+                              </a:rPr>
+                              <m:t>−1</m:t>
+                            </m:r>
+                          </m:num>
+                          <m:den>
+                            <m:r>
+                              <a:rPr lang="en-US" sz="2800" i="1">
+                                <a:latin typeface="Cambria Math" charset="0"/>
+                              </a:rPr>
+                              <m:t>𝑃</m:t>
+                            </m:r>
+                          </m:den>
+                        </m:f>
+                      </m:e>
+                    </m:d>
+                  </m:oMath>
+                </a14:m>
+                <a:r>
+                  <a:rPr lang="en-US" sz="2800" b="1" dirty="0" smtClean="0"/>
+                  <a:t> sequential </a:t>
+                </a:r>
+                <a:r>
+                  <a:rPr lang="en-US" sz="2800" b="1" dirty="0" smtClean="0"/>
+                  <a:t>IO</a:t>
+                </a:r>
+              </a:p>
+              <a:p>
+                <a:pPr lvl="1"/>
+                <a:endParaRPr lang="en-US" sz="2800" dirty="0"/>
+              </a:p>
+              <a:p>
+                <a:r>
+                  <a:rPr lang="en-US" dirty="0" err="1" smtClean="0"/>
+                  <a:t>Unclustered</a:t>
+                </a:r>
+                <a:r>
+                  <a:rPr lang="en-US" dirty="0"/>
+                  <a:t>: </a:t>
+                </a:r>
+              </a:p>
+              <a:p>
+                <a:pPr lvl="1"/>
+                <a:r>
+                  <a:rPr lang="en-US" sz="2800" dirty="0"/>
+                  <a:t>To traverse: </a:t>
+                </a:r>
+                <a:r>
+                  <a:rPr lang="en-US" sz="2800" dirty="0" err="1"/>
+                  <a:t>Log</a:t>
+                </a:r>
+                <a:r>
+                  <a:rPr lang="en-US" sz="2800" baseline="-25000" dirty="0" err="1"/>
+                  <a:t>F</a:t>
+                </a:r>
+                <a:r>
+                  <a:rPr lang="en-US" sz="2800" dirty="0"/>
+                  <a:t>(1.5N)</a:t>
+                </a:r>
+              </a:p>
+              <a:p>
+                <a:pPr lvl="1"/>
+                <a:r>
+                  <a:rPr lang="en-US" sz="2800" b="1" dirty="0"/>
+                  <a:t>To </a:t>
+                </a:r>
+                <a:r>
+                  <a:rPr lang="en-US" sz="2800" b="1" dirty="0" smtClean="0"/>
+                  <a:t>scan: ~ M </a:t>
+                </a:r>
+                <a:r>
+                  <a:rPr lang="en-US" sz="2800" b="1" dirty="0"/>
+                  <a:t>random </a:t>
+                </a:r>
+                <a:r>
+                  <a:rPr lang="en-US" sz="2800" b="1" dirty="0" smtClean="0"/>
+                  <a:t>IO</a:t>
+                </a:r>
+              </a:p>
+              <a:p>
+                <a:pPr marL="914400" lvl="2" indent="0">
+                  <a:buNone/>
+                </a:pPr>
+                <a:endParaRPr lang="en-US" sz="2400" b="1" dirty="0" smtClean="0"/>
+              </a:p>
+              <a:p>
+                <a:r>
+                  <a:rPr lang="en-US" sz="3200" dirty="0" smtClean="0"/>
+                  <a:t>If M = 1, then there is no difference!</a:t>
+                </a:r>
+              </a:p>
+              <a:p>
+                <a:r>
+                  <a:rPr lang="en-US" sz="3200" dirty="0" smtClean="0"/>
+                  <a:t>If M = 100,000 records, then difference is ~10min. Vs. 10ms!</a:t>
+                </a:r>
+              </a:p>
+              <a:p>
+                <a:pPr lvl="2"/>
+                <a:endParaRPr lang="en-US" dirty="0"/>
+              </a:p>
+              <a:p>
+                <a:pPr lvl="2"/>
+                <a:endParaRPr lang="en-US" dirty="0" smtClean="0"/>
+              </a:p>
+              <a:p>
+                <a:pPr lvl="1"/>
+                <a:endParaRPr lang="en-US" dirty="0"/>
+              </a:p>
+            </p:txBody>
+          </p:sp>
+        </mc:Choice>
+        <mc:Fallback>
+          <p:sp>
+            <p:nvSpPr>
+              <p:cNvPr id="3" name="Content Placeholder 2"/>
+              <p:cNvSpPr>
+                <a:spLocks noGrp="1" noRot="1" noChangeAspect="1" noMove="1" noResize="1" noEditPoints="1" noAdjustHandles="1" noChangeArrowheads="1" noChangeShapeType="1" noTextEdit="1"/>
+              </p:cNvSpPr>
+              <p:nvPr>
+                <p:ph idx="1"/>
+              </p:nvPr>
+            </p:nvSpPr>
+            <p:spPr>
+              <a:xfrm>
+                <a:off x="838200" y="1825625"/>
+                <a:ext cx="10515600" cy="3708901"/>
+              </a:xfrm>
+              <a:blipFill rotWithShape="0">
+                <a:blip r:embed="rId2"/>
+                <a:stretch>
+                  <a:fillRect l="-986" t="-3777" b="-821"/>
+                </a:stretch>
+              </a:blipFill>
+            </p:spPr>
+            <p:txBody>
+              <a:bodyPr/>
+              <a:lstStyle/>
+              <a:p>
+                <a:r>
+                  <a:rPr lang="en-US">
+                    <a:noFill/>
+                  </a:rPr>
+                  <a:t> </a:t>
+                </a:r>
+              </a:p>
+            </p:txBody>
+          </p:sp>
+        </mc:Fallback>
+      </mc:AlternateContent>
       <p:grpSp>
         <p:nvGrpSpPr>
           <p:cNvPr id="4" name="Group 3"/>

</xml_diff>